<commit_message>
Actualización de la próxima presentación.
</commit_message>
<xml_diff>
--- a/Presentaciones/presentacion vaspa - 12 - Noviembre 2019.pptx
+++ b/Presentaciones/presentacion vaspa - 12 - Noviembre 2019.pptx
@@ -5,7 +5,7 @@
     <p:sldMasterId id="2147483933" r:id="rId1"/>
   </p:sldMasterIdLst>
   <p:notesMasterIdLst>
-    <p:notesMasterId r:id="rId22"/>
+    <p:notesMasterId r:id="rId25"/>
   </p:notesMasterIdLst>
   <p:sldIdLst>
     <p:sldId id="267" r:id="rId2"/>
@@ -22,12 +22,15 @@
     <p:sldId id="341" r:id="rId13"/>
     <p:sldId id="344" r:id="rId14"/>
     <p:sldId id="343" r:id="rId15"/>
-    <p:sldId id="307" r:id="rId16"/>
-    <p:sldId id="332" r:id="rId17"/>
-    <p:sldId id="342" r:id="rId18"/>
-    <p:sldId id="345" r:id="rId19"/>
-    <p:sldId id="346" r:id="rId20"/>
-    <p:sldId id="275" r:id="rId21"/>
+    <p:sldId id="347" r:id="rId16"/>
+    <p:sldId id="348" r:id="rId17"/>
+    <p:sldId id="349" r:id="rId18"/>
+    <p:sldId id="307" r:id="rId19"/>
+    <p:sldId id="332" r:id="rId20"/>
+    <p:sldId id="342" r:id="rId21"/>
+    <p:sldId id="345" r:id="rId22"/>
+    <p:sldId id="346" r:id="rId23"/>
+    <p:sldId id="275" r:id="rId24"/>
   </p:sldIdLst>
   <p:sldSz cx="12192000" cy="6858000"/>
   <p:notesSz cx="6858000" cy="9144000"/>
@@ -128,7 +131,7 @@
   </p:defaultTextStyle>
   <p:extLst>
     <p:ext uri="{EFAFB233-063F-42B5-8137-9DF3F51BA10A}">
-      <p15:sldGuideLst xmlns:p15="http://schemas.microsoft.com/office/powerpoint/2012/main">
+      <p15:sldGuideLst xmlns:p15="http://schemas.microsoft.com/office/powerpoint/2012/main" xmlns="">
         <p15:guide id="1" orient="horz" pos="2160">
           <p15:clr>
             <a:srgbClr val="A4A3A4"/>
@@ -143,6 +146,223 @@
     </p:ext>
   </p:extLst>
 </p:presentation>
+</file>
+
+<file path=ppt/charts/chart1.xml><?xml version="1.0" encoding="utf-8"?>
+<c:chartSpace xmlns:c="http://schemas.openxmlformats.org/drawingml/2006/chart" xmlns:a="http://schemas.openxmlformats.org/drawingml/2006/main" xmlns:r="http://schemas.openxmlformats.org/officeDocument/2006/relationships">
+  <c:date1904 val="1"/>
+  <c:lang val="es-AR"/>
+  <c:chart>
+    <c:autoTitleDeleted val="1"/>
+    <c:plotArea>
+      <c:layout/>
+      <c:pieChart>
+        <c:varyColors val="1"/>
+        <c:ser>
+          <c:idx val="0"/>
+          <c:order val="0"/>
+          <c:dLbls>
+            <c:showPercent val="1"/>
+            <c:showLeaderLines val="1"/>
+          </c:dLbls>
+          <c:cat>
+            <c:strRef>
+              <c:f>Hoja1!$A$3:$A$5</c:f>
+              <c:strCache>
+                <c:ptCount val="3"/>
+                <c:pt idx="0">
+                  <c:v>Completos</c:v>
+                </c:pt>
+                <c:pt idx="1">
+                  <c:v>Incompletos</c:v>
+                </c:pt>
+                <c:pt idx="2">
+                  <c:v>No iniciados</c:v>
+                </c:pt>
+              </c:strCache>
+            </c:strRef>
+          </c:cat>
+          <c:val>
+            <c:numRef>
+              <c:f>Hoja1!$B$3:$B$5</c:f>
+              <c:numCache>
+                <c:formatCode>General</c:formatCode>
+                <c:ptCount val="3"/>
+                <c:pt idx="0">
+                  <c:v>42.31</c:v>
+                </c:pt>
+                <c:pt idx="1">
+                  <c:v>46.15</c:v>
+                </c:pt>
+                <c:pt idx="2">
+                  <c:v>11.54</c:v>
+                </c:pt>
+              </c:numCache>
+            </c:numRef>
+          </c:val>
+        </c:ser>
+        <c:dLbls>
+          <c:showPercent val="1"/>
+        </c:dLbls>
+        <c:firstSliceAng val="0"/>
+      </c:pieChart>
+    </c:plotArea>
+    <c:legend>
+      <c:legendPos val="r"/>
+      <c:layout/>
+    </c:legend>
+    <c:plotVisOnly val="1"/>
+  </c:chart>
+  <c:txPr>
+    <a:bodyPr/>
+    <a:lstStyle/>
+    <a:p>
+      <a:pPr>
+        <a:defRPr sz="1800"/>
+      </a:pPr>
+      <a:endParaRPr lang="es-AR"/>
+    </a:p>
+  </c:txPr>
+  <c:externalData r:id="rId1"/>
+</c:chartSpace>
+</file>
+
+<file path=ppt/charts/chart2.xml><?xml version="1.0" encoding="utf-8"?>
+<c:chartSpace xmlns:c="http://schemas.openxmlformats.org/drawingml/2006/chart" xmlns:a="http://schemas.openxmlformats.org/drawingml/2006/main" xmlns:r="http://schemas.openxmlformats.org/officeDocument/2006/relationships">
+  <c:date1904 val="1"/>
+  <c:lang val="es-AR"/>
+  <c:chart>
+    <c:autoTitleDeleted val="1"/>
+    <c:plotArea>
+      <c:layout/>
+      <c:pieChart>
+        <c:varyColors val="1"/>
+        <c:ser>
+          <c:idx val="0"/>
+          <c:order val="0"/>
+          <c:dLbls>
+            <c:showPercent val="1"/>
+            <c:showLeaderLines val="1"/>
+          </c:dLbls>
+          <c:cat>
+            <c:strRef>
+              <c:f>Hoja1!$A$3:$A$5</c:f>
+              <c:strCache>
+                <c:ptCount val="3"/>
+                <c:pt idx="0">
+                  <c:v>Total CU Implementados con pruebas (A y D)</c:v>
+                </c:pt>
+                <c:pt idx="1">
+                  <c:v>Total CU Implementados Sin pruebas (- 100 %)</c:v>
+                </c:pt>
+                <c:pt idx="2">
+                  <c:v>Total CU Sin implementar</c:v>
+                </c:pt>
+              </c:strCache>
+            </c:strRef>
+          </c:cat>
+          <c:val>
+            <c:numRef>
+              <c:f>Hoja1!$B$3:$B$5</c:f>
+              <c:numCache>
+                <c:formatCode>General</c:formatCode>
+                <c:ptCount val="3"/>
+                <c:pt idx="0">
+                  <c:v>7</c:v>
+                </c:pt>
+                <c:pt idx="1">
+                  <c:v>6</c:v>
+                </c:pt>
+                <c:pt idx="2">
+                  <c:v>4</c:v>
+                </c:pt>
+              </c:numCache>
+            </c:numRef>
+          </c:val>
+        </c:ser>
+        <c:dLbls>
+          <c:showPercent val="1"/>
+        </c:dLbls>
+        <c:firstSliceAng val="0"/>
+      </c:pieChart>
+    </c:plotArea>
+    <c:legend>
+      <c:legendPos val="r"/>
+      <c:layout/>
+    </c:legend>
+    <c:plotVisOnly val="1"/>
+  </c:chart>
+  <c:externalData r:id="rId1"/>
+</c:chartSpace>
+</file>
+
+<file path=ppt/charts/chart3.xml><?xml version="1.0" encoding="utf-8"?>
+<c:chartSpace xmlns:c="http://schemas.openxmlformats.org/drawingml/2006/chart" xmlns:a="http://schemas.openxmlformats.org/drawingml/2006/main" xmlns:r="http://schemas.openxmlformats.org/officeDocument/2006/relationships">
+  <c:date1904 val="1"/>
+  <c:lang val="es-AR"/>
+  <c:chart>
+    <c:autoTitleDeleted val="1"/>
+    <c:plotArea>
+      <c:layout/>
+      <c:pieChart>
+        <c:varyColors val="1"/>
+        <c:ser>
+          <c:idx val="0"/>
+          <c:order val="0"/>
+          <c:dLbls>
+            <c:showPercent val="1"/>
+            <c:showLeaderLines val="1"/>
+          </c:dLbls>
+          <c:cat>
+            <c:strRef>
+              <c:f>Hoja1!$A$22:$A$24</c:f>
+              <c:strCache>
+                <c:ptCount val="3"/>
+                <c:pt idx="0">
+                  <c:v>Aprobados (Completos)</c:v>
+                </c:pt>
+                <c:pt idx="1">
+                  <c:v>Aprobados (incompletos)</c:v>
+                </c:pt>
+                <c:pt idx="2">
+                  <c:v>Desaprobados</c:v>
+                </c:pt>
+              </c:strCache>
+            </c:strRef>
+          </c:cat>
+          <c:val>
+            <c:numRef>
+              <c:f>Hoja1!$B$22:$B$24</c:f>
+              <c:numCache>
+                <c:formatCode>General</c:formatCode>
+                <c:ptCount val="3"/>
+                <c:pt idx="0">
+                  <c:v>2</c:v>
+                </c:pt>
+                <c:pt idx="1">
+                  <c:v>4</c:v>
+                </c:pt>
+                <c:pt idx="2">
+                  <c:v>1</c:v>
+                </c:pt>
+              </c:numCache>
+            </c:numRef>
+          </c:val>
+        </c:ser>
+        <c:dLbls>
+          <c:showPercent val="1"/>
+        </c:dLbls>
+        <c:firstSliceAng val="0"/>
+      </c:pieChart>
+    </c:plotArea>
+    <c:legend>
+      <c:legendPos val="r"/>
+      <c:layout/>
+    </c:legend>
+    <c:plotVisOnly val="1"/>
+  </c:chart>
+  <c:externalData r:id="rId1"/>
+</c:chartSpace>
 </file>
 
 <file path=ppt/notesMasters/notesMaster1.xml><?xml version="1.0" encoding="utf-8"?>
@@ -397,7 +617,7 @@
     </p:spTree>
     <p:extLst>
       <p:ext uri="{BB962C8B-B14F-4D97-AF65-F5344CB8AC3E}">
-        <p14:creationId xmlns:p14="http://schemas.microsoft.com/office/powerpoint/2010/main" val="1580866007"/>
+        <p14:creationId xmlns:p14="http://schemas.microsoft.com/office/powerpoint/2010/main" xmlns="" val="1580866007"/>
       </p:ext>
     </p:extLst>
   </p:cSld>
@@ -1059,7 +1279,7 @@
           <p:cNvPr id="8" name="Imagen 7">
             <a:extLst>
               <a:ext uri="{FF2B5EF4-FFF2-40B4-BE49-F238E27FC236}">
-                <a16:creationId xmlns:a16="http://schemas.microsoft.com/office/drawing/2014/main" id="{153E41C7-C0FB-4283-8821-79FB890C108B}"/>
+                <a16:creationId xmlns:a16="http://schemas.microsoft.com/office/drawing/2014/main" xmlns="" id="{153E41C7-C0FB-4283-8821-79FB890C108B}"/>
               </a:ext>
             </a:extLst>
           </p:cNvPr>
@@ -1072,7 +1292,7 @@
           <a:blip r:embed="rId2" cstate="print">
             <a:extLst>
               <a:ext uri="{28A0092B-C50C-407E-A947-70E740481C1C}">
-                <a14:useLocalDpi xmlns:a14="http://schemas.microsoft.com/office/drawing/2010/main" val="0"/>
+                <a14:useLocalDpi xmlns:a14="http://schemas.microsoft.com/office/drawing/2010/main" xmlns="" val="0"/>
               </a:ext>
             </a:extLst>
           </a:blip>
@@ -1093,7 +1313,7 @@
     </p:spTree>
     <p:extLst>
       <p:ext uri="{BB962C8B-B14F-4D97-AF65-F5344CB8AC3E}">
-        <p14:creationId xmlns:p14="http://schemas.microsoft.com/office/powerpoint/2010/main" val="594578851"/>
+        <p14:creationId xmlns:p14="http://schemas.microsoft.com/office/powerpoint/2010/main" xmlns="" val="594578851"/>
       </p:ext>
     </p:extLst>
   </p:cSld>
@@ -1386,7 +1606,7 @@
     </p:spTree>
     <p:extLst>
       <p:ext uri="{BB962C8B-B14F-4D97-AF65-F5344CB8AC3E}">
-        <p14:creationId xmlns:p14="http://schemas.microsoft.com/office/powerpoint/2010/main" val="2858870748"/>
+        <p14:creationId xmlns:p14="http://schemas.microsoft.com/office/powerpoint/2010/main" xmlns="" val="2858870748"/>
       </p:ext>
     </p:extLst>
   </p:cSld>
@@ -1636,7 +1856,7 @@
     </p:spTree>
     <p:extLst>
       <p:ext uri="{BB962C8B-B14F-4D97-AF65-F5344CB8AC3E}">
-        <p14:creationId xmlns:p14="http://schemas.microsoft.com/office/powerpoint/2010/main" val="2887001581"/>
+        <p14:creationId xmlns:p14="http://schemas.microsoft.com/office/powerpoint/2010/main" xmlns="" val="2887001581"/>
       </p:ext>
     </p:extLst>
   </p:cSld>
@@ -2178,7 +2398,7 @@
     </p:spTree>
     <p:extLst>
       <p:ext uri="{BB962C8B-B14F-4D97-AF65-F5344CB8AC3E}">
-        <p14:creationId xmlns:p14="http://schemas.microsoft.com/office/powerpoint/2010/main" val="953477666"/>
+        <p14:creationId xmlns:p14="http://schemas.microsoft.com/office/powerpoint/2010/main" xmlns="" val="953477666"/>
       </p:ext>
     </p:extLst>
   </p:cSld>
@@ -2428,7 +2648,7 @@
     </p:spTree>
     <p:extLst>
       <p:ext uri="{BB962C8B-B14F-4D97-AF65-F5344CB8AC3E}">
-        <p14:creationId xmlns:p14="http://schemas.microsoft.com/office/powerpoint/2010/main" val="2881036134"/>
+        <p14:creationId xmlns:p14="http://schemas.microsoft.com/office/powerpoint/2010/main" xmlns="" val="2881036134"/>
       </p:ext>
     </p:extLst>
   </p:cSld>
@@ -2962,7 +3182,7 @@
     </p:spTree>
     <p:extLst>
       <p:ext uri="{BB962C8B-B14F-4D97-AF65-F5344CB8AC3E}">
-        <p14:creationId xmlns:p14="http://schemas.microsoft.com/office/powerpoint/2010/main" val="3557333580"/>
+        <p14:creationId xmlns:p14="http://schemas.microsoft.com/office/powerpoint/2010/main" xmlns="" val="3557333580"/>
       </p:ext>
     </p:extLst>
   </p:cSld>
@@ -3261,7 +3481,7 @@
     </p:spTree>
     <p:extLst>
       <p:ext uri="{BB962C8B-B14F-4D97-AF65-F5344CB8AC3E}">
-        <p14:creationId xmlns:p14="http://schemas.microsoft.com/office/powerpoint/2010/main" val="2020671905"/>
+        <p14:creationId xmlns:p14="http://schemas.microsoft.com/office/powerpoint/2010/main" xmlns="" val="2020671905"/>
       </p:ext>
     </p:extLst>
   </p:cSld>
@@ -3437,7 +3657,7 @@
     </p:spTree>
     <p:extLst>
       <p:ext uri="{BB962C8B-B14F-4D97-AF65-F5344CB8AC3E}">
-        <p14:creationId xmlns:p14="http://schemas.microsoft.com/office/powerpoint/2010/main" val="3698065381"/>
+        <p14:creationId xmlns:p14="http://schemas.microsoft.com/office/powerpoint/2010/main" xmlns="" val="3698065381"/>
       </p:ext>
     </p:extLst>
   </p:cSld>
@@ -3619,7 +3839,7 @@
     </p:spTree>
     <p:extLst>
       <p:ext uri="{BB962C8B-B14F-4D97-AF65-F5344CB8AC3E}">
-        <p14:creationId xmlns:p14="http://schemas.microsoft.com/office/powerpoint/2010/main" val="2361575083"/>
+        <p14:creationId xmlns:p14="http://schemas.microsoft.com/office/powerpoint/2010/main" xmlns="" val="2361575083"/>
       </p:ext>
     </p:extLst>
   </p:cSld>
@@ -3804,7 +4024,7 @@
           <p:cNvPr id="8" name="Imagen 7">
             <a:extLst>
               <a:ext uri="{FF2B5EF4-FFF2-40B4-BE49-F238E27FC236}">
-                <a16:creationId xmlns:a16="http://schemas.microsoft.com/office/drawing/2014/main" id="{F65BAB47-52C5-4418-98C7-5ABDFBAB2220}"/>
+                <a16:creationId xmlns:a16="http://schemas.microsoft.com/office/drawing/2014/main" xmlns="" id="{F65BAB47-52C5-4418-98C7-5ABDFBAB2220}"/>
               </a:ext>
             </a:extLst>
           </p:cNvPr>
@@ -3817,7 +4037,7 @@
           <a:blip r:embed="rId2" cstate="print">
             <a:extLst>
               <a:ext uri="{28A0092B-C50C-407E-A947-70E740481C1C}">
-                <a14:useLocalDpi xmlns:a14="http://schemas.microsoft.com/office/drawing/2010/main" val="0"/>
+                <a14:useLocalDpi xmlns:a14="http://schemas.microsoft.com/office/drawing/2010/main" xmlns="" val="0"/>
               </a:ext>
             </a:extLst>
           </a:blip>
@@ -3838,7 +4058,7 @@
     </p:spTree>
     <p:extLst>
       <p:ext uri="{BB962C8B-B14F-4D97-AF65-F5344CB8AC3E}">
-        <p14:creationId xmlns:p14="http://schemas.microsoft.com/office/powerpoint/2010/main" val="3522170283"/>
+        <p14:creationId xmlns:p14="http://schemas.microsoft.com/office/powerpoint/2010/main" xmlns="" val="3522170283"/>
       </p:ext>
     </p:extLst>
   </p:cSld>
@@ -4086,7 +4306,7 @@
     </p:spTree>
     <p:extLst>
       <p:ext uri="{BB962C8B-B14F-4D97-AF65-F5344CB8AC3E}">
-        <p14:creationId xmlns:p14="http://schemas.microsoft.com/office/powerpoint/2010/main" val="2921707453"/>
+        <p14:creationId xmlns:p14="http://schemas.microsoft.com/office/powerpoint/2010/main" xmlns="" val="2921707453"/>
       </p:ext>
     </p:extLst>
   </p:cSld>
@@ -4385,7 +4605,7 @@
     </p:spTree>
     <p:extLst>
       <p:ext uri="{BB962C8B-B14F-4D97-AF65-F5344CB8AC3E}">
-        <p14:creationId xmlns:p14="http://schemas.microsoft.com/office/powerpoint/2010/main" val="1855319959"/>
+        <p14:creationId xmlns:p14="http://schemas.microsoft.com/office/powerpoint/2010/main" xmlns="" val="1855319959"/>
       </p:ext>
     </p:extLst>
   </p:cSld>
@@ -4829,7 +5049,7 @@
     </p:spTree>
     <p:extLst>
       <p:ext uri="{BB962C8B-B14F-4D97-AF65-F5344CB8AC3E}">
-        <p14:creationId xmlns:p14="http://schemas.microsoft.com/office/powerpoint/2010/main" val="522982594"/>
+        <p14:creationId xmlns:p14="http://schemas.microsoft.com/office/powerpoint/2010/main" xmlns="" val="522982594"/>
       </p:ext>
     </p:extLst>
   </p:cSld>
@@ -4949,7 +5169,7 @@
     </p:spTree>
     <p:extLst>
       <p:ext uri="{BB962C8B-B14F-4D97-AF65-F5344CB8AC3E}">
-        <p14:creationId xmlns:p14="http://schemas.microsoft.com/office/powerpoint/2010/main" val="3355991177"/>
+        <p14:creationId xmlns:p14="http://schemas.microsoft.com/office/powerpoint/2010/main" xmlns="" val="3355991177"/>
       </p:ext>
     </p:extLst>
   </p:cSld>
@@ -5046,7 +5266,7 @@
     </p:spTree>
     <p:extLst>
       <p:ext uri="{BB962C8B-B14F-4D97-AF65-F5344CB8AC3E}">
-        <p14:creationId xmlns:p14="http://schemas.microsoft.com/office/powerpoint/2010/main" val="2067178301"/>
+        <p14:creationId xmlns:p14="http://schemas.microsoft.com/office/powerpoint/2010/main" xmlns="" val="2067178301"/>
       </p:ext>
     </p:extLst>
   </p:cSld>
@@ -5331,7 +5551,7 @@
     </p:spTree>
     <p:extLst>
       <p:ext uri="{BB962C8B-B14F-4D97-AF65-F5344CB8AC3E}">
-        <p14:creationId xmlns:p14="http://schemas.microsoft.com/office/powerpoint/2010/main" val="1822716033"/>
+        <p14:creationId xmlns:p14="http://schemas.microsoft.com/office/powerpoint/2010/main" xmlns="" val="1822716033"/>
       </p:ext>
     </p:extLst>
   </p:cSld>
@@ -5624,7 +5844,7 @@
     </p:spTree>
     <p:extLst>
       <p:ext uri="{BB962C8B-B14F-4D97-AF65-F5344CB8AC3E}">
-        <p14:creationId xmlns:p14="http://schemas.microsoft.com/office/powerpoint/2010/main" val="2752311715"/>
+        <p14:creationId xmlns:p14="http://schemas.microsoft.com/office/powerpoint/2010/main" xmlns="" val="2752311715"/>
       </p:ext>
     </p:extLst>
   </p:cSld>
@@ -6192,7 +6412,7 @@
     </p:spTree>
     <p:extLst>
       <p:ext uri="{BB962C8B-B14F-4D97-AF65-F5344CB8AC3E}">
-        <p14:creationId xmlns:p14="http://schemas.microsoft.com/office/powerpoint/2010/main" val="761644953"/>
+        <p14:creationId xmlns:p14="http://schemas.microsoft.com/office/powerpoint/2010/main" xmlns="" val="761644953"/>
       </p:ext>
     </p:extLst>
   </p:cSld>
@@ -6641,7 +6861,7 @@
           <p:cNvPr id="2" name="Título 1">
             <a:extLst>
               <a:ext uri="{FF2B5EF4-FFF2-40B4-BE49-F238E27FC236}">
-                <a16:creationId xmlns:a16="http://schemas.microsoft.com/office/drawing/2014/main" id="{8CE1749D-25BE-4B8A-9C39-0568C1DB7176}"/>
+                <a16:creationId xmlns:a16="http://schemas.microsoft.com/office/drawing/2014/main" xmlns="" id="{8CE1749D-25BE-4B8A-9C39-0568C1DB7176}"/>
               </a:ext>
             </a:extLst>
           </p:cNvPr>
@@ -6674,7 +6894,7 @@
           <p:cNvPr id="5" name="Subtítulo 2">
             <a:extLst>
               <a:ext uri="{FF2B5EF4-FFF2-40B4-BE49-F238E27FC236}">
-                <a16:creationId xmlns:a16="http://schemas.microsoft.com/office/drawing/2014/main" id="{77C0998F-42B9-4F94-A4C5-FB800997D545}"/>
+                <a16:creationId xmlns:a16="http://schemas.microsoft.com/office/drawing/2014/main" xmlns="" id="{77C0998F-42B9-4F94-A4C5-FB800997D545}"/>
               </a:ext>
             </a:extLst>
           </p:cNvPr>
@@ -6709,7 +6929,7 @@
           <p:cNvPr id="3" name="CuadroTexto 2">
             <a:extLst>
               <a:ext uri="{FF2B5EF4-FFF2-40B4-BE49-F238E27FC236}">
-                <a16:creationId xmlns:a16="http://schemas.microsoft.com/office/drawing/2014/main" id="{EC53297C-9824-45B9-8927-A6834EB1DBD1}"/>
+                <a16:creationId xmlns:a16="http://schemas.microsoft.com/office/drawing/2014/main" xmlns="" id="{EC53297C-9824-45B9-8927-A6834EB1DBD1}"/>
               </a:ext>
             </a:extLst>
           </p:cNvPr>
@@ -6774,7 +6994,7 @@
           <p:cNvPr id="6" name="Imagen 5">
             <a:extLst>
               <a:ext uri="{FF2B5EF4-FFF2-40B4-BE49-F238E27FC236}">
-                <a16:creationId xmlns:a16="http://schemas.microsoft.com/office/drawing/2014/main" id="{765DC11C-9D6D-4F31-9AC7-1EFE6E6D455C}"/>
+                <a16:creationId xmlns:a16="http://schemas.microsoft.com/office/drawing/2014/main" xmlns="" id="{765DC11C-9D6D-4F31-9AC7-1EFE6E6D455C}"/>
               </a:ext>
             </a:extLst>
           </p:cNvPr>
@@ -6787,7 +7007,7 @@
           <a:blip r:embed="rId2" cstate="print">
             <a:extLst>
               <a:ext uri="{28A0092B-C50C-407E-A947-70E740481C1C}">
-                <a14:useLocalDpi xmlns:a14="http://schemas.microsoft.com/office/drawing/2010/main" val="0"/>
+                <a14:useLocalDpi xmlns:a14="http://schemas.microsoft.com/office/drawing/2010/main" xmlns="" val="0"/>
               </a:ext>
             </a:extLst>
           </a:blip>
@@ -6808,7 +7028,7 @@
     </p:spTree>
     <p:extLst>
       <p:ext uri="{BB962C8B-B14F-4D97-AF65-F5344CB8AC3E}">
-        <p14:creationId xmlns:p14="http://schemas.microsoft.com/office/powerpoint/2010/main" val="2967959437"/>
+        <p14:creationId xmlns:p14="http://schemas.microsoft.com/office/powerpoint/2010/main" xmlns="" val="2967959437"/>
       </p:ext>
     </p:extLst>
   </p:cSld>
@@ -6840,7 +7060,7 @@
           <p:cNvPr id="2" name="Título 1">
             <a:extLst>
               <a:ext uri="{FF2B5EF4-FFF2-40B4-BE49-F238E27FC236}">
-                <a16:creationId xmlns:a16="http://schemas.microsoft.com/office/drawing/2014/main" id="{CAF4FE63-0F55-4EEF-8842-BB6A3638AF69}"/>
+                <a16:creationId xmlns:a16="http://schemas.microsoft.com/office/drawing/2014/main" xmlns="" id="{CAF4FE63-0F55-4EEF-8842-BB6A3638AF69}"/>
               </a:ext>
             </a:extLst>
           </p:cNvPr>
@@ -6873,7 +7093,7 @@
           <p:cNvPr id="3" name="Marcador de contenido 2">
             <a:extLst>
               <a:ext uri="{FF2B5EF4-FFF2-40B4-BE49-F238E27FC236}">
-                <a16:creationId xmlns:a16="http://schemas.microsoft.com/office/drawing/2014/main" id="{7C013F95-5617-4D6D-B332-E32197B1B877}"/>
+                <a16:creationId xmlns:a16="http://schemas.microsoft.com/office/drawing/2014/main" xmlns="" id="{7C013F95-5617-4D6D-B332-E32197B1B877}"/>
               </a:ext>
             </a:extLst>
           </p:cNvPr>
@@ -6932,7 +7152,7 @@
     </p:spTree>
     <p:extLst>
       <p:ext uri="{BB962C8B-B14F-4D97-AF65-F5344CB8AC3E}">
-        <p14:creationId xmlns:p14="http://schemas.microsoft.com/office/powerpoint/2010/main" val="1323728016"/>
+        <p14:creationId xmlns:p14="http://schemas.microsoft.com/office/powerpoint/2010/main" xmlns="" val="1323728016"/>
       </p:ext>
     </p:extLst>
   </p:cSld>
@@ -6964,7 +7184,7 @@
           <p:cNvPr id="2" name="Título 1">
             <a:extLst>
               <a:ext uri="{FF2B5EF4-FFF2-40B4-BE49-F238E27FC236}">
-                <a16:creationId xmlns:a16="http://schemas.microsoft.com/office/drawing/2014/main" id="{160713EF-2C24-4802-8755-A926FAEF4588}"/>
+                <a16:creationId xmlns:a16="http://schemas.microsoft.com/office/drawing/2014/main" xmlns="" id="{160713EF-2C24-4802-8755-A926FAEF4588}"/>
               </a:ext>
             </a:extLst>
           </p:cNvPr>
@@ -7001,7 +7221,7 @@
           <p:nvPr>
             <p:extLst>
               <p:ext uri="{D42A27DB-BD31-4B8C-83A1-F6EECF244321}">
-                <p14:modId xmlns:p14="http://schemas.microsoft.com/office/powerpoint/2010/main" val="4061205486"/>
+                <p14:modId xmlns:p14="http://schemas.microsoft.com/office/powerpoint/2010/main" xmlns="" val="4061205486"/>
               </p:ext>
             </p:extLst>
           </p:nvPr>
@@ -7018,14 +7238,14 @@
                 <a:gridCol w="7177710">
                   <a:extLst>
                     <a:ext uri="{9D8B030D-6E8A-4147-A177-3AD203B41FA5}">
-                      <a16:colId xmlns:a16="http://schemas.microsoft.com/office/drawing/2014/main" val="20000"/>
+                      <a16:colId xmlns:a16="http://schemas.microsoft.com/office/drawing/2014/main" xmlns="" val="20000"/>
                     </a:ext>
                   </a:extLst>
                 </a:gridCol>
                 <a:gridCol w="2482106">
                   <a:extLst>
                     <a:ext uri="{9D8B030D-6E8A-4147-A177-3AD203B41FA5}">
-                      <a16:colId xmlns:a16="http://schemas.microsoft.com/office/drawing/2014/main" val="20001"/>
+                      <a16:colId xmlns:a16="http://schemas.microsoft.com/office/drawing/2014/main" xmlns="" val="20001"/>
                     </a:ext>
                   </a:extLst>
                 </a:gridCol>
@@ -7179,7 +7399,7 @@
                 </a:tc>
                 <a:extLst>
                   <a:ext uri="{0D108BD9-81ED-4DB2-BD59-A6C34878D82A}">
-                    <a16:rowId xmlns:a16="http://schemas.microsoft.com/office/drawing/2014/main" val="10000"/>
+                    <a16:rowId xmlns:a16="http://schemas.microsoft.com/office/drawing/2014/main" xmlns="" val="10000"/>
                   </a:ext>
                 </a:extLst>
               </a:tr>
@@ -7326,7 +7546,7 @@
                 </a:tc>
                 <a:extLst>
                   <a:ext uri="{0D108BD9-81ED-4DB2-BD59-A6C34878D82A}">
-                    <a16:rowId xmlns:a16="http://schemas.microsoft.com/office/drawing/2014/main" val="10001"/>
+                    <a16:rowId xmlns:a16="http://schemas.microsoft.com/office/drawing/2014/main" xmlns="" val="10001"/>
                   </a:ext>
                 </a:extLst>
               </a:tr>
@@ -7473,7 +7693,7 @@
                 </a:tc>
                 <a:extLst>
                   <a:ext uri="{0D108BD9-81ED-4DB2-BD59-A6C34878D82A}">
-                    <a16:rowId xmlns:a16="http://schemas.microsoft.com/office/drawing/2014/main" val="10002"/>
+                    <a16:rowId xmlns:a16="http://schemas.microsoft.com/office/drawing/2014/main" xmlns="" val="10002"/>
                   </a:ext>
                 </a:extLst>
               </a:tr>
@@ -7641,7 +7861,7 @@
                 </a:tc>
                 <a:extLst>
                   <a:ext uri="{0D108BD9-81ED-4DB2-BD59-A6C34878D82A}">
-                    <a16:rowId xmlns:a16="http://schemas.microsoft.com/office/drawing/2014/main" val="10003"/>
+                    <a16:rowId xmlns:a16="http://schemas.microsoft.com/office/drawing/2014/main" xmlns="" val="10003"/>
                   </a:ext>
                 </a:extLst>
               </a:tr>
@@ -7788,7 +8008,7 @@
                 </a:tc>
                 <a:extLst>
                   <a:ext uri="{0D108BD9-81ED-4DB2-BD59-A6C34878D82A}">
-                    <a16:rowId xmlns:a16="http://schemas.microsoft.com/office/drawing/2014/main" val="10004"/>
+                    <a16:rowId xmlns:a16="http://schemas.microsoft.com/office/drawing/2014/main" xmlns="" val="10004"/>
                   </a:ext>
                 </a:extLst>
               </a:tr>
@@ -7935,7 +8155,7 @@
                 </a:tc>
                 <a:extLst>
                   <a:ext uri="{0D108BD9-81ED-4DB2-BD59-A6C34878D82A}">
-                    <a16:rowId xmlns:a16="http://schemas.microsoft.com/office/drawing/2014/main" val="10005"/>
+                    <a16:rowId xmlns:a16="http://schemas.microsoft.com/office/drawing/2014/main" xmlns="" val="10005"/>
                   </a:ext>
                 </a:extLst>
               </a:tr>
@@ -8103,7 +8323,7 @@
                 </a:tc>
                 <a:extLst>
                   <a:ext uri="{0D108BD9-81ED-4DB2-BD59-A6C34878D82A}">
-                    <a16:rowId xmlns:a16="http://schemas.microsoft.com/office/drawing/2014/main" val="10006"/>
+                    <a16:rowId xmlns:a16="http://schemas.microsoft.com/office/drawing/2014/main" xmlns="" val="10006"/>
                   </a:ext>
                 </a:extLst>
               </a:tr>
@@ -8271,7 +8491,7 @@
                 </a:tc>
                 <a:extLst>
                   <a:ext uri="{0D108BD9-81ED-4DB2-BD59-A6C34878D82A}">
-                    <a16:rowId xmlns:a16="http://schemas.microsoft.com/office/drawing/2014/main" val="10007"/>
+                    <a16:rowId xmlns:a16="http://schemas.microsoft.com/office/drawing/2014/main" xmlns="" val="10007"/>
                   </a:ext>
                 </a:extLst>
               </a:tr>
@@ -8418,7 +8638,7 @@
                 </a:tc>
                 <a:extLst>
                   <a:ext uri="{0D108BD9-81ED-4DB2-BD59-A6C34878D82A}">
-                    <a16:rowId xmlns:a16="http://schemas.microsoft.com/office/drawing/2014/main" val="10008"/>
+                    <a16:rowId xmlns:a16="http://schemas.microsoft.com/office/drawing/2014/main" xmlns="" val="10008"/>
                   </a:ext>
                 </a:extLst>
               </a:tr>
@@ -8565,7 +8785,7 @@
                 </a:tc>
                 <a:extLst>
                   <a:ext uri="{0D108BD9-81ED-4DB2-BD59-A6C34878D82A}">
-                    <a16:rowId xmlns:a16="http://schemas.microsoft.com/office/drawing/2014/main" val="10009"/>
+                    <a16:rowId xmlns:a16="http://schemas.microsoft.com/office/drawing/2014/main" xmlns="" val="10009"/>
                   </a:ext>
                 </a:extLst>
               </a:tr>
@@ -8712,7 +8932,7 @@
                 </a:tc>
                 <a:extLst>
                   <a:ext uri="{0D108BD9-81ED-4DB2-BD59-A6C34878D82A}">
-                    <a16:rowId xmlns:a16="http://schemas.microsoft.com/office/drawing/2014/main" val="10010"/>
+                    <a16:rowId xmlns:a16="http://schemas.microsoft.com/office/drawing/2014/main" xmlns="" val="10010"/>
                   </a:ext>
                 </a:extLst>
               </a:tr>
@@ -8723,7 +8943,7 @@
     </p:spTree>
     <p:extLst>
       <p:ext uri="{BB962C8B-B14F-4D97-AF65-F5344CB8AC3E}">
-        <p14:creationId xmlns:p14="http://schemas.microsoft.com/office/powerpoint/2010/main" val="2337319428"/>
+        <p14:creationId xmlns:p14="http://schemas.microsoft.com/office/powerpoint/2010/main" xmlns="" val="2337319428"/>
       </p:ext>
     </p:extLst>
   </p:cSld>
@@ -8755,7 +8975,7 @@
           <p:cNvPr id="2" name="Título 1">
             <a:extLst>
               <a:ext uri="{FF2B5EF4-FFF2-40B4-BE49-F238E27FC236}">
-                <a16:creationId xmlns:a16="http://schemas.microsoft.com/office/drawing/2014/main" id="{6EB0A5A3-C538-4066-BB19-7EA82C4802A3}"/>
+                <a16:creationId xmlns:a16="http://schemas.microsoft.com/office/drawing/2014/main" xmlns="" id="{6EB0A5A3-C538-4066-BB19-7EA82C4802A3}"/>
               </a:ext>
             </a:extLst>
           </p:cNvPr>
@@ -8788,7 +9008,7 @@
           <p:cNvPr id="3" name="Marcador de contenido 2">
             <a:extLst>
               <a:ext uri="{FF2B5EF4-FFF2-40B4-BE49-F238E27FC236}">
-                <a16:creationId xmlns:a16="http://schemas.microsoft.com/office/drawing/2014/main" id="{C0C1B49A-983E-49F2-B559-B071EE7D9A5F}"/>
+                <a16:creationId xmlns:a16="http://schemas.microsoft.com/office/drawing/2014/main" xmlns="" id="{C0C1B49A-983E-49F2-B559-B071EE7D9A5F}"/>
               </a:ext>
             </a:extLst>
           </p:cNvPr>
@@ -8881,7 +9101,7 @@
     </p:spTree>
     <p:extLst>
       <p:ext uri="{BB962C8B-B14F-4D97-AF65-F5344CB8AC3E}">
-        <p14:creationId xmlns:p14="http://schemas.microsoft.com/office/powerpoint/2010/main" val="1277102518"/>
+        <p14:creationId xmlns:p14="http://schemas.microsoft.com/office/powerpoint/2010/main" xmlns="" val="1277102518"/>
       </p:ext>
     </p:extLst>
   </p:cSld>
@@ -8913,7 +9133,7 @@
           <p:cNvPr id="2" name="Título 1">
             <a:extLst>
               <a:ext uri="{FF2B5EF4-FFF2-40B4-BE49-F238E27FC236}">
-                <a16:creationId xmlns:a16="http://schemas.microsoft.com/office/drawing/2014/main" id="{6EB0A5A3-C538-4066-BB19-7EA82C4802A3}"/>
+                <a16:creationId xmlns:a16="http://schemas.microsoft.com/office/drawing/2014/main" xmlns="" id="{6EB0A5A3-C538-4066-BB19-7EA82C4802A3}"/>
               </a:ext>
             </a:extLst>
           </p:cNvPr>
@@ -8924,7 +9144,12 @@
             <p:ph type="title"/>
           </p:nvPr>
         </p:nvSpPr>
-        <p:spPr/>
+        <p:spPr>
+          <a:xfrm>
+            <a:off x="1456175" y="0"/>
+            <a:ext cx="10018713" cy="1752599"/>
+          </a:xfrm>
+        </p:spPr>
         <p:txBody>
           <a:bodyPr/>
           <a:lstStyle/>
@@ -8941,7 +9166,7 @@
           <p:cNvPr id="3" name="Marcador de contenido 2">
             <a:extLst>
               <a:ext uri="{FF2B5EF4-FFF2-40B4-BE49-F238E27FC236}">
-                <a16:creationId xmlns:a16="http://schemas.microsoft.com/office/drawing/2014/main" id="{C0C1B49A-983E-49F2-B559-B071EE7D9A5F}"/>
+                <a16:creationId xmlns:a16="http://schemas.microsoft.com/office/drawing/2014/main" xmlns="" id="{C0C1B49A-983E-49F2-B559-B071EE7D9A5F}"/>
               </a:ext>
             </a:extLst>
           </p:cNvPr>
@@ -8952,19 +9177,119 @@
             <p:ph idx="1"/>
           </p:nvPr>
         </p:nvSpPr>
-        <p:spPr/>
-        <p:txBody>
-          <a:bodyPr/>
+        <p:spPr>
+          <a:xfrm>
+            <a:off x="1484310" y="998806"/>
+            <a:ext cx="10018713" cy="5627077"/>
+          </a:xfrm>
+        </p:spPr>
+        <p:txBody>
+          <a:bodyPr>
+            <a:normAutofit/>
+          </a:bodyPr>
           <a:lstStyle/>
           <a:p>
-            <a:endParaRPr lang="es-AR" dirty="0"/>
+            <a:pPr>
+              <a:buNone/>
+            </a:pPr>
+            <a:r>
+              <a:rPr lang="es-AR" b="1" dirty="0" smtClean="0"/>
+              <a:t>Documentación: </a:t>
+            </a:r>
+            <a:endParaRPr lang="es-AR" dirty="0" smtClean="0"/>
+          </a:p>
+          <a:p>
+            <a:r>
+              <a:rPr lang="es-AR" dirty="0" smtClean="0"/>
+              <a:t>	De un total de 26 documentos solicitados, </a:t>
+            </a:r>
+            <a:r>
+              <a:rPr lang="es-AR" dirty="0" smtClean="0"/>
+              <a:t>se cuenta con: </a:t>
+            </a:r>
+          </a:p>
+          <a:p>
+            <a:pPr lvl="1"/>
+            <a:r>
+              <a:rPr lang="es-AR" dirty="0" smtClean="0"/>
+              <a:t>11 completos</a:t>
+            </a:r>
+          </a:p>
+          <a:p>
+            <a:pPr lvl="2"/>
+            <a:r>
+              <a:rPr lang="es-AR" dirty="0" smtClean="0"/>
+              <a:t> </a:t>
+            </a:r>
+            <a:r>
+              <a:rPr lang="es-AR" dirty="0" smtClean="0"/>
+              <a:t>4 corresponden a la categoría de Análisis y Diseño; 5 corresponden a la Gestión del Proyecto y 2 a Requerimientos.</a:t>
+            </a:r>
+            <a:endParaRPr lang="es-AR" dirty="0" smtClean="0"/>
+          </a:p>
+          <a:p>
+            <a:pPr lvl="1"/>
+            <a:r>
+              <a:rPr lang="es-AR" dirty="0" smtClean="0"/>
+              <a:t>12 </a:t>
+            </a:r>
+            <a:r>
+              <a:rPr lang="es-AR" dirty="0" smtClean="0"/>
+              <a:t>incompletos pero bastante avanzados (+ 50 </a:t>
+            </a:r>
+            <a:r>
+              <a:rPr lang="es-AR" dirty="0" smtClean="0"/>
+              <a:t>%) </a:t>
+            </a:r>
+          </a:p>
+          <a:p>
+            <a:pPr lvl="2"/>
+            <a:r>
+              <a:rPr lang="es-AR" dirty="0" smtClean="0"/>
+              <a:t>3 corresponden a la categoría de Análisis y Diseño; 6 corresponden a la Gestión del Proyecto; 1 a la Propuesta y 2 a Pruebas.</a:t>
+            </a:r>
+            <a:endParaRPr lang="es-AR" dirty="0" smtClean="0"/>
+          </a:p>
+          <a:p>
+            <a:pPr lvl="1"/>
+            <a:r>
+              <a:rPr lang="es-AR" dirty="0" smtClean="0"/>
+              <a:t>3 incompletos </a:t>
+            </a:r>
+            <a:r>
+              <a:rPr lang="es-AR" dirty="0" smtClean="0"/>
+              <a:t>(todavía no se han realizado</a:t>
+            </a:r>
+            <a:r>
+              <a:rPr lang="es-AR" dirty="0" smtClean="0"/>
+              <a:t>)</a:t>
+            </a:r>
+          </a:p>
+          <a:p>
+            <a:pPr lvl="2"/>
+            <a:r>
+              <a:rPr lang="es-AR" dirty="0" smtClean="0"/>
+              <a:t>Corresponden </a:t>
+            </a:r>
+            <a:r>
+              <a:rPr lang="es-AR" dirty="0" smtClean="0"/>
+              <a:t>a la categoría </a:t>
+            </a:r>
+            <a:r>
+              <a:rPr lang="es-AR" dirty="0" smtClean="0"/>
+              <a:t>Manuales. </a:t>
+            </a:r>
+            <a:r>
+              <a:rPr lang="es-AR" dirty="0" smtClean="0"/>
+              <a:t>	</a:t>
+            </a:r>
           </a:p>
         </p:txBody>
       </p:sp>
     </p:spTree>
     <p:extLst>
       <p:ext uri="{BB962C8B-B14F-4D97-AF65-F5344CB8AC3E}">
-        <p14:creationId xmlns:p14="http://schemas.microsoft.com/office/powerpoint/2010/main" val="421573175"/>
+        <p14:creationId xmlns:p14="http://schemas.microsoft.com/office/powerpoint/2010/main" xmlns="" val="421573175"/>
       </p:ext>
     </p:extLst>
   </p:cSld>
@@ -8996,7 +9321,7 @@
           <p:cNvPr id="2" name="Título 1">
             <a:extLst>
               <a:ext uri="{FF2B5EF4-FFF2-40B4-BE49-F238E27FC236}">
-                <a16:creationId xmlns:a16="http://schemas.microsoft.com/office/drawing/2014/main" id="{6EB0A5A3-C538-4066-BB19-7EA82C4802A3}"/>
+                <a16:creationId xmlns:a16="http://schemas.microsoft.com/office/drawing/2014/main" xmlns="" id="{6EB0A5A3-C538-4066-BB19-7EA82C4802A3}"/>
               </a:ext>
             </a:extLst>
           </p:cNvPr>
@@ -9007,7 +9332,12 @@
             <p:ph type="title"/>
           </p:nvPr>
         </p:nvSpPr>
-        <p:spPr/>
+        <p:spPr>
+          <a:xfrm>
+            <a:off x="1498379" y="0"/>
+            <a:ext cx="10018713" cy="1752599"/>
+          </a:xfrm>
+        </p:spPr>
         <p:txBody>
           <a:bodyPr/>
           <a:lstStyle/>
@@ -9019,35 +9349,30 @@
           </a:p>
         </p:txBody>
       </p:sp>
-      <p:sp>
-        <p:nvSpPr>
-          <p:cNvPr id="3" name="Marcador de contenido 2">
-            <a:extLst>
-              <a:ext uri="{FF2B5EF4-FFF2-40B4-BE49-F238E27FC236}">
-                <a16:creationId xmlns:a16="http://schemas.microsoft.com/office/drawing/2014/main" id="{C0C1B49A-983E-49F2-B559-B071EE7D9A5F}"/>
-              </a:ext>
-            </a:extLst>
-          </p:cNvPr>
-          <p:cNvSpPr>
-            <a:spLocks noGrp="1"/>
-          </p:cNvSpPr>
+      <p:graphicFrame>
+        <p:nvGraphicFramePr>
+          <p:cNvPr id="4" name="3 Marcador de contenido"/>
+          <p:cNvGraphicFramePr>
+            <a:graphicFrameLocks noGrp="1"/>
+          </p:cNvGraphicFramePr>
           <p:nvPr>
             <p:ph idx="1"/>
           </p:nvPr>
-        </p:nvSpPr>
-        <p:spPr/>
-        <p:txBody>
-          <a:bodyPr/>
-          <a:lstStyle/>
-          <a:p>
-            <a:endParaRPr lang="es-AR" dirty="0"/>
-          </a:p>
-        </p:txBody>
-      </p:sp>
+        </p:nvGraphicFramePr>
+        <p:xfrm>
+          <a:off x="1484313" y="1448972"/>
+          <a:ext cx="10360684" cy="4937760"/>
+        </p:xfrm>
+        <a:graphic>
+          <a:graphicData uri="http://schemas.openxmlformats.org/drawingml/2006/chart">
+            <c:chart xmlns:c="http://schemas.openxmlformats.org/drawingml/2006/chart" xmlns:r="http://schemas.openxmlformats.org/officeDocument/2006/relationships" r:id="rId2"/>
+          </a:graphicData>
+        </a:graphic>
+      </p:graphicFrame>
     </p:spTree>
     <p:extLst>
       <p:ext uri="{BB962C8B-B14F-4D97-AF65-F5344CB8AC3E}">
-        <p14:creationId xmlns:p14="http://schemas.microsoft.com/office/powerpoint/2010/main" val="2041564413"/>
+        <p14:creationId xmlns:p14="http://schemas.microsoft.com/office/powerpoint/2010/main" xmlns="" val="2041564413"/>
       </p:ext>
     </p:extLst>
   </p:cSld>
@@ -9058,6 +9383,429 @@
 </file>
 
 <file path=ppt/slides/slide15.xml><?xml version="1.0" encoding="utf-8"?>
+<p:sld xmlns:a="http://schemas.openxmlformats.org/drawingml/2006/main" xmlns:r="http://schemas.openxmlformats.org/officeDocument/2006/relationships" xmlns:p="http://schemas.openxmlformats.org/presentationml/2006/main">
+  <p:cSld>
+    <p:spTree>
+      <p:nvGrpSpPr>
+        <p:cNvPr id="1" name=""/>
+        <p:cNvGrpSpPr/>
+        <p:nvPr/>
+      </p:nvGrpSpPr>
+      <p:grpSpPr>
+        <a:xfrm>
+          <a:off x="0" y="0"/>
+          <a:ext cx="0" cy="0"/>
+          <a:chOff x="0" y="0"/>
+          <a:chExt cx="0" cy="0"/>
+        </a:xfrm>
+      </p:grpSpPr>
+      <p:sp>
+        <p:nvSpPr>
+          <p:cNvPr id="2" name="1 Título"/>
+          <p:cNvSpPr>
+            <a:spLocks noGrp="1"/>
+          </p:cNvSpPr>
+          <p:nvPr>
+            <p:ph type="title"/>
+          </p:nvPr>
+        </p:nvSpPr>
+        <p:spPr>
+          <a:xfrm>
+            <a:off x="1484311" y="0"/>
+            <a:ext cx="10018713" cy="1752599"/>
+          </a:xfrm>
+        </p:spPr>
+        <p:txBody>
+          <a:bodyPr/>
+          <a:lstStyle/>
+          <a:p>
+            <a:r>
+              <a:rPr lang="es-AR" dirty="0" smtClean="0"/>
+              <a:t>Estado del Proyecto </a:t>
+            </a:r>
+            <a:r>
+              <a:rPr lang="es-AR" dirty="0" smtClean="0"/>
+              <a:t>III</a:t>
+            </a:r>
+            <a:endParaRPr lang="es-AR" dirty="0"/>
+          </a:p>
+        </p:txBody>
+      </p:sp>
+      <p:sp>
+        <p:nvSpPr>
+          <p:cNvPr id="3" name="2 Marcador de contenido"/>
+          <p:cNvSpPr>
+            <a:spLocks noGrp="1"/>
+          </p:cNvSpPr>
+          <p:nvPr>
+            <p:ph idx="1"/>
+          </p:nvPr>
+        </p:nvSpPr>
+        <p:spPr>
+          <a:xfrm>
+            <a:off x="1498378" y="492370"/>
+            <a:ext cx="10018713" cy="5008100"/>
+          </a:xfrm>
+        </p:spPr>
+        <p:txBody>
+          <a:bodyPr>
+            <a:normAutofit/>
+          </a:bodyPr>
+          <a:lstStyle/>
+          <a:p>
+            <a:pPr>
+              <a:buNone/>
+            </a:pPr>
+            <a:endParaRPr lang="es-AR" b="1" dirty="0" smtClean="0"/>
+          </a:p>
+          <a:p>
+            <a:pPr>
+              <a:buNone/>
+            </a:pPr>
+            <a:r>
+              <a:rPr lang="es-AR" b="1" dirty="0" smtClean="0"/>
+              <a:t>Pruebas</a:t>
+            </a:r>
+            <a:r>
+              <a:rPr lang="es-AR" b="1" dirty="0" smtClean="0"/>
+              <a:t>: </a:t>
+            </a:r>
+            <a:endParaRPr lang="es-AR" dirty="0" smtClean="0"/>
+          </a:p>
+          <a:p>
+            <a:r>
+              <a:rPr lang="es-AR" dirty="0" smtClean="0"/>
+              <a:t>De un total de 17 CU </a:t>
+            </a:r>
+            <a:r>
+              <a:rPr lang="es-AR" dirty="0" smtClean="0"/>
+              <a:t>, se cuenta con lo siguiente:</a:t>
+            </a:r>
+          </a:p>
+          <a:p>
+            <a:pPr lvl="1"/>
+            <a:r>
+              <a:rPr lang="es-AR" dirty="0" smtClean="0"/>
+              <a:t> </a:t>
+            </a:r>
+            <a:r>
+              <a:rPr lang="es-AR" dirty="0" smtClean="0"/>
+              <a:t>7 de ellos han sido implementados con pruebas, </a:t>
+            </a:r>
+            <a:endParaRPr lang="es-AR" dirty="0" smtClean="0"/>
+          </a:p>
+          <a:p>
+            <a:pPr lvl="1"/>
+            <a:r>
+              <a:rPr lang="es-AR" dirty="0" smtClean="0"/>
+              <a:t>6 </a:t>
+            </a:r>
+            <a:r>
+              <a:rPr lang="es-AR" dirty="0" smtClean="0"/>
+              <a:t>se encuentran implementados sin pruebas y </a:t>
+            </a:r>
+            <a:endParaRPr lang="es-AR" dirty="0" smtClean="0"/>
+          </a:p>
+          <a:p>
+            <a:pPr lvl="1"/>
+            <a:r>
+              <a:rPr lang="es-AR" dirty="0" smtClean="0"/>
+              <a:t>4 </a:t>
+            </a:r>
+            <a:r>
+              <a:rPr lang="es-AR" dirty="0" smtClean="0"/>
+              <a:t>se encuentran sin implementar. </a:t>
+            </a:r>
+            <a:endParaRPr lang="es-AR" dirty="0" smtClean="0"/>
+          </a:p>
+          <a:p>
+            <a:pPr lvl="1"/>
+            <a:r>
+              <a:rPr lang="es-AR" dirty="0" smtClean="0"/>
+              <a:t> </a:t>
+            </a:r>
+            <a:r>
+              <a:rPr lang="es-AR" dirty="0" smtClean="0"/>
+              <a:t>Sumando los CU implementados con y sin pruebas, tenemos el 76 % del sistema desarrollado. </a:t>
+            </a:r>
+          </a:p>
+          <a:p>
+            <a:pPr>
+              <a:buNone/>
+            </a:pPr>
+            <a:endParaRPr lang="es-AR" dirty="0" smtClean="0"/>
+          </a:p>
+          <a:p>
+            <a:endParaRPr lang="es-AR" dirty="0"/>
+          </a:p>
+        </p:txBody>
+      </p:sp>
+      <p:graphicFrame>
+        <p:nvGraphicFramePr>
+          <p:cNvPr id="4" name="3 Gráfico"/>
+          <p:cNvGraphicFramePr/>
+          <p:nvPr/>
+        </p:nvGraphicFramePr>
+        <p:xfrm>
+          <a:off x="4149970" y="3854547"/>
+          <a:ext cx="5664592" cy="3172265"/>
+        </p:xfrm>
+        <a:graphic>
+          <a:graphicData uri="http://schemas.openxmlformats.org/drawingml/2006/chart">
+            <c:chart xmlns:c="http://schemas.openxmlformats.org/drawingml/2006/chart" xmlns:r="http://schemas.openxmlformats.org/officeDocument/2006/relationships" r:id="rId2"/>
+          </a:graphicData>
+        </a:graphic>
+      </p:graphicFrame>
+    </p:spTree>
+  </p:cSld>
+  <p:clrMapOvr>
+    <a:masterClrMapping/>
+  </p:clrMapOvr>
+</p:sld>
+</file>
+
+<file path=ppt/slides/slide16.xml><?xml version="1.0" encoding="utf-8"?>
+<p:sld xmlns:a="http://schemas.openxmlformats.org/drawingml/2006/main" xmlns:r="http://schemas.openxmlformats.org/officeDocument/2006/relationships" xmlns:p="http://schemas.openxmlformats.org/presentationml/2006/main">
+  <p:cSld>
+    <p:spTree>
+      <p:nvGrpSpPr>
+        <p:cNvPr id="1" name=""/>
+        <p:cNvGrpSpPr/>
+        <p:nvPr/>
+      </p:nvGrpSpPr>
+      <p:grpSpPr>
+        <a:xfrm>
+          <a:off x="0" y="0"/>
+          <a:ext cx="0" cy="0"/>
+          <a:chOff x="0" y="0"/>
+          <a:chExt cx="0" cy="0"/>
+        </a:xfrm>
+      </p:grpSpPr>
+      <p:sp>
+        <p:nvSpPr>
+          <p:cNvPr id="2" name="1 Título"/>
+          <p:cNvSpPr>
+            <a:spLocks noGrp="1"/>
+          </p:cNvSpPr>
+          <p:nvPr>
+            <p:ph type="title"/>
+          </p:nvPr>
+        </p:nvSpPr>
+        <p:spPr>
+          <a:xfrm>
+            <a:off x="1484311" y="0"/>
+            <a:ext cx="10018713" cy="1752599"/>
+          </a:xfrm>
+        </p:spPr>
+        <p:txBody>
+          <a:bodyPr/>
+          <a:lstStyle/>
+          <a:p>
+            <a:r>
+              <a:rPr lang="es-AR" dirty="0" smtClean="0"/>
+              <a:t>Estado del </a:t>
+            </a:r>
+            <a:r>
+              <a:rPr lang="es-AR" dirty="0" smtClean="0"/>
+              <a:t>Proyecto IV</a:t>
+            </a:r>
+            <a:endParaRPr lang="es-AR" dirty="0"/>
+          </a:p>
+        </p:txBody>
+      </p:sp>
+      <p:sp>
+        <p:nvSpPr>
+          <p:cNvPr id="3" name="2 Marcador de contenido"/>
+          <p:cNvSpPr>
+            <a:spLocks noGrp="1"/>
+          </p:cNvSpPr>
+          <p:nvPr>
+            <p:ph idx="1"/>
+          </p:nvPr>
+        </p:nvSpPr>
+        <p:spPr>
+          <a:xfrm>
+            <a:off x="1484310" y="661182"/>
+            <a:ext cx="10018713" cy="5008100"/>
+          </a:xfrm>
+        </p:spPr>
+        <p:txBody>
+          <a:bodyPr>
+            <a:normAutofit/>
+          </a:bodyPr>
+          <a:lstStyle/>
+          <a:p>
+            <a:pPr>
+              <a:buNone/>
+            </a:pPr>
+            <a:endParaRPr lang="es-AR" b="1" dirty="0" smtClean="0"/>
+          </a:p>
+          <a:p>
+            <a:pPr>
+              <a:buNone/>
+            </a:pPr>
+            <a:endParaRPr lang="es-AR" b="1" dirty="0" smtClean="0"/>
+          </a:p>
+          <a:p>
+            <a:pPr>
+              <a:buNone/>
+            </a:pPr>
+            <a:r>
+              <a:rPr lang="es-AR" b="1" dirty="0" smtClean="0"/>
+              <a:t>Pruebas</a:t>
+            </a:r>
+            <a:r>
+              <a:rPr lang="es-AR" b="1" dirty="0" smtClean="0"/>
+              <a:t>: </a:t>
+            </a:r>
+            <a:endParaRPr lang="es-AR" dirty="0" smtClean="0"/>
+          </a:p>
+          <a:p>
+            <a:r>
+              <a:rPr lang="es-AR" dirty="0" smtClean="0"/>
+              <a:t>En </a:t>
+            </a:r>
+            <a:r>
+              <a:rPr lang="es-AR" dirty="0" smtClean="0"/>
+              <a:t>cuanto a las pruebas realizadas hasta el </a:t>
+            </a:r>
+            <a:r>
+              <a:rPr lang="es-AR" dirty="0" smtClean="0"/>
+              <a:t>momento: </a:t>
+            </a:r>
+          </a:p>
+          <a:p>
+            <a:pPr lvl="1"/>
+            <a:r>
+              <a:rPr lang="es-AR" dirty="0" smtClean="0"/>
+              <a:t>7 </a:t>
+            </a:r>
+            <a:r>
+              <a:rPr lang="es-AR" dirty="0" smtClean="0"/>
+              <a:t>CU que han sido implementados, 2 de las pruebas han resultado con éxito (pruebas iniciales y de regresión). </a:t>
+            </a:r>
+            <a:endParaRPr lang="es-AR" dirty="0" smtClean="0"/>
+          </a:p>
+          <a:p>
+            <a:pPr lvl="1"/>
+            <a:r>
+              <a:rPr lang="es-AR" dirty="0" smtClean="0"/>
+              <a:t>4 </a:t>
+            </a:r>
+            <a:r>
+              <a:rPr lang="es-AR" dirty="0" smtClean="0"/>
+              <a:t>de ellos no presentan errores solo que hasta no tener la pantalla principal del Sistema, no se puede agregar funcionalidad al botón volver a Inicio. Por lo tanto no han sido aprobados oficialmente.  </a:t>
+            </a:r>
+            <a:endParaRPr lang="es-AR" dirty="0" smtClean="0"/>
+          </a:p>
+          <a:p>
+            <a:pPr lvl="1"/>
+            <a:r>
+              <a:rPr lang="es-AR" dirty="0" smtClean="0"/>
+              <a:t>1 </a:t>
+            </a:r>
+            <a:r>
+              <a:rPr lang="es-AR" dirty="0" smtClean="0"/>
+              <a:t>solo tiene errores que se deben corregir, que han surgido de las pruebas de regresión. </a:t>
+            </a:r>
+          </a:p>
+          <a:p>
+            <a:pPr>
+              <a:buNone/>
+            </a:pPr>
+            <a:endParaRPr lang="es-AR" dirty="0" smtClean="0"/>
+          </a:p>
+          <a:p>
+            <a:endParaRPr lang="es-AR" dirty="0"/>
+          </a:p>
+        </p:txBody>
+      </p:sp>
+    </p:spTree>
+  </p:cSld>
+  <p:clrMapOvr>
+    <a:masterClrMapping/>
+  </p:clrMapOvr>
+</p:sld>
+</file>
+
+<file path=ppt/slides/slide17.xml><?xml version="1.0" encoding="utf-8"?>
+<p:sld xmlns:a="http://schemas.openxmlformats.org/drawingml/2006/main" xmlns:r="http://schemas.openxmlformats.org/officeDocument/2006/relationships" xmlns:p="http://schemas.openxmlformats.org/presentationml/2006/main">
+  <p:cSld>
+    <p:spTree>
+      <p:nvGrpSpPr>
+        <p:cNvPr id="1" name=""/>
+        <p:cNvGrpSpPr/>
+        <p:nvPr/>
+      </p:nvGrpSpPr>
+      <p:grpSpPr>
+        <a:xfrm>
+          <a:off x="0" y="0"/>
+          <a:ext cx="0" cy="0"/>
+          <a:chOff x="0" y="0"/>
+          <a:chExt cx="0" cy="0"/>
+        </a:xfrm>
+      </p:grpSpPr>
+      <p:sp>
+        <p:nvSpPr>
+          <p:cNvPr id="2" name="1 Título"/>
+          <p:cNvSpPr>
+            <a:spLocks noGrp="1"/>
+          </p:cNvSpPr>
+          <p:nvPr>
+            <p:ph type="title"/>
+          </p:nvPr>
+        </p:nvSpPr>
+        <p:spPr>
+          <a:xfrm>
+            <a:off x="1456176" y="0"/>
+            <a:ext cx="10018713" cy="1752599"/>
+          </a:xfrm>
+        </p:spPr>
+        <p:txBody>
+          <a:bodyPr/>
+          <a:lstStyle/>
+          <a:p>
+            <a:r>
+              <a:rPr lang="es-AR" dirty="0" smtClean="0"/>
+              <a:t>Estado del Proyecto </a:t>
+            </a:r>
+            <a:r>
+              <a:rPr lang="es-AR" dirty="0" smtClean="0"/>
+              <a:t>V</a:t>
+            </a:r>
+            <a:endParaRPr lang="es-AR" dirty="0"/>
+          </a:p>
+        </p:txBody>
+      </p:sp>
+      <p:graphicFrame>
+        <p:nvGraphicFramePr>
+          <p:cNvPr id="4" name="3 Marcador de contenido"/>
+          <p:cNvGraphicFramePr>
+            <a:graphicFrameLocks noGrp="1"/>
+          </p:cNvGraphicFramePr>
+          <p:nvPr>
+            <p:ph idx="1"/>
+          </p:nvPr>
+        </p:nvGraphicFramePr>
+        <p:xfrm>
+          <a:off x="2377440" y="1603718"/>
+          <a:ext cx="9144000" cy="4965894"/>
+        </p:xfrm>
+        <a:graphic>
+          <a:graphicData uri="http://schemas.openxmlformats.org/drawingml/2006/chart">
+            <c:chart xmlns:c="http://schemas.openxmlformats.org/drawingml/2006/chart" xmlns:r="http://schemas.openxmlformats.org/officeDocument/2006/relationships" r:id="rId2"/>
+          </a:graphicData>
+        </a:graphic>
+      </p:graphicFrame>
+    </p:spTree>
+  </p:cSld>
+  <p:clrMapOvr>
+    <a:masterClrMapping/>
+  </p:clrMapOvr>
+</p:sld>
+</file>
+
+<file path=ppt/slides/slide18.xml><?xml version="1.0" encoding="utf-8"?>
 <p:sld xmlns:a="http://schemas.openxmlformats.org/drawingml/2006/main" xmlns:r="http://schemas.openxmlformats.org/officeDocument/2006/relationships" xmlns:p="http://schemas.openxmlformats.org/presentationml/2006/main">
   <p:cSld>
     <p:spTree>
@@ -9128,339 +9876,7 @@
     </p:spTree>
     <p:extLst>
       <p:ext uri="{BB962C8B-B14F-4D97-AF65-F5344CB8AC3E}">
-        <p14:creationId xmlns:p14="http://schemas.microsoft.com/office/powerpoint/2010/main" val="1433634853"/>
-      </p:ext>
-    </p:extLst>
-  </p:cSld>
-  <p:clrMapOvr>
-    <a:masterClrMapping/>
-  </p:clrMapOvr>
-</p:sld>
-</file>
-
-<file path=ppt/slides/slide16.xml><?xml version="1.0" encoding="utf-8"?>
-<p:sld xmlns:a="http://schemas.openxmlformats.org/drawingml/2006/main" xmlns:r="http://schemas.openxmlformats.org/officeDocument/2006/relationships" xmlns:p="http://schemas.openxmlformats.org/presentationml/2006/main">
-  <p:cSld>
-    <p:spTree>
-      <p:nvGrpSpPr>
-        <p:cNvPr id="1" name=""/>
-        <p:cNvGrpSpPr/>
-        <p:nvPr/>
-      </p:nvGrpSpPr>
-      <p:grpSpPr>
-        <a:xfrm>
-          <a:off x="0" y="0"/>
-          <a:ext cx="0" cy="0"/>
-          <a:chOff x="0" y="0"/>
-          <a:chExt cx="0" cy="0"/>
-        </a:xfrm>
-      </p:grpSpPr>
-      <p:sp>
-        <p:nvSpPr>
-          <p:cNvPr id="2" name="Título 1"/>
-          <p:cNvSpPr>
-            <a:spLocks noGrp="1"/>
-          </p:cNvSpPr>
-          <p:nvPr>
-            <p:ph type="title"/>
-          </p:nvPr>
-        </p:nvSpPr>
-        <p:spPr>
-          <a:xfrm>
-            <a:off x="1484311" y="-185055"/>
-            <a:ext cx="10018713" cy="1752599"/>
-          </a:xfrm>
-        </p:spPr>
-        <p:txBody>
-          <a:bodyPr/>
-          <a:lstStyle/>
-          <a:p>
-            <a:r>
-              <a:rPr lang="es-AR" dirty="0"/>
-              <a:t>Riesgos a futuro</a:t>
-            </a:r>
-          </a:p>
-        </p:txBody>
-      </p:sp>
-      <p:pic>
-        <p:nvPicPr>
-          <p:cNvPr id="4" name="Marcador de contenido 3"/>
-          <p:cNvPicPr>
-            <a:picLocks noGrp="1" noChangeAspect="1"/>
-          </p:cNvPicPr>
-          <p:nvPr>
-            <p:ph idx="1"/>
-          </p:nvPr>
-        </p:nvPicPr>
-        <p:blipFill>
-          <a:blip r:embed="rId2" cstate="print"/>
-          <a:stretch>
-            <a:fillRect/>
-          </a:stretch>
-        </p:blipFill>
-        <p:spPr>
-          <a:xfrm>
-            <a:off x="2038126" y="1494970"/>
-            <a:ext cx="10021721" cy="4920344"/>
-          </a:xfrm>
-          <a:prstGeom prst="rect">
-            <a:avLst/>
-          </a:prstGeom>
-        </p:spPr>
-      </p:pic>
-    </p:spTree>
-    <p:extLst>
-      <p:ext uri="{BB962C8B-B14F-4D97-AF65-F5344CB8AC3E}">
-        <p14:creationId xmlns:p14="http://schemas.microsoft.com/office/powerpoint/2010/main" val="3954742130"/>
-      </p:ext>
-    </p:extLst>
-  </p:cSld>
-  <p:clrMapOvr>
-    <a:masterClrMapping/>
-  </p:clrMapOvr>
-</p:sld>
-</file>
-
-<file path=ppt/slides/slide17.xml><?xml version="1.0" encoding="utf-8"?>
-<p:sld xmlns:a="http://schemas.openxmlformats.org/drawingml/2006/main" xmlns:r="http://schemas.openxmlformats.org/officeDocument/2006/relationships" xmlns:p="http://schemas.openxmlformats.org/presentationml/2006/main">
-  <p:cSld>
-    <p:spTree>
-      <p:nvGrpSpPr>
-        <p:cNvPr id="1" name=""/>
-        <p:cNvGrpSpPr/>
-        <p:nvPr/>
-      </p:nvGrpSpPr>
-      <p:grpSpPr>
-        <a:xfrm>
-          <a:off x="0" y="0"/>
-          <a:ext cx="0" cy="0"/>
-          <a:chOff x="0" y="0"/>
-          <a:chExt cx="0" cy="0"/>
-        </a:xfrm>
-      </p:grpSpPr>
-      <p:sp>
-        <p:nvSpPr>
-          <p:cNvPr id="2" name="Título 1">
-            <a:extLst>
-              <a:ext uri="{FF2B5EF4-FFF2-40B4-BE49-F238E27FC236}">
-                <a16:creationId xmlns:a16="http://schemas.microsoft.com/office/drawing/2014/main" id="{2458DF6C-430A-4FE6-BEE9-9873D9821768}"/>
-              </a:ext>
-            </a:extLst>
-          </p:cNvPr>
-          <p:cNvSpPr>
-            <a:spLocks noGrp="1"/>
-          </p:cNvSpPr>
-          <p:nvPr>
-            <p:ph type="title"/>
-          </p:nvPr>
-        </p:nvSpPr>
-        <p:spPr>
-          <a:xfrm>
-            <a:off x="1484310" y="392205"/>
-            <a:ext cx="10018713" cy="1349188"/>
-          </a:xfrm>
-        </p:spPr>
-        <p:txBody>
-          <a:bodyPr/>
-          <a:lstStyle/>
-          <a:p>
-            <a:r>
-              <a:rPr lang="es-AR" dirty="0"/>
-              <a:t>Cuestiones a definir I</a:t>
-            </a:r>
-          </a:p>
-        </p:txBody>
-      </p:sp>
-      <p:sp>
-        <p:nvSpPr>
-          <p:cNvPr id="3" name="Marcador de contenido 2">
-            <a:extLst>
-              <a:ext uri="{FF2B5EF4-FFF2-40B4-BE49-F238E27FC236}">
-                <a16:creationId xmlns:a16="http://schemas.microsoft.com/office/drawing/2014/main" id="{74D85991-244B-440C-9B99-B3E7D6695501}"/>
-              </a:ext>
-            </a:extLst>
-          </p:cNvPr>
-          <p:cNvSpPr>
-            <a:spLocks noGrp="1"/>
-          </p:cNvSpPr>
-          <p:nvPr>
-            <p:ph idx="1"/>
-          </p:nvPr>
-        </p:nvSpPr>
-        <p:spPr>
-          <a:xfrm>
-            <a:off x="1484310" y="1443318"/>
-            <a:ext cx="10018713" cy="4347883"/>
-          </a:xfrm>
-        </p:spPr>
-        <p:txBody>
-          <a:bodyPr>
-            <a:normAutofit/>
-          </a:bodyPr>
-          <a:lstStyle/>
-          <a:p>
-            <a:r>
-              <a:rPr lang="es-AR" dirty="0"/>
-              <a:t>Fechas límite:</a:t>
-            </a:r>
-          </a:p>
-          <a:p>
-            <a:pPr lvl="1"/>
-            <a:r>
-              <a:rPr lang="es-AR" dirty="0"/>
-              <a:t>¿Un docente debe poder cargar un programa fuera de término? ¿Existiría alguna “marca” sobre el programa cuando esto suceda?</a:t>
-            </a:r>
-          </a:p>
-          <a:p>
-            <a:pPr lvl="1"/>
-            <a:r>
-              <a:rPr lang="es-AR" dirty="0"/>
-              <a:t>¿Qué hacer cuando se le envíen X notificaciones a un docente y este no responda ni realice la carga? ¿Advertencia a algún superior?</a:t>
-            </a:r>
-          </a:p>
-          <a:p>
-            <a:r>
-              <a:rPr lang="es-AR" dirty="0"/>
-              <a:t>Vigencia de un programa</a:t>
-            </a:r>
-          </a:p>
-          <a:p>
-            <a:r>
-              <a:rPr lang="es-AR" dirty="0"/>
-              <a:t>¿Carga de programas por fuera del Sistema?</a:t>
-            </a:r>
-          </a:p>
-        </p:txBody>
-      </p:sp>
-    </p:spTree>
-    <p:extLst>
-      <p:ext uri="{BB962C8B-B14F-4D97-AF65-F5344CB8AC3E}">
-        <p14:creationId xmlns:p14="http://schemas.microsoft.com/office/powerpoint/2010/main" val="1461227207"/>
-      </p:ext>
-    </p:extLst>
-  </p:cSld>
-  <p:clrMapOvr>
-    <a:masterClrMapping/>
-  </p:clrMapOvr>
-</p:sld>
-</file>
-
-<file path=ppt/slides/slide18.xml><?xml version="1.0" encoding="utf-8"?>
-<p:sld xmlns:a="http://schemas.openxmlformats.org/drawingml/2006/main" xmlns:r="http://schemas.openxmlformats.org/officeDocument/2006/relationships" xmlns:p="http://schemas.openxmlformats.org/presentationml/2006/main">
-  <p:cSld>
-    <p:spTree>
-      <p:nvGrpSpPr>
-        <p:cNvPr id="1" name=""/>
-        <p:cNvGrpSpPr/>
-        <p:nvPr/>
-      </p:nvGrpSpPr>
-      <p:grpSpPr>
-        <a:xfrm>
-          <a:off x="0" y="0"/>
-          <a:ext cx="0" cy="0"/>
-          <a:chOff x="0" y="0"/>
-          <a:chExt cx="0" cy="0"/>
-        </a:xfrm>
-      </p:grpSpPr>
-      <p:sp>
-        <p:nvSpPr>
-          <p:cNvPr id="2" name="Título 1">
-            <a:extLst>
-              <a:ext uri="{FF2B5EF4-FFF2-40B4-BE49-F238E27FC236}">
-                <a16:creationId xmlns:a16="http://schemas.microsoft.com/office/drawing/2014/main" id="{4D3D3C5E-AD47-4DAC-8A45-DADDC1B8253D}"/>
-              </a:ext>
-            </a:extLst>
-          </p:cNvPr>
-          <p:cNvSpPr>
-            <a:spLocks noGrp="1"/>
-          </p:cNvSpPr>
-          <p:nvPr>
-            <p:ph type="title"/>
-          </p:nvPr>
-        </p:nvSpPr>
-        <p:spPr>
-          <a:xfrm>
-            <a:off x="1582922" y="504265"/>
-            <a:ext cx="10018713" cy="1125068"/>
-          </a:xfrm>
-        </p:spPr>
-        <p:txBody>
-          <a:bodyPr/>
-          <a:lstStyle/>
-          <a:p>
-            <a:r>
-              <a:rPr lang="es-AR" dirty="0"/>
-              <a:t>Cuestiones a definir II</a:t>
-            </a:r>
-          </a:p>
-        </p:txBody>
-      </p:sp>
-      <p:sp>
-        <p:nvSpPr>
-          <p:cNvPr id="3" name="Marcador de contenido 2">
-            <a:extLst>
-              <a:ext uri="{FF2B5EF4-FFF2-40B4-BE49-F238E27FC236}">
-                <a16:creationId xmlns:a16="http://schemas.microsoft.com/office/drawing/2014/main" id="{6ADE1AAD-CE76-427C-B709-D78D3DFFCFC0}"/>
-              </a:ext>
-            </a:extLst>
-          </p:cNvPr>
-          <p:cNvSpPr>
-            <a:spLocks noGrp="1"/>
-          </p:cNvSpPr>
-          <p:nvPr>
-            <p:ph idx="1"/>
-          </p:nvPr>
-        </p:nvSpPr>
-        <p:spPr>
-          <a:xfrm>
-            <a:off x="1484310" y="1748119"/>
-            <a:ext cx="10018713" cy="4043082"/>
-          </a:xfrm>
-        </p:spPr>
-        <p:txBody>
-          <a:bodyPr>
-            <a:normAutofit/>
-          </a:bodyPr>
-          <a:lstStyle/>
-          <a:p>
-            <a:r>
-              <a:rPr lang="es-AR" dirty="0"/>
-              <a:t>Departamentos – Divisiones</a:t>
-            </a:r>
-          </a:p>
-          <a:p>
-            <a:r>
-              <a:rPr lang="es-AR" dirty="0"/>
-              <a:t>¿Un docente puede aparecer que se encarga tanto en la teoría como en la práctica? ¿O solo puede estar en una de ellas en el programa de la asignatura? *AGREGAR IMAGEN*</a:t>
-            </a:r>
-          </a:p>
-          <a:p>
-            <a:r>
-              <a:rPr lang="es-AR" dirty="0"/>
-              <a:t>Docente responsable e integrante</a:t>
-            </a:r>
-          </a:p>
-          <a:p>
-            <a:pPr lvl="1"/>
-            <a:r>
-              <a:rPr lang="es-AR" dirty="0"/>
-              <a:t>¿Hay un (y solo un) docente responsable y el resto son integrantes? ¿</a:t>
-            </a:r>
-            <a:r>
-              <a:rPr lang="es-AR" dirty="0" err="1"/>
-              <a:t>Haycasos</a:t>
-            </a:r>
-            <a:r>
-              <a:rPr lang="es-AR" dirty="0"/>
-              <a:t> excepcionales con varios responsables? ¿Quién debería cargar el programa?</a:t>
-            </a:r>
-          </a:p>
-        </p:txBody>
-      </p:sp>
-    </p:spTree>
-    <p:extLst>
-      <p:ext uri="{BB962C8B-B14F-4D97-AF65-F5344CB8AC3E}">
-        <p14:creationId xmlns:p14="http://schemas.microsoft.com/office/powerpoint/2010/main" val="4235005633"/>
+        <p14:creationId xmlns:p14="http://schemas.microsoft.com/office/powerpoint/2010/main" xmlns="" val="1433634853"/>
       </p:ext>
     </p:extLst>
   </p:cSld>
@@ -9489,13 +9905,7 @@
       </p:grpSpPr>
       <p:sp>
         <p:nvSpPr>
-          <p:cNvPr id="2" name="Título 1">
-            <a:extLst>
-              <a:ext uri="{FF2B5EF4-FFF2-40B4-BE49-F238E27FC236}">
-                <a16:creationId xmlns:a16="http://schemas.microsoft.com/office/drawing/2014/main" id="{2458DF6C-430A-4FE6-BEE9-9873D9821768}"/>
-              </a:ext>
-            </a:extLst>
-          </p:cNvPr>
+          <p:cNvPr id="2" name="Título 1"/>
           <p:cNvSpPr>
             <a:spLocks noGrp="1"/>
           </p:cNvSpPr>
@@ -9505,8 +9915,8 @@
         </p:nvSpPr>
         <p:spPr>
           <a:xfrm>
-            <a:off x="1600852" y="394448"/>
-            <a:ext cx="10018713" cy="1470211"/>
+            <a:off x="1484311" y="-185055"/>
+            <a:ext cx="10018713" cy="1752599"/>
           </a:xfrm>
         </p:spPr>
         <p:txBody>
@@ -9515,88 +9925,41 @@
           <a:p>
             <a:r>
               <a:rPr lang="es-AR" dirty="0"/>
-              <a:t>Cuestiones a Definir III</a:t>
-            </a:r>
-          </a:p>
-        </p:txBody>
-      </p:sp>
-      <p:sp>
-        <p:nvSpPr>
-          <p:cNvPr id="3" name="Marcador de contenido 2">
-            <a:extLst>
-              <a:ext uri="{FF2B5EF4-FFF2-40B4-BE49-F238E27FC236}">
-                <a16:creationId xmlns:a16="http://schemas.microsoft.com/office/drawing/2014/main" id="{74D85991-244B-440C-9B99-B3E7D6695501}"/>
-              </a:ext>
-            </a:extLst>
-          </p:cNvPr>
-          <p:cNvSpPr>
-            <a:spLocks noGrp="1"/>
-          </p:cNvSpPr>
+              <a:t>Riesgos a futuro</a:t>
+            </a:r>
+          </a:p>
+        </p:txBody>
+      </p:sp>
+      <p:pic>
+        <p:nvPicPr>
+          <p:cNvPr id="4" name="Marcador de contenido 3"/>
+          <p:cNvPicPr>
+            <a:picLocks noGrp="1" noChangeAspect="1"/>
+          </p:cNvPicPr>
           <p:nvPr>
             <p:ph idx="1"/>
           </p:nvPr>
-        </p:nvSpPr>
+        </p:nvPicPr>
+        <p:blipFill>
+          <a:blip r:embed="rId2" cstate="print"/>
+          <a:stretch>
+            <a:fillRect/>
+          </a:stretch>
+        </p:blipFill>
         <p:spPr>
           <a:xfrm>
-            <a:off x="1600852" y="1990164"/>
-            <a:ext cx="10018713" cy="4347883"/>
+            <a:off x="2038126" y="1494970"/>
+            <a:ext cx="10021721" cy="4920344"/>
           </a:xfrm>
+          <a:prstGeom prst="rect">
+            <a:avLst/>
+          </a:prstGeom>
         </p:spPr>
-        <p:txBody>
-          <a:bodyPr>
-            <a:normAutofit/>
-          </a:bodyPr>
-          <a:lstStyle/>
-          <a:p>
-            <a:r>
-              <a:rPr lang="es-AR" dirty="0"/>
-              <a:t>Revisión de Programas (sólo datos que revisan, previsualizar PDF, saltar algún control)</a:t>
-            </a:r>
-          </a:p>
-          <a:p>
-            <a:pPr lvl="1"/>
-            <a:r>
-              <a:rPr lang="es-AR" dirty="0"/>
-              <a:t>Los datos formales (código de carrera, nombre de carrera, nombre de asignatura, etc.) se encontrarán precargados por Secretaría Académica y no serán modificables por el profesor.</a:t>
-            </a:r>
-          </a:p>
-          <a:p>
-            <a:r>
-              <a:rPr lang="es-AR" dirty="0"/>
-              <a:t>Atributos "</a:t>
-            </a:r>
-            <a:r>
-              <a:rPr lang="es-AR" dirty="0" err="1"/>
-              <a:t>anioCarrera</a:t>
-            </a:r>
-            <a:r>
-              <a:rPr lang="es-AR" dirty="0"/>
-              <a:t>" y "</a:t>
-            </a:r>
-            <a:r>
-              <a:rPr lang="es-AR" dirty="0" err="1"/>
-              <a:t>regimenCursada</a:t>
-            </a:r>
-            <a:r>
-              <a:rPr lang="es-AR" dirty="0"/>
-              <a:t>" de la tabla PROGRAMA</a:t>
-            </a:r>
-          </a:p>
-          <a:p>
-            <a:r>
-              <a:rPr lang="es-AR" dirty="0"/>
-              <a:t>Horas de cursada de Teoría y de Práctica</a:t>
-            </a:r>
-          </a:p>
-          <a:p>
-            <a:endParaRPr lang="es-AR" dirty="0"/>
-          </a:p>
-        </p:txBody>
-      </p:sp>
+      </p:pic>
     </p:spTree>
     <p:extLst>
       <p:ext uri="{BB962C8B-B14F-4D97-AF65-F5344CB8AC3E}">
-        <p14:creationId xmlns:p14="http://schemas.microsoft.com/office/powerpoint/2010/main" val="258829745"/>
+        <p14:creationId xmlns:p14="http://schemas.microsoft.com/office/powerpoint/2010/main" xmlns="" val="3954742130"/>
       </p:ext>
     </p:extLst>
   </p:cSld>
@@ -9628,7 +9991,7 @@
           <p:cNvPr id="2" name="Título 1">
             <a:extLst>
               <a:ext uri="{FF2B5EF4-FFF2-40B4-BE49-F238E27FC236}">
-                <a16:creationId xmlns:a16="http://schemas.microsoft.com/office/drawing/2014/main" id="{A08BF852-5F19-46F2-83FE-6528AEC95981}"/>
+                <a16:creationId xmlns:a16="http://schemas.microsoft.com/office/drawing/2014/main" xmlns="" id="{A08BF852-5F19-46F2-83FE-6528AEC95981}"/>
               </a:ext>
             </a:extLst>
           </p:cNvPr>
@@ -9656,7 +10019,7 @@
           <p:cNvPr id="3" name="Marcador de contenido 2">
             <a:extLst>
               <a:ext uri="{FF2B5EF4-FFF2-40B4-BE49-F238E27FC236}">
-                <a16:creationId xmlns:a16="http://schemas.microsoft.com/office/drawing/2014/main" id="{4825B7B8-2642-4E50-9E0D-E85148EB6652}"/>
+                <a16:creationId xmlns:a16="http://schemas.microsoft.com/office/drawing/2014/main" xmlns="" id="{4825B7B8-2642-4E50-9E0D-E85148EB6652}"/>
               </a:ext>
             </a:extLst>
           </p:cNvPr>
@@ -9735,7 +10098,7 @@
     </p:spTree>
     <p:extLst>
       <p:ext uri="{BB962C8B-B14F-4D97-AF65-F5344CB8AC3E}">
-        <p14:creationId xmlns:p14="http://schemas.microsoft.com/office/powerpoint/2010/main" val="493199861"/>
+        <p14:creationId xmlns:p14="http://schemas.microsoft.com/office/powerpoint/2010/main" xmlns="" val="493199861"/>
       </p:ext>
     </p:extLst>
   </p:cSld>
@@ -9764,10 +10127,406 @@
       </p:grpSpPr>
       <p:sp>
         <p:nvSpPr>
+          <p:cNvPr id="2" name="Título 1">
+            <a:extLst>
+              <a:ext uri="{FF2B5EF4-FFF2-40B4-BE49-F238E27FC236}">
+                <a16:creationId xmlns:a16="http://schemas.microsoft.com/office/drawing/2014/main" xmlns="" id="{2458DF6C-430A-4FE6-BEE9-9873D9821768}"/>
+              </a:ext>
+            </a:extLst>
+          </p:cNvPr>
+          <p:cNvSpPr>
+            <a:spLocks noGrp="1"/>
+          </p:cNvSpPr>
+          <p:nvPr>
+            <p:ph type="title"/>
+          </p:nvPr>
+        </p:nvSpPr>
+        <p:spPr>
+          <a:xfrm>
+            <a:off x="1484310" y="392205"/>
+            <a:ext cx="10018713" cy="1349188"/>
+          </a:xfrm>
+        </p:spPr>
+        <p:txBody>
+          <a:bodyPr/>
+          <a:lstStyle/>
+          <a:p>
+            <a:r>
+              <a:rPr lang="es-AR" dirty="0"/>
+              <a:t>Cuestiones a definir I</a:t>
+            </a:r>
+          </a:p>
+        </p:txBody>
+      </p:sp>
+      <p:sp>
+        <p:nvSpPr>
+          <p:cNvPr id="3" name="Marcador de contenido 2">
+            <a:extLst>
+              <a:ext uri="{FF2B5EF4-FFF2-40B4-BE49-F238E27FC236}">
+                <a16:creationId xmlns:a16="http://schemas.microsoft.com/office/drawing/2014/main" xmlns="" id="{74D85991-244B-440C-9B99-B3E7D6695501}"/>
+              </a:ext>
+            </a:extLst>
+          </p:cNvPr>
+          <p:cNvSpPr>
+            <a:spLocks noGrp="1"/>
+          </p:cNvSpPr>
+          <p:nvPr>
+            <p:ph idx="1"/>
+          </p:nvPr>
+        </p:nvSpPr>
+        <p:spPr>
+          <a:xfrm>
+            <a:off x="1484310" y="1443318"/>
+            <a:ext cx="10018713" cy="4347883"/>
+          </a:xfrm>
+        </p:spPr>
+        <p:txBody>
+          <a:bodyPr>
+            <a:normAutofit/>
+          </a:bodyPr>
+          <a:lstStyle/>
+          <a:p>
+            <a:r>
+              <a:rPr lang="es-AR" dirty="0"/>
+              <a:t>Fechas límite:</a:t>
+            </a:r>
+          </a:p>
+          <a:p>
+            <a:pPr lvl="1"/>
+            <a:r>
+              <a:rPr lang="es-AR" dirty="0"/>
+              <a:t>¿Un docente debe poder cargar un programa fuera de término? ¿Existiría alguna “marca” sobre el programa cuando esto suceda?</a:t>
+            </a:r>
+          </a:p>
+          <a:p>
+            <a:pPr lvl="1"/>
+            <a:r>
+              <a:rPr lang="es-AR" dirty="0"/>
+              <a:t>¿Qué hacer cuando se le envíen X notificaciones a un docente y este no responda ni realice la carga? ¿Advertencia a algún superior?</a:t>
+            </a:r>
+          </a:p>
+          <a:p>
+            <a:r>
+              <a:rPr lang="es-AR" dirty="0"/>
+              <a:t>Vigencia de un programa</a:t>
+            </a:r>
+          </a:p>
+          <a:p>
+            <a:r>
+              <a:rPr lang="es-AR" dirty="0"/>
+              <a:t>¿Carga de programas por fuera del Sistema?</a:t>
+            </a:r>
+          </a:p>
+        </p:txBody>
+      </p:sp>
+    </p:spTree>
+    <p:extLst>
+      <p:ext uri="{BB962C8B-B14F-4D97-AF65-F5344CB8AC3E}">
+        <p14:creationId xmlns:p14="http://schemas.microsoft.com/office/powerpoint/2010/main" xmlns="" val="1461227207"/>
+      </p:ext>
+    </p:extLst>
+  </p:cSld>
+  <p:clrMapOvr>
+    <a:masterClrMapping/>
+  </p:clrMapOvr>
+</p:sld>
+</file>
+
+<file path=ppt/slides/slide21.xml><?xml version="1.0" encoding="utf-8"?>
+<p:sld xmlns:a="http://schemas.openxmlformats.org/drawingml/2006/main" xmlns:r="http://schemas.openxmlformats.org/officeDocument/2006/relationships" xmlns:p="http://schemas.openxmlformats.org/presentationml/2006/main">
+  <p:cSld>
+    <p:spTree>
+      <p:nvGrpSpPr>
+        <p:cNvPr id="1" name=""/>
+        <p:cNvGrpSpPr/>
+        <p:nvPr/>
+      </p:nvGrpSpPr>
+      <p:grpSpPr>
+        <a:xfrm>
+          <a:off x="0" y="0"/>
+          <a:ext cx="0" cy="0"/>
+          <a:chOff x="0" y="0"/>
+          <a:chExt cx="0" cy="0"/>
+        </a:xfrm>
+      </p:grpSpPr>
+      <p:sp>
+        <p:nvSpPr>
+          <p:cNvPr id="2" name="Título 1">
+            <a:extLst>
+              <a:ext uri="{FF2B5EF4-FFF2-40B4-BE49-F238E27FC236}">
+                <a16:creationId xmlns:a16="http://schemas.microsoft.com/office/drawing/2014/main" xmlns="" id="{4D3D3C5E-AD47-4DAC-8A45-DADDC1B8253D}"/>
+              </a:ext>
+            </a:extLst>
+          </p:cNvPr>
+          <p:cNvSpPr>
+            <a:spLocks noGrp="1"/>
+          </p:cNvSpPr>
+          <p:nvPr>
+            <p:ph type="title"/>
+          </p:nvPr>
+        </p:nvSpPr>
+        <p:spPr>
+          <a:xfrm>
+            <a:off x="1582922" y="504265"/>
+            <a:ext cx="10018713" cy="1125068"/>
+          </a:xfrm>
+        </p:spPr>
+        <p:txBody>
+          <a:bodyPr/>
+          <a:lstStyle/>
+          <a:p>
+            <a:r>
+              <a:rPr lang="es-AR" dirty="0"/>
+              <a:t>Cuestiones a definir II</a:t>
+            </a:r>
+          </a:p>
+        </p:txBody>
+      </p:sp>
+      <p:sp>
+        <p:nvSpPr>
+          <p:cNvPr id="3" name="Marcador de contenido 2">
+            <a:extLst>
+              <a:ext uri="{FF2B5EF4-FFF2-40B4-BE49-F238E27FC236}">
+                <a16:creationId xmlns:a16="http://schemas.microsoft.com/office/drawing/2014/main" xmlns="" id="{6ADE1AAD-CE76-427C-B709-D78D3DFFCFC0}"/>
+              </a:ext>
+            </a:extLst>
+          </p:cNvPr>
+          <p:cNvSpPr>
+            <a:spLocks noGrp="1"/>
+          </p:cNvSpPr>
+          <p:nvPr>
+            <p:ph idx="1"/>
+          </p:nvPr>
+        </p:nvSpPr>
+        <p:spPr>
+          <a:xfrm>
+            <a:off x="1484310" y="1748119"/>
+            <a:ext cx="10018713" cy="4043082"/>
+          </a:xfrm>
+        </p:spPr>
+        <p:txBody>
+          <a:bodyPr>
+            <a:normAutofit/>
+          </a:bodyPr>
+          <a:lstStyle/>
+          <a:p>
+            <a:r>
+              <a:rPr lang="es-AR" dirty="0"/>
+              <a:t>Departamentos – Divisiones</a:t>
+            </a:r>
+          </a:p>
+          <a:p>
+            <a:r>
+              <a:rPr lang="es-AR" dirty="0"/>
+              <a:t>¿Un docente puede aparecer que se encarga tanto en la teoría como en la práctica? ¿O solo puede estar en una de ellas en el programa de la asignatura? *AGREGAR IMAGEN*</a:t>
+            </a:r>
+          </a:p>
+          <a:p>
+            <a:r>
+              <a:rPr lang="es-AR" dirty="0"/>
+              <a:t>Docente responsable e integrante</a:t>
+            </a:r>
+          </a:p>
+          <a:p>
+            <a:pPr lvl="1"/>
+            <a:r>
+              <a:rPr lang="es-AR" dirty="0"/>
+              <a:t>¿Hay un (y solo un) docente responsable y el resto son integrantes? ¿</a:t>
+            </a:r>
+            <a:r>
+              <a:rPr lang="es-AR" dirty="0" err="1"/>
+              <a:t>Haycasos</a:t>
+            </a:r>
+            <a:r>
+              <a:rPr lang="es-AR" dirty="0"/>
+              <a:t> excepcionales con varios responsables? ¿Quién debería cargar el programa?</a:t>
+            </a:r>
+          </a:p>
+        </p:txBody>
+      </p:sp>
+    </p:spTree>
+    <p:extLst>
+      <p:ext uri="{BB962C8B-B14F-4D97-AF65-F5344CB8AC3E}">
+        <p14:creationId xmlns:p14="http://schemas.microsoft.com/office/powerpoint/2010/main" xmlns="" val="4235005633"/>
+      </p:ext>
+    </p:extLst>
+  </p:cSld>
+  <p:clrMapOvr>
+    <a:masterClrMapping/>
+  </p:clrMapOvr>
+</p:sld>
+</file>
+
+<file path=ppt/slides/slide22.xml><?xml version="1.0" encoding="utf-8"?>
+<p:sld xmlns:a="http://schemas.openxmlformats.org/drawingml/2006/main" xmlns:r="http://schemas.openxmlformats.org/officeDocument/2006/relationships" xmlns:p="http://schemas.openxmlformats.org/presentationml/2006/main">
+  <p:cSld>
+    <p:spTree>
+      <p:nvGrpSpPr>
+        <p:cNvPr id="1" name=""/>
+        <p:cNvGrpSpPr/>
+        <p:nvPr/>
+      </p:nvGrpSpPr>
+      <p:grpSpPr>
+        <a:xfrm>
+          <a:off x="0" y="0"/>
+          <a:ext cx="0" cy="0"/>
+          <a:chOff x="0" y="0"/>
+          <a:chExt cx="0" cy="0"/>
+        </a:xfrm>
+      </p:grpSpPr>
+      <p:sp>
+        <p:nvSpPr>
+          <p:cNvPr id="2" name="Título 1">
+            <a:extLst>
+              <a:ext uri="{FF2B5EF4-FFF2-40B4-BE49-F238E27FC236}">
+                <a16:creationId xmlns:a16="http://schemas.microsoft.com/office/drawing/2014/main" xmlns="" id="{2458DF6C-430A-4FE6-BEE9-9873D9821768}"/>
+              </a:ext>
+            </a:extLst>
+          </p:cNvPr>
+          <p:cNvSpPr>
+            <a:spLocks noGrp="1"/>
+          </p:cNvSpPr>
+          <p:nvPr>
+            <p:ph type="title"/>
+          </p:nvPr>
+        </p:nvSpPr>
+        <p:spPr>
+          <a:xfrm>
+            <a:off x="1600852" y="394448"/>
+            <a:ext cx="10018713" cy="1470211"/>
+          </a:xfrm>
+        </p:spPr>
+        <p:txBody>
+          <a:bodyPr/>
+          <a:lstStyle/>
+          <a:p>
+            <a:r>
+              <a:rPr lang="es-AR" dirty="0"/>
+              <a:t>Cuestiones a Definir III</a:t>
+            </a:r>
+          </a:p>
+        </p:txBody>
+      </p:sp>
+      <p:sp>
+        <p:nvSpPr>
+          <p:cNvPr id="3" name="Marcador de contenido 2">
+            <a:extLst>
+              <a:ext uri="{FF2B5EF4-FFF2-40B4-BE49-F238E27FC236}">
+                <a16:creationId xmlns:a16="http://schemas.microsoft.com/office/drawing/2014/main" xmlns="" id="{74D85991-244B-440C-9B99-B3E7D6695501}"/>
+              </a:ext>
+            </a:extLst>
+          </p:cNvPr>
+          <p:cNvSpPr>
+            <a:spLocks noGrp="1"/>
+          </p:cNvSpPr>
+          <p:nvPr>
+            <p:ph idx="1"/>
+          </p:nvPr>
+        </p:nvSpPr>
+        <p:spPr>
+          <a:xfrm>
+            <a:off x="1600852" y="1990164"/>
+            <a:ext cx="10018713" cy="4347883"/>
+          </a:xfrm>
+        </p:spPr>
+        <p:txBody>
+          <a:bodyPr>
+            <a:normAutofit/>
+          </a:bodyPr>
+          <a:lstStyle/>
+          <a:p>
+            <a:r>
+              <a:rPr lang="es-AR" dirty="0"/>
+              <a:t>Revisión de Programas (sólo datos que revisan, previsualizar PDF, saltar algún control)</a:t>
+            </a:r>
+          </a:p>
+          <a:p>
+            <a:pPr lvl="1"/>
+            <a:r>
+              <a:rPr lang="es-AR" dirty="0"/>
+              <a:t>Los datos formales (código de carrera, nombre de carrera, nombre de asignatura, etc.) se encontrarán precargados por Secretaría Académica y no serán modificables por el profesor.</a:t>
+            </a:r>
+          </a:p>
+          <a:p>
+            <a:r>
+              <a:rPr lang="es-AR" dirty="0"/>
+              <a:t>Atributos "</a:t>
+            </a:r>
+            <a:r>
+              <a:rPr lang="es-AR" dirty="0" err="1"/>
+              <a:t>anioCarrera</a:t>
+            </a:r>
+            <a:r>
+              <a:rPr lang="es-AR" dirty="0"/>
+              <a:t>" y "</a:t>
+            </a:r>
+            <a:r>
+              <a:rPr lang="es-AR" dirty="0" err="1"/>
+              <a:t>regimenCursada</a:t>
+            </a:r>
+            <a:r>
+              <a:rPr lang="es-AR" dirty="0"/>
+              <a:t>" de la tabla PROGRAMA</a:t>
+            </a:r>
+          </a:p>
+          <a:p>
+            <a:r>
+              <a:rPr lang="es-AR" dirty="0"/>
+              <a:t>Horas de cursada de Teoría y de </a:t>
+            </a:r>
+            <a:r>
+              <a:rPr lang="es-AR" dirty="0" smtClean="0"/>
+              <a:t>Práctica</a:t>
+            </a:r>
+          </a:p>
+          <a:p>
+            <a:r>
+              <a:rPr lang="es-AR" dirty="0" smtClean="0"/>
+              <a:t>¿Hasta qué tamaño (Mb) se puede subir un programa y un plan al sistema?</a:t>
+            </a:r>
+            <a:endParaRPr lang="es-AR" dirty="0"/>
+          </a:p>
+          <a:p>
+            <a:endParaRPr lang="es-AR" dirty="0"/>
+          </a:p>
+        </p:txBody>
+      </p:sp>
+    </p:spTree>
+    <p:extLst>
+      <p:ext uri="{BB962C8B-B14F-4D97-AF65-F5344CB8AC3E}">
+        <p14:creationId xmlns:p14="http://schemas.microsoft.com/office/powerpoint/2010/main" xmlns="" val="258829745"/>
+      </p:ext>
+    </p:extLst>
+  </p:cSld>
+  <p:clrMapOvr>
+    <a:masterClrMapping/>
+  </p:clrMapOvr>
+</p:sld>
+</file>
+
+<file path=ppt/slides/slide23.xml><?xml version="1.0" encoding="utf-8"?>
+<p:sld xmlns:a="http://schemas.openxmlformats.org/drawingml/2006/main" xmlns:r="http://schemas.openxmlformats.org/officeDocument/2006/relationships" xmlns:p="http://schemas.openxmlformats.org/presentationml/2006/main">
+  <p:cSld>
+    <p:spTree>
+      <p:nvGrpSpPr>
+        <p:cNvPr id="1" name=""/>
+        <p:cNvGrpSpPr/>
+        <p:nvPr/>
+      </p:nvGrpSpPr>
+      <p:grpSpPr>
+        <a:xfrm>
+          <a:off x="0" y="0"/>
+          <a:ext cx="0" cy="0"/>
+          <a:chOff x="0" y="0"/>
+          <a:chExt cx="0" cy="0"/>
+        </a:xfrm>
+      </p:grpSpPr>
+      <p:sp>
+        <p:nvSpPr>
           <p:cNvPr id="4" name="Rectángulo 3">
             <a:extLst>
               <a:ext uri="{FF2B5EF4-FFF2-40B4-BE49-F238E27FC236}">
-                <a16:creationId xmlns:a16="http://schemas.microsoft.com/office/drawing/2014/main" id="{B0F1B4F4-0C7A-4C0E-8584-95718BC545EC}"/>
+                <a16:creationId xmlns:a16="http://schemas.microsoft.com/office/drawing/2014/main" xmlns="" id="{B0F1B4F4-0C7A-4C0E-8584-95718BC545EC}"/>
               </a:ext>
             </a:extLst>
           </p:cNvPr>
@@ -9831,7 +10590,7 @@
           <p:cNvPr id="2" name="CuadroTexto 1">
             <a:extLst>
               <a:ext uri="{FF2B5EF4-FFF2-40B4-BE49-F238E27FC236}">
-                <a16:creationId xmlns:a16="http://schemas.microsoft.com/office/drawing/2014/main" id="{BBF285E2-50A8-4654-BD24-220C20D7C57B}"/>
+                <a16:creationId xmlns:a16="http://schemas.microsoft.com/office/drawing/2014/main" xmlns="" id="{BBF285E2-50A8-4654-BD24-220C20D7C57B}"/>
               </a:ext>
             </a:extLst>
           </p:cNvPr>
@@ -9864,7 +10623,7 @@
     </p:spTree>
     <p:extLst>
       <p:ext uri="{BB962C8B-B14F-4D97-AF65-F5344CB8AC3E}">
-        <p14:creationId xmlns:p14="http://schemas.microsoft.com/office/powerpoint/2010/main" val="3442063561"/>
+        <p14:creationId xmlns:p14="http://schemas.microsoft.com/office/powerpoint/2010/main" xmlns="" val="3442063561"/>
       </p:ext>
     </p:extLst>
   </p:cSld>
@@ -9896,7 +10655,7 @@
           <p:cNvPr id="4" name="Título 3">
             <a:extLst>
               <a:ext uri="{FF2B5EF4-FFF2-40B4-BE49-F238E27FC236}">
-                <a16:creationId xmlns:a16="http://schemas.microsoft.com/office/drawing/2014/main" id="{FA4EADB5-92CE-4B25-BE21-7FC484AE680E}"/>
+                <a16:creationId xmlns:a16="http://schemas.microsoft.com/office/drawing/2014/main" xmlns="" id="{FA4EADB5-92CE-4B25-BE21-7FC484AE680E}"/>
               </a:ext>
             </a:extLst>
           </p:cNvPr>
@@ -9932,7 +10691,7 @@
           <p:cNvPr id="5" name="Subtítulo 4">
             <a:extLst>
               <a:ext uri="{FF2B5EF4-FFF2-40B4-BE49-F238E27FC236}">
-                <a16:creationId xmlns:a16="http://schemas.microsoft.com/office/drawing/2014/main" id="{7035CB29-6D24-4E02-AC9F-07DC0DE9312C}"/>
+                <a16:creationId xmlns:a16="http://schemas.microsoft.com/office/drawing/2014/main" xmlns="" id="{7035CB29-6D24-4E02-AC9F-07DC0DE9312C}"/>
               </a:ext>
             </a:extLst>
           </p:cNvPr>
@@ -10058,7 +10817,7 @@
     </p:spTree>
     <p:extLst>
       <p:ext uri="{BB962C8B-B14F-4D97-AF65-F5344CB8AC3E}">
-        <p14:creationId xmlns:p14="http://schemas.microsoft.com/office/powerpoint/2010/main" val="503208862"/>
+        <p14:creationId xmlns:p14="http://schemas.microsoft.com/office/powerpoint/2010/main" xmlns="" val="503208862"/>
       </p:ext>
     </p:extLst>
   </p:cSld>
@@ -10090,7 +10849,7 @@
           <p:cNvPr id="4" name="Título 3">
             <a:extLst>
               <a:ext uri="{FF2B5EF4-FFF2-40B4-BE49-F238E27FC236}">
-                <a16:creationId xmlns:a16="http://schemas.microsoft.com/office/drawing/2014/main" id="{FA4EADB5-92CE-4B25-BE21-7FC484AE680E}"/>
+                <a16:creationId xmlns:a16="http://schemas.microsoft.com/office/drawing/2014/main" xmlns="" id="{FA4EADB5-92CE-4B25-BE21-7FC484AE680E}"/>
               </a:ext>
             </a:extLst>
           </p:cNvPr>
@@ -10125,7 +10884,7 @@
           <p:cNvPr id="5" name="Subtítulo 4">
             <a:extLst>
               <a:ext uri="{FF2B5EF4-FFF2-40B4-BE49-F238E27FC236}">
-                <a16:creationId xmlns:a16="http://schemas.microsoft.com/office/drawing/2014/main" id="{7035CB29-6D24-4E02-AC9F-07DC0DE9312C}"/>
+                <a16:creationId xmlns:a16="http://schemas.microsoft.com/office/drawing/2014/main" xmlns="" id="{7035CB29-6D24-4E02-AC9F-07DC0DE9312C}"/>
               </a:ext>
             </a:extLst>
           </p:cNvPr>
@@ -10165,7 +10924,7 @@
           <p:cNvPr id="10" name="Imagen 9">
             <a:extLst>
               <a:ext uri="{FF2B5EF4-FFF2-40B4-BE49-F238E27FC236}">
-                <a16:creationId xmlns:a16="http://schemas.microsoft.com/office/drawing/2014/main" id="{9E93C3DC-EA10-4E41-BDEF-6D23E1C605A2}"/>
+                <a16:creationId xmlns:a16="http://schemas.microsoft.com/office/drawing/2014/main" xmlns="" id="{9E93C3DC-EA10-4E41-BDEF-6D23E1C605A2}"/>
               </a:ext>
             </a:extLst>
           </p:cNvPr>
@@ -10178,7 +10937,7 @@
           <a:blip r:embed="rId2" cstate="print">
             <a:extLst>
               <a:ext uri="{28A0092B-C50C-407E-A947-70E740481C1C}">
-                <a14:useLocalDpi xmlns:a14="http://schemas.microsoft.com/office/drawing/2010/main" val="0"/>
+                <a14:useLocalDpi xmlns:a14="http://schemas.microsoft.com/office/drawing/2010/main" xmlns="" val="0"/>
               </a:ext>
             </a:extLst>
           </a:blip>
@@ -10201,7 +10960,7 @@
           <p:cNvPr id="18" name="Imagen 17">
             <a:extLst>
               <a:ext uri="{FF2B5EF4-FFF2-40B4-BE49-F238E27FC236}">
-                <a16:creationId xmlns:a16="http://schemas.microsoft.com/office/drawing/2014/main" id="{8646EEDC-88A1-4D49-A526-A92135A622F0}"/>
+                <a16:creationId xmlns:a16="http://schemas.microsoft.com/office/drawing/2014/main" xmlns="" id="{8646EEDC-88A1-4D49-A526-A92135A622F0}"/>
               </a:ext>
             </a:extLst>
           </p:cNvPr>
@@ -10214,7 +10973,7 @@
           <a:blip r:embed="rId3" cstate="print">
             <a:extLst>
               <a:ext uri="{28A0092B-C50C-407E-A947-70E740481C1C}">
-                <a14:useLocalDpi xmlns:a14="http://schemas.microsoft.com/office/drawing/2010/main" val="0"/>
+                <a14:useLocalDpi xmlns:a14="http://schemas.microsoft.com/office/drawing/2010/main" xmlns="" val="0"/>
               </a:ext>
             </a:extLst>
           </a:blip>
@@ -10237,7 +10996,7 @@
           <p:cNvPr id="20" name="Imagen 19">
             <a:extLst>
               <a:ext uri="{FF2B5EF4-FFF2-40B4-BE49-F238E27FC236}">
-                <a16:creationId xmlns:a16="http://schemas.microsoft.com/office/drawing/2014/main" id="{4A2D40FB-590B-4A55-B259-6C3ECBBC258F}"/>
+                <a16:creationId xmlns:a16="http://schemas.microsoft.com/office/drawing/2014/main" xmlns="" id="{4A2D40FB-590B-4A55-B259-6C3ECBBC258F}"/>
               </a:ext>
             </a:extLst>
           </p:cNvPr>
@@ -10250,7 +11009,7 @@
           <a:blip r:embed="rId4" cstate="print">
             <a:extLst>
               <a:ext uri="{28A0092B-C50C-407E-A947-70E740481C1C}">
-                <a14:useLocalDpi xmlns:a14="http://schemas.microsoft.com/office/drawing/2010/main" val="0"/>
+                <a14:useLocalDpi xmlns:a14="http://schemas.microsoft.com/office/drawing/2010/main" xmlns="" val="0"/>
               </a:ext>
             </a:extLst>
           </a:blip>
@@ -10273,7 +11032,7 @@
           <p:cNvPr id="22" name="Imagen 21">
             <a:extLst>
               <a:ext uri="{FF2B5EF4-FFF2-40B4-BE49-F238E27FC236}">
-                <a16:creationId xmlns:a16="http://schemas.microsoft.com/office/drawing/2014/main" id="{B2430BC3-AAE9-4FD6-9B04-9E1C8B7005EE}"/>
+                <a16:creationId xmlns:a16="http://schemas.microsoft.com/office/drawing/2014/main" xmlns="" id="{B2430BC3-AAE9-4FD6-9B04-9E1C8B7005EE}"/>
               </a:ext>
             </a:extLst>
           </p:cNvPr>
@@ -10286,7 +11045,7 @@
           <a:blip r:embed="rId5" cstate="print">
             <a:extLst>
               <a:ext uri="{28A0092B-C50C-407E-A947-70E740481C1C}">
-                <a14:useLocalDpi xmlns:a14="http://schemas.microsoft.com/office/drawing/2010/main" val="0"/>
+                <a14:useLocalDpi xmlns:a14="http://schemas.microsoft.com/office/drawing/2010/main" xmlns="" val="0"/>
               </a:ext>
             </a:extLst>
           </a:blip>
@@ -10309,7 +11068,7 @@
           <p:cNvPr id="25" name="Grupo 24">
             <a:extLst>
               <a:ext uri="{FF2B5EF4-FFF2-40B4-BE49-F238E27FC236}">
-                <a16:creationId xmlns:a16="http://schemas.microsoft.com/office/drawing/2014/main" id="{6FBCDE22-F651-45B0-99A1-055E6ABDF7ED}"/>
+                <a16:creationId xmlns:a16="http://schemas.microsoft.com/office/drawing/2014/main" xmlns="" id="{6FBCDE22-F651-45B0-99A1-055E6ABDF7ED}"/>
               </a:ext>
             </a:extLst>
           </p:cNvPr>
@@ -10329,7 +11088,7 @@
             <p:cNvPr id="12" name="Imagen 11">
               <a:extLst>
                 <a:ext uri="{FF2B5EF4-FFF2-40B4-BE49-F238E27FC236}">
-                  <a16:creationId xmlns:a16="http://schemas.microsoft.com/office/drawing/2014/main" id="{8EF366B3-0A5E-4158-883D-ADDFEF56C8D1}"/>
+                  <a16:creationId xmlns:a16="http://schemas.microsoft.com/office/drawing/2014/main" xmlns="" id="{8EF366B3-0A5E-4158-883D-ADDFEF56C8D1}"/>
                 </a:ext>
               </a:extLst>
             </p:cNvPr>
@@ -10342,7 +11101,7 @@
             <a:blip r:embed="rId6" cstate="print">
               <a:extLst>
                 <a:ext uri="{28A0092B-C50C-407E-A947-70E740481C1C}">
-                  <a14:useLocalDpi xmlns:a14="http://schemas.microsoft.com/office/drawing/2010/main" val="0"/>
+                  <a14:useLocalDpi xmlns:a14="http://schemas.microsoft.com/office/drawing/2010/main" xmlns="" val="0"/>
                 </a:ext>
               </a:extLst>
             </a:blip>
@@ -10365,7 +11124,7 @@
             <p:cNvPr id="14" name="Imagen 13">
               <a:extLst>
                 <a:ext uri="{FF2B5EF4-FFF2-40B4-BE49-F238E27FC236}">
-                  <a16:creationId xmlns:a16="http://schemas.microsoft.com/office/drawing/2014/main" id="{16FD14F2-15D3-4DD2-9D3C-D16633A69E32}"/>
+                  <a16:creationId xmlns:a16="http://schemas.microsoft.com/office/drawing/2014/main" xmlns="" id="{16FD14F2-15D3-4DD2-9D3C-D16633A69E32}"/>
                 </a:ext>
               </a:extLst>
             </p:cNvPr>
@@ -10378,7 +11137,7 @@
             <a:blip r:embed="rId7" cstate="print">
               <a:extLst>
                 <a:ext uri="{28A0092B-C50C-407E-A947-70E740481C1C}">
-                  <a14:useLocalDpi xmlns:a14="http://schemas.microsoft.com/office/drawing/2010/main" val="0"/>
+                  <a14:useLocalDpi xmlns:a14="http://schemas.microsoft.com/office/drawing/2010/main" xmlns="" val="0"/>
                 </a:ext>
               </a:extLst>
             </a:blip>
@@ -10401,7 +11160,7 @@
             <p:cNvPr id="16" name="Imagen 15">
               <a:extLst>
                 <a:ext uri="{FF2B5EF4-FFF2-40B4-BE49-F238E27FC236}">
-                  <a16:creationId xmlns:a16="http://schemas.microsoft.com/office/drawing/2014/main" id="{F8D896A9-662E-4D9F-A70A-6AAF6F5C524E}"/>
+                  <a16:creationId xmlns:a16="http://schemas.microsoft.com/office/drawing/2014/main" xmlns="" id="{F8D896A9-662E-4D9F-A70A-6AAF6F5C524E}"/>
                 </a:ext>
               </a:extLst>
             </p:cNvPr>
@@ -10414,7 +11173,7 @@
             <a:blip r:embed="rId8" cstate="print">
               <a:extLst>
                 <a:ext uri="{28A0092B-C50C-407E-A947-70E740481C1C}">
-                  <a14:useLocalDpi xmlns:a14="http://schemas.microsoft.com/office/drawing/2010/main" val="0"/>
+                  <a14:useLocalDpi xmlns:a14="http://schemas.microsoft.com/office/drawing/2010/main" xmlns="" val="0"/>
                 </a:ext>
               </a:extLst>
             </a:blip>
@@ -10437,7 +11196,7 @@
             <p:cNvPr id="24" name="Imagen 23">
               <a:extLst>
                 <a:ext uri="{FF2B5EF4-FFF2-40B4-BE49-F238E27FC236}">
-                  <a16:creationId xmlns:a16="http://schemas.microsoft.com/office/drawing/2014/main" id="{34384560-A72D-4409-8A84-1ED46309C9E6}"/>
+                  <a16:creationId xmlns:a16="http://schemas.microsoft.com/office/drawing/2014/main" xmlns="" id="{34384560-A72D-4409-8A84-1ED46309C9E6}"/>
                 </a:ext>
               </a:extLst>
             </p:cNvPr>
@@ -10450,7 +11209,7 @@
             <a:blip r:embed="rId9" cstate="print">
               <a:extLst>
                 <a:ext uri="{28A0092B-C50C-407E-A947-70E740481C1C}">
-                  <a14:useLocalDpi xmlns:a14="http://schemas.microsoft.com/office/drawing/2010/main" val="0"/>
+                  <a14:useLocalDpi xmlns:a14="http://schemas.microsoft.com/office/drawing/2010/main" xmlns="" val="0"/>
                 </a:ext>
               </a:extLst>
             </a:blip>
@@ -10472,7 +11231,7 @@
     </p:spTree>
     <p:extLst>
       <p:ext uri="{BB962C8B-B14F-4D97-AF65-F5344CB8AC3E}">
-        <p14:creationId xmlns:p14="http://schemas.microsoft.com/office/powerpoint/2010/main" val="3384966416"/>
+        <p14:creationId xmlns:p14="http://schemas.microsoft.com/office/powerpoint/2010/main" xmlns="" val="3384966416"/>
       </p:ext>
     </p:extLst>
   </p:cSld>
@@ -10504,7 +11263,7 @@
           <p:cNvPr id="2" name="Título 1">
             <a:extLst>
               <a:ext uri="{FF2B5EF4-FFF2-40B4-BE49-F238E27FC236}">
-                <a16:creationId xmlns:a16="http://schemas.microsoft.com/office/drawing/2014/main" id="{0ED6D180-92C1-4333-BA91-2BBA4DD94A3B}"/>
+                <a16:creationId xmlns:a16="http://schemas.microsoft.com/office/drawing/2014/main" xmlns="" id="{0ED6D180-92C1-4333-BA91-2BBA4DD94A3B}"/>
               </a:ext>
             </a:extLst>
           </p:cNvPr>
@@ -10537,7 +11296,7 @@
           <p:cNvPr id="6" name="Marcador de contenido 5">
             <a:extLst>
               <a:ext uri="{FF2B5EF4-FFF2-40B4-BE49-F238E27FC236}">
-                <a16:creationId xmlns:a16="http://schemas.microsoft.com/office/drawing/2014/main" id="{EF5FF892-247B-4782-9E12-A9439F8D5681}"/>
+                <a16:creationId xmlns:a16="http://schemas.microsoft.com/office/drawing/2014/main" xmlns="" id="{EF5FF892-247B-4782-9E12-A9439F8D5681}"/>
               </a:ext>
             </a:extLst>
           </p:cNvPr>
@@ -10669,7 +11428,7 @@
     </p:spTree>
     <p:extLst>
       <p:ext uri="{BB962C8B-B14F-4D97-AF65-F5344CB8AC3E}">
-        <p14:creationId xmlns:p14="http://schemas.microsoft.com/office/powerpoint/2010/main" val="4239479209"/>
+        <p14:creationId xmlns:p14="http://schemas.microsoft.com/office/powerpoint/2010/main" xmlns="" val="4239479209"/>
       </p:ext>
     </p:extLst>
   </p:cSld>
@@ -10701,7 +11460,7 @@
           <p:cNvPr id="2" name="Título 1">
             <a:extLst>
               <a:ext uri="{FF2B5EF4-FFF2-40B4-BE49-F238E27FC236}">
-                <a16:creationId xmlns:a16="http://schemas.microsoft.com/office/drawing/2014/main" id="{0ED6D180-92C1-4333-BA91-2BBA4DD94A3B}"/>
+                <a16:creationId xmlns:a16="http://schemas.microsoft.com/office/drawing/2014/main" xmlns="" id="{0ED6D180-92C1-4333-BA91-2BBA4DD94A3B}"/>
               </a:ext>
             </a:extLst>
           </p:cNvPr>
@@ -10734,7 +11493,7 @@
           <p:cNvPr id="13" name="Marcador de contenido 12">
             <a:extLst>
               <a:ext uri="{FF2B5EF4-FFF2-40B4-BE49-F238E27FC236}">
-                <a16:creationId xmlns:a16="http://schemas.microsoft.com/office/drawing/2014/main" id="{CEA8B96E-5837-4A4D-A606-8D01BA9A3D3E}"/>
+                <a16:creationId xmlns:a16="http://schemas.microsoft.com/office/drawing/2014/main" xmlns="" id="{CEA8B96E-5837-4A4D-A606-8D01BA9A3D3E}"/>
               </a:ext>
             </a:extLst>
           </p:cNvPr>
@@ -10749,7 +11508,7 @@
           <a:blip r:embed="rId2" cstate="print">
             <a:extLst>
               <a:ext uri="{28A0092B-C50C-407E-A947-70E740481C1C}">
-                <a14:useLocalDpi xmlns:a14="http://schemas.microsoft.com/office/drawing/2010/main" val="0"/>
+                <a14:useLocalDpi xmlns:a14="http://schemas.microsoft.com/office/drawing/2010/main" xmlns="" val="0"/>
               </a:ext>
             </a:extLst>
           </a:blip>
@@ -10767,7 +11526,7 @@
     </p:spTree>
     <p:extLst>
       <p:ext uri="{BB962C8B-B14F-4D97-AF65-F5344CB8AC3E}">
-        <p14:creationId xmlns:p14="http://schemas.microsoft.com/office/powerpoint/2010/main" val="4165342321"/>
+        <p14:creationId xmlns:p14="http://schemas.microsoft.com/office/powerpoint/2010/main" xmlns="" val="4165342321"/>
       </p:ext>
     </p:extLst>
   </p:cSld>
@@ -10799,7 +11558,7 @@
           <p:cNvPr id="2" name="Título 1">
             <a:extLst>
               <a:ext uri="{FF2B5EF4-FFF2-40B4-BE49-F238E27FC236}">
-                <a16:creationId xmlns:a16="http://schemas.microsoft.com/office/drawing/2014/main" id="{48E5154C-DCCF-4EF4-A599-6C5F443E3B7E}"/>
+                <a16:creationId xmlns:a16="http://schemas.microsoft.com/office/drawing/2014/main" xmlns="" id="{48E5154C-DCCF-4EF4-A599-6C5F443E3B7E}"/>
               </a:ext>
             </a:extLst>
           </p:cNvPr>
@@ -10832,7 +11591,7 @@
           <p:cNvPr id="3" name="Marcador de contenido 2">
             <a:extLst>
               <a:ext uri="{FF2B5EF4-FFF2-40B4-BE49-F238E27FC236}">
-                <a16:creationId xmlns:a16="http://schemas.microsoft.com/office/drawing/2014/main" id="{CE1A4805-831B-4F38-AD2E-0BA47901F15D}"/>
+                <a16:creationId xmlns:a16="http://schemas.microsoft.com/office/drawing/2014/main" xmlns="" id="{CE1A4805-831B-4F38-AD2E-0BA47901F15D}"/>
               </a:ext>
             </a:extLst>
           </p:cNvPr>
@@ -10892,7 +11651,7 @@
     </p:spTree>
     <p:extLst>
       <p:ext uri="{BB962C8B-B14F-4D97-AF65-F5344CB8AC3E}">
-        <p14:creationId xmlns:p14="http://schemas.microsoft.com/office/powerpoint/2010/main" val="3912988033"/>
+        <p14:creationId xmlns:p14="http://schemas.microsoft.com/office/powerpoint/2010/main" xmlns="" val="3912988033"/>
       </p:ext>
     </p:extLst>
   </p:cSld>
@@ -10924,7 +11683,7 @@
           <p:cNvPr id="4" name="Rectángulo 3">
             <a:extLst>
               <a:ext uri="{FF2B5EF4-FFF2-40B4-BE49-F238E27FC236}">
-                <a16:creationId xmlns:a16="http://schemas.microsoft.com/office/drawing/2014/main" id="{8DA77BB3-B03A-4841-9B03-9EE22063CC69}"/>
+                <a16:creationId xmlns:a16="http://schemas.microsoft.com/office/drawing/2014/main" xmlns="" id="{8DA77BB3-B03A-4841-9B03-9EE22063CC69}"/>
               </a:ext>
             </a:extLst>
           </p:cNvPr>
@@ -10982,7 +11741,7 @@
     </p:spTree>
     <p:extLst>
       <p:ext uri="{BB962C8B-B14F-4D97-AF65-F5344CB8AC3E}">
-        <p14:creationId xmlns:p14="http://schemas.microsoft.com/office/powerpoint/2010/main" val="1791604481"/>
+        <p14:creationId xmlns:p14="http://schemas.microsoft.com/office/powerpoint/2010/main" xmlns="" val="1791604481"/>
       </p:ext>
     </p:extLst>
   </p:cSld>
@@ -11014,7 +11773,7 @@
           <p:cNvPr id="5" name="Marcador de contenido 4">
             <a:extLst>
               <a:ext uri="{FF2B5EF4-FFF2-40B4-BE49-F238E27FC236}">
-                <a16:creationId xmlns:a16="http://schemas.microsoft.com/office/drawing/2014/main" id="{6E86104B-2416-4C39-94D1-3F41BA25E339}"/>
+                <a16:creationId xmlns:a16="http://schemas.microsoft.com/office/drawing/2014/main" xmlns="" id="{6E86104B-2416-4C39-94D1-3F41BA25E339}"/>
               </a:ext>
             </a:extLst>
           </p:cNvPr>
@@ -11026,10 +11785,10 @@
           </p:nvPr>
         </p:nvPicPr>
         <p:blipFill>
-          <a:blip r:embed="rId2">
+          <a:blip r:embed="rId2" cstate="print">
             <a:extLst>
               <a:ext uri="{28A0092B-C50C-407E-A947-70E740481C1C}">
-                <a14:useLocalDpi xmlns:a14="http://schemas.microsoft.com/office/drawing/2010/main" val="0"/>
+                <a14:useLocalDpi xmlns:a14="http://schemas.microsoft.com/office/drawing/2010/main" xmlns="" val="0"/>
               </a:ext>
             </a:extLst>
           </a:blip>
@@ -11046,7 +11805,7 @@
     </p:spTree>
     <p:extLst>
       <p:ext uri="{BB962C8B-B14F-4D97-AF65-F5344CB8AC3E}">
-        <p14:creationId xmlns:p14="http://schemas.microsoft.com/office/powerpoint/2010/main" val="2116906813"/>
+        <p14:creationId xmlns:p14="http://schemas.microsoft.com/office/powerpoint/2010/main" xmlns="" val="2116906813"/>
       </p:ext>
     </p:extLst>
   </p:cSld>
@@ -11306,7 +12065,7 @@
   <a:extraClrSchemeLst/>
   <a:extLst>
     <a:ext uri="{05A4C25C-085E-4340-85A3-A5531E510DB2}">
-      <thm15:themeFamily xmlns:thm15="http://schemas.microsoft.com/office/thememl/2012/main" name="Parallax" id="{3388167B-A2EB-4685-9635-1831D9AEF8C4}" vid="{4F7A876A-7598-49CA-AFC8-8EDA2551E4A7}"/>
+      <thm15:themeFamily xmlns:thm15="http://schemas.microsoft.com/office/thememl/2012/main" xmlns="" name="Parallax" id="{3388167B-A2EB-4685-9635-1831D9AEF8C4}" vid="{4F7A876A-7598-49CA-AFC8-8EDA2551E4A7}"/>
     </a:ext>
   </a:extLst>
 </a:theme>
@@ -11567,7 +12326,7 @@
   <a:extraClrSchemeLst/>
   <a:extLst>
     <a:ext uri="{05A4C25C-085E-4340-85A3-A5531E510DB2}">
-      <thm15:themeFamily xmlns:thm15="http://schemas.microsoft.com/office/thememl/2012/main" name="Office Theme" id="{62F939B6-93AF-4DB8-9C6B-D6C7DFDC589F}" vid="{4A3C46E8-61CC-4603-A589-7422A47A8E4A}"/>
+      <thm15:themeFamily xmlns:thm15="http://schemas.microsoft.com/office/thememl/2012/main" xmlns="" name="Office Theme" id="{62F939B6-93AF-4DB8-9C6B-D6C7DFDC589F}" vid="{4A3C46E8-61CC-4603-A589-7422A47A8E4A}"/>
     </a:ext>
   </a:extLst>
 </a:theme>

</xml_diff>

<commit_message>
Actualizacion presentación, agregado Gestión de Riesgos
</commit_message>
<xml_diff>
--- a/Presentaciones/presentacion vaspa - 12 - Noviembre 2019.pptx
+++ b/Presentaciones/presentacion vaspa - 12 - Noviembre 2019.pptx
@@ -5,7 +5,7 @@
     <p:sldMasterId id="2147483933" r:id="rId1"/>
   </p:sldMasterIdLst>
   <p:notesMasterIdLst>
-    <p:notesMasterId r:id="rId25"/>
+    <p:notesMasterId r:id="rId26"/>
   </p:notesMasterIdLst>
   <p:sldIdLst>
     <p:sldId id="267" r:id="rId2"/>
@@ -25,12 +25,13 @@
     <p:sldId id="347" r:id="rId16"/>
     <p:sldId id="348" r:id="rId17"/>
     <p:sldId id="349" r:id="rId18"/>
-    <p:sldId id="307" r:id="rId19"/>
-    <p:sldId id="332" r:id="rId20"/>
-    <p:sldId id="342" r:id="rId21"/>
-    <p:sldId id="345" r:id="rId22"/>
-    <p:sldId id="346" r:id="rId23"/>
-    <p:sldId id="275" r:id="rId24"/>
+    <p:sldId id="332" r:id="rId19"/>
+    <p:sldId id="350" r:id="rId20"/>
+    <p:sldId id="352" r:id="rId21"/>
+    <p:sldId id="342" r:id="rId22"/>
+    <p:sldId id="345" r:id="rId23"/>
+    <p:sldId id="346" r:id="rId24"/>
+    <p:sldId id="275" r:id="rId25"/>
   </p:sldIdLst>
   <p:sldSz cx="12192000" cy="6858000"/>
   <p:notesSz cx="6858000" cy="9144000"/>
@@ -131,7 +132,7 @@
   </p:defaultTextStyle>
   <p:extLst>
     <p:ext uri="{EFAFB233-063F-42B5-8137-9DF3F51BA10A}">
-      <p15:sldGuideLst xmlns:p15="http://schemas.microsoft.com/office/powerpoint/2012/main" xmlns="">
+      <p15:sldGuideLst xmlns:p15="http://schemas.microsoft.com/office/powerpoint/2012/main">
         <p15:guide id="1" orient="horz" pos="2160">
           <p15:clr>
             <a:srgbClr val="A4A3A4"/>
@@ -149,9 +150,18 @@
 </file>
 
 <file path=ppt/charts/chart1.xml><?xml version="1.0" encoding="utf-8"?>
-<c:chartSpace xmlns:c="http://schemas.openxmlformats.org/drawingml/2006/chart" xmlns:a="http://schemas.openxmlformats.org/drawingml/2006/main" xmlns:r="http://schemas.openxmlformats.org/officeDocument/2006/relationships">
-  <c:date1904 val="1"/>
-  <c:lang val="es-AR"/>
+<c:chartSpace xmlns:c="http://schemas.openxmlformats.org/drawingml/2006/chart" xmlns:a="http://schemas.openxmlformats.org/drawingml/2006/main" xmlns:r="http://schemas.openxmlformats.org/officeDocument/2006/relationships" xmlns:c16r2="http://schemas.microsoft.com/office/drawing/2015/06/chart">
+  <c:date1904 val="0"/>
+  <c:lang val="es-ES"/>
+  <c:roundedCorners val="0"/>
+  <mc:AlternateContent xmlns:mc="http://schemas.openxmlformats.org/markup-compatibility/2006">
+    <mc:Choice xmlns:c14="http://schemas.microsoft.com/office/drawing/2007/8/2/chart" Requires="c14">
+      <c14:style val="102"/>
+    </mc:Choice>
+    <mc:Fallback>
+      <c:style val="2"/>
+    </mc:Fallback>
+  </mc:AlternateContent>
   <c:chart>
     <c:autoTitleDeleted val="1"/>
     <c:plotArea>
@@ -162,8 +172,25 @@
           <c:idx val="0"/>
           <c:order val="0"/>
           <c:dLbls>
+            <c:spPr>
+              <a:noFill/>
+              <a:ln>
+                <a:noFill/>
+              </a:ln>
+              <a:effectLst/>
+            </c:spPr>
+            <c:showLegendKey val="0"/>
+            <c:showVal val="0"/>
+            <c:showCatName val="0"/>
+            <c:showSerName val="0"/>
             <c:showPercent val="1"/>
+            <c:showBubbleSize val="0"/>
             <c:showLeaderLines val="1"/>
+            <c:extLst>
+              <c:ext xmlns:c15="http://schemas.microsoft.com/office/drawing/2012/chart" uri="{CE6537A1-D6FC-4f65-9D91-7224C49458BB}">
+                <c15:layout/>
+              </c:ext>
+            </c:extLst>
           </c:dLbls>
           <c:cat>
             <c:strRef>
@@ -200,9 +227,20 @@
               </c:numCache>
             </c:numRef>
           </c:val>
+          <c:extLst>
+            <c:ext xmlns:c16="http://schemas.microsoft.com/office/drawing/2014/chart" uri="{C3380CC4-5D6E-409C-BE32-E72D297353CC}">
+              <c16:uniqueId val="{00000000-5F40-4E65-AB52-C76436783A30}"/>
+            </c:ext>
+          </c:extLst>
         </c:ser>
         <c:dLbls>
+          <c:showLegendKey val="0"/>
+          <c:showVal val="0"/>
+          <c:showCatName val="0"/>
+          <c:showSerName val="0"/>
           <c:showPercent val="1"/>
+          <c:showBubbleSize val="0"/>
+          <c:showLeaderLines val="1"/>
         </c:dLbls>
         <c:firstSliceAng val="0"/>
       </c:pieChart>
@@ -210,8 +248,11 @@
     <c:legend>
       <c:legendPos val="r"/>
       <c:layout/>
+      <c:overlay val="0"/>
     </c:legend>
     <c:plotVisOnly val="1"/>
+    <c:dispBlanksAs val="gap"/>
+    <c:showDLblsOverMax val="0"/>
   </c:chart>
   <c:txPr>
     <a:bodyPr/>
@@ -223,14 +264,25 @@
       <a:endParaRPr lang="es-AR"/>
     </a:p>
   </c:txPr>
-  <c:externalData r:id="rId1"/>
+  <c:externalData r:id="rId1">
+    <c:autoUpdate val="0"/>
+  </c:externalData>
 </c:chartSpace>
 </file>
 
 <file path=ppt/charts/chart2.xml><?xml version="1.0" encoding="utf-8"?>
-<c:chartSpace xmlns:c="http://schemas.openxmlformats.org/drawingml/2006/chart" xmlns:a="http://schemas.openxmlformats.org/drawingml/2006/main" xmlns:r="http://schemas.openxmlformats.org/officeDocument/2006/relationships">
-  <c:date1904 val="1"/>
-  <c:lang val="es-AR"/>
+<c:chartSpace xmlns:c="http://schemas.openxmlformats.org/drawingml/2006/chart" xmlns:a="http://schemas.openxmlformats.org/drawingml/2006/main" xmlns:r="http://schemas.openxmlformats.org/officeDocument/2006/relationships" xmlns:c16r2="http://schemas.microsoft.com/office/drawing/2015/06/chart">
+  <c:date1904 val="0"/>
+  <c:lang val="es-ES"/>
+  <c:roundedCorners val="0"/>
+  <mc:AlternateContent xmlns:mc="http://schemas.openxmlformats.org/markup-compatibility/2006">
+    <mc:Choice xmlns:c14="http://schemas.microsoft.com/office/drawing/2007/8/2/chart" Requires="c14">
+      <c14:style val="102"/>
+    </mc:Choice>
+    <mc:Fallback>
+      <c:style val="2"/>
+    </mc:Fallback>
+  </mc:AlternateContent>
   <c:chart>
     <c:autoTitleDeleted val="1"/>
     <c:plotArea>
@@ -241,8 +293,25 @@
           <c:idx val="0"/>
           <c:order val="0"/>
           <c:dLbls>
+            <c:spPr>
+              <a:noFill/>
+              <a:ln>
+                <a:noFill/>
+              </a:ln>
+              <a:effectLst/>
+            </c:spPr>
+            <c:showLegendKey val="0"/>
+            <c:showVal val="0"/>
+            <c:showCatName val="0"/>
+            <c:showSerName val="0"/>
             <c:showPercent val="1"/>
+            <c:showBubbleSize val="0"/>
             <c:showLeaderLines val="1"/>
+            <c:extLst>
+              <c:ext xmlns:c15="http://schemas.microsoft.com/office/drawing/2012/chart" uri="{CE6537A1-D6FC-4f65-9D91-7224C49458BB}">
+                <c15:layout/>
+              </c:ext>
+            </c:extLst>
           </c:dLbls>
           <c:cat>
             <c:strRef>
@@ -279,9 +348,20 @@
               </c:numCache>
             </c:numRef>
           </c:val>
+          <c:extLst>
+            <c:ext xmlns:c16="http://schemas.microsoft.com/office/drawing/2014/chart" uri="{C3380CC4-5D6E-409C-BE32-E72D297353CC}">
+              <c16:uniqueId val="{00000000-059F-47D9-99CE-FB425E922A48}"/>
+            </c:ext>
+          </c:extLst>
         </c:ser>
         <c:dLbls>
+          <c:showLegendKey val="0"/>
+          <c:showVal val="0"/>
+          <c:showCatName val="0"/>
+          <c:showSerName val="0"/>
           <c:showPercent val="1"/>
+          <c:showBubbleSize val="0"/>
+          <c:showLeaderLines val="1"/>
         </c:dLbls>
         <c:firstSliceAng val="0"/>
       </c:pieChart>
@@ -289,17 +369,31 @@
     <c:legend>
       <c:legendPos val="r"/>
       <c:layout/>
+      <c:overlay val="0"/>
     </c:legend>
     <c:plotVisOnly val="1"/>
+    <c:dispBlanksAs val="gap"/>
+    <c:showDLblsOverMax val="0"/>
   </c:chart>
-  <c:externalData r:id="rId1"/>
+  <c:externalData r:id="rId1">
+    <c:autoUpdate val="0"/>
+  </c:externalData>
 </c:chartSpace>
 </file>
 
 <file path=ppt/charts/chart3.xml><?xml version="1.0" encoding="utf-8"?>
-<c:chartSpace xmlns:c="http://schemas.openxmlformats.org/drawingml/2006/chart" xmlns:a="http://schemas.openxmlformats.org/drawingml/2006/main" xmlns:r="http://schemas.openxmlformats.org/officeDocument/2006/relationships">
-  <c:date1904 val="1"/>
-  <c:lang val="es-AR"/>
+<c:chartSpace xmlns:c="http://schemas.openxmlformats.org/drawingml/2006/chart" xmlns:a="http://schemas.openxmlformats.org/drawingml/2006/main" xmlns:r="http://schemas.openxmlformats.org/officeDocument/2006/relationships" xmlns:c16r2="http://schemas.microsoft.com/office/drawing/2015/06/chart">
+  <c:date1904 val="0"/>
+  <c:lang val="es-ES"/>
+  <c:roundedCorners val="0"/>
+  <mc:AlternateContent xmlns:mc="http://schemas.openxmlformats.org/markup-compatibility/2006">
+    <mc:Choice xmlns:c14="http://schemas.microsoft.com/office/drawing/2007/8/2/chart" Requires="c14">
+      <c14:style val="102"/>
+    </mc:Choice>
+    <mc:Fallback>
+      <c:style val="2"/>
+    </mc:Fallback>
+  </mc:AlternateContent>
   <c:chart>
     <c:autoTitleDeleted val="1"/>
     <c:plotArea>
@@ -310,8 +404,25 @@
           <c:idx val="0"/>
           <c:order val="0"/>
           <c:dLbls>
+            <c:spPr>
+              <a:noFill/>
+              <a:ln>
+                <a:noFill/>
+              </a:ln>
+              <a:effectLst/>
+            </c:spPr>
+            <c:showLegendKey val="0"/>
+            <c:showVal val="0"/>
+            <c:showCatName val="0"/>
+            <c:showSerName val="0"/>
             <c:showPercent val="1"/>
+            <c:showBubbleSize val="0"/>
             <c:showLeaderLines val="1"/>
+            <c:extLst>
+              <c:ext xmlns:c15="http://schemas.microsoft.com/office/drawing/2012/chart" uri="{CE6537A1-D6FC-4f65-9D91-7224C49458BB}">
+                <c15:layout/>
+              </c:ext>
+            </c:extLst>
           </c:dLbls>
           <c:cat>
             <c:strRef>
@@ -348,9 +459,20 @@
               </c:numCache>
             </c:numRef>
           </c:val>
+          <c:extLst>
+            <c:ext xmlns:c16="http://schemas.microsoft.com/office/drawing/2014/chart" uri="{C3380CC4-5D6E-409C-BE32-E72D297353CC}">
+              <c16:uniqueId val="{00000000-3941-4F29-B399-9A4E481D4333}"/>
+            </c:ext>
+          </c:extLst>
         </c:ser>
         <c:dLbls>
+          <c:showLegendKey val="0"/>
+          <c:showVal val="0"/>
+          <c:showCatName val="0"/>
+          <c:showSerName val="0"/>
           <c:showPercent val="1"/>
+          <c:showBubbleSize val="0"/>
+          <c:showLeaderLines val="1"/>
         </c:dLbls>
         <c:firstSliceAng val="0"/>
       </c:pieChart>
@@ -358,11 +480,827 @@
     <c:legend>
       <c:legendPos val="r"/>
       <c:layout/>
+      <c:overlay val="0"/>
     </c:legend>
     <c:plotVisOnly val="1"/>
+    <c:dispBlanksAs val="gap"/>
+    <c:showDLblsOverMax val="0"/>
   </c:chart>
-  <c:externalData r:id="rId1"/>
+  <c:externalData r:id="rId1">
+    <c:autoUpdate val="0"/>
+  </c:externalData>
 </c:chartSpace>
+</file>
+
+<file path=ppt/charts/chart4.xml><?xml version="1.0" encoding="utf-8"?>
+<c:chartSpace xmlns:c="http://schemas.openxmlformats.org/drawingml/2006/chart" xmlns:a="http://schemas.openxmlformats.org/drawingml/2006/main" xmlns:r="http://schemas.openxmlformats.org/officeDocument/2006/relationships" xmlns:c16r2="http://schemas.microsoft.com/office/drawing/2015/06/chart">
+  <c:date1904 val="0"/>
+  <c:lang val="es-ES"/>
+  <c:roundedCorners val="0"/>
+  <mc:AlternateContent xmlns:mc="http://schemas.openxmlformats.org/markup-compatibility/2006">
+    <mc:Choice xmlns:c14="http://schemas.microsoft.com/office/drawing/2007/8/2/chart" Requires="c14">
+      <c14:style val="102"/>
+    </mc:Choice>
+    <mc:Fallback>
+      <c:style val="2"/>
+    </mc:Fallback>
+  </mc:AlternateContent>
+  <c:chart>
+    <c:title>
+      <c:tx>
+        <c:rich>
+          <a:bodyPr rot="0" spcFirstLastPara="1" vertOverflow="ellipsis" vert="horz" wrap="square" anchor="ctr" anchorCtr="1"/>
+          <a:lstStyle/>
+          <a:p>
+            <a:pPr>
+              <a:defRPr sz="1862" b="0" i="0" u="none" strike="noStrike" kern="1200" spc="0" baseline="0">
+                <a:solidFill>
+                  <a:schemeClr val="tx1">
+                    <a:lumMod val="65000"/>
+                    <a:lumOff val="35000"/>
+                  </a:schemeClr>
+                </a:solidFill>
+                <a:latin typeface="+mn-lt"/>
+                <a:ea typeface="+mn-ea"/>
+                <a:cs typeface="+mn-cs"/>
+              </a:defRPr>
+            </a:pPr>
+            <a:r>
+              <a:rPr lang="en-US" dirty="0" smtClean="0"/>
+              <a:t>Estado </a:t>
+            </a:r>
+            <a:r>
+              <a:rPr lang="en-US" dirty="0"/>
+              <a:t>de </a:t>
+            </a:r>
+            <a:r>
+              <a:rPr lang="en-US" dirty="0" err="1"/>
+              <a:t>los</a:t>
+            </a:r>
+            <a:r>
+              <a:rPr lang="en-US" dirty="0"/>
+              <a:t> </a:t>
+            </a:r>
+            <a:r>
+              <a:rPr lang="en-US" dirty="0" err="1" smtClean="0"/>
+              <a:t>riesgos</a:t>
+            </a:r>
+            <a:endParaRPr lang="en-US" dirty="0"/>
+          </a:p>
+        </c:rich>
+      </c:tx>
+      <c:layout/>
+      <c:overlay val="0"/>
+      <c:spPr>
+        <a:noFill/>
+        <a:ln>
+          <a:noFill/>
+        </a:ln>
+        <a:effectLst/>
+      </c:spPr>
+      <c:txPr>
+        <a:bodyPr rot="0" spcFirstLastPara="1" vertOverflow="ellipsis" vert="horz" wrap="square" anchor="ctr" anchorCtr="1"/>
+        <a:lstStyle/>
+        <a:p>
+          <a:pPr>
+            <a:defRPr sz="1862" b="0" i="0" u="none" strike="noStrike" kern="1200" spc="0" baseline="0">
+              <a:solidFill>
+                <a:schemeClr val="tx1">
+                  <a:lumMod val="65000"/>
+                  <a:lumOff val="35000"/>
+                </a:schemeClr>
+              </a:solidFill>
+              <a:latin typeface="+mn-lt"/>
+              <a:ea typeface="+mn-ea"/>
+              <a:cs typeface="+mn-cs"/>
+            </a:defRPr>
+          </a:pPr>
+          <a:endParaRPr lang="es-AR"/>
+        </a:p>
+      </c:txPr>
+    </c:title>
+    <c:autoTitleDeleted val="0"/>
+    <c:plotArea>
+      <c:layout/>
+      <c:pieChart>
+        <c:varyColors val="1"/>
+        <c:ser>
+          <c:idx val="0"/>
+          <c:order val="0"/>
+          <c:tx>
+            <c:strRef>
+              <c:f>Hoja1!$B$1</c:f>
+              <c:strCache>
+                <c:ptCount val="1"/>
+                <c:pt idx="0">
+                  <c:v>Estados de los Riesgos</c:v>
+                </c:pt>
+              </c:strCache>
+            </c:strRef>
+          </c:tx>
+          <c:dPt>
+            <c:idx val="0"/>
+            <c:bubble3D val="0"/>
+            <c:spPr>
+              <a:solidFill>
+                <a:schemeClr val="accent1"/>
+              </a:solidFill>
+              <a:ln w="19050">
+                <a:solidFill>
+                  <a:schemeClr val="lt1"/>
+                </a:solidFill>
+              </a:ln>
+              <a:effectLst/>
+            </c:spPr>
+          </c:dPt>
+          <c:dPt>
+            <c:idx val="1"/>
+            <c:bubble3D val="0"/>
+            <c:spPr>
+              <a:solidFill>
+                <a:schemeClr val="accent2"/>
+              </a:solidFill>
+              <a:ln w="19050">
+                <a:solidFill>
+                  <a:schemeClr val="lt1"/>
+                </a:solidFill>
+              </a:ln>
+              <a:effectLst/>
+            </c:spPr>
+          </c:dPt>
+          <c:cat>
+            <c:strRef>
+              <c:f>Hoja1!$A$2:$A$5</c:f>
+              <c:strCache>
+                <c:ptCount val="2"/>
+                <c:pt idx="0">
+                  <c:v>Activos</c:v>
+                </c:pt>
+                <c:pt idx="1">
+                  <c:v>Cerrados</c:v>
+                </c:pt>
+              </c:strCache>
+            </c:strRef>
+          </c:cat>
+          <c:val>
+            <c:numRef>
+              <c:f>Hoja1!$B$2:$B$5</c:f>
+              <c:numCache>
+                <c:formatCode>General</c:formatCode>
+                <c:ptCount val="2"/>
+                <c:pt idx="0">
+                  <c:v>6</c:v>
+                </c:pt>
+                <c:pt idx="1">
+                  <c:v>11</c:v>
+                </c:pt>
+              </c:numCache>
+            </c:numRef>
+          </c:val>
+          <c:extLst>
+            <c:ext xmlns:c15="http://schemas.microsoft.com/office/drawing/2012/chart" uri="{02D57815-91ED-43cb-92C2-25804820EDAC}">
+              <c15:categoryFilterExceptions/>
+            </c:ext>
+            <c:ext xmlns:c16="http://schemas.microsoft.com/office/drawing/2014/chart" uri="{C3380CC4-5D6E-409C-BE32-E72D297353CC}">
+              <c16:uniqueId val="{00000000-1ABC-43B0-A04E-E78A647A0063}"/>
+            </c:ext>
+          </c:extLst>
+        </c:ser>
+        <c:dLbls>
+          <c:showLegendKey val="0"/>
+          <c:showVal val="0"/>
+          <c:showCatName val="0"/>
+          <c:showSerName val="0"/>
+          <c:showPercent val="0"/>
+          <c:showBubbleSize val="0"/>
+          <c:showLeaderLines val="1"/>
+        </c:dLbls>
+        <c:firstSliceAng val="0"/>
+      </c:pieChart>
+      <c:spPr>
+        <a:noFill/>
+        <a:ln>
+          <a:noFill/>
+        </a:ln>
+        <a:effectLst/>
+      </c:spPr>
+    </c:plotArea>
+    <c:legend>
+      <c:legendPos val="b"/>
+      <c:layout/>
+      <c:overlay val="0"/>
+      <c:spPr>
+        <a:noFill/>
+        <a:ln>
+          <a:noFill/>
+        </a:ln>
+        <a:effectLst/>
+      </c:spPr>
+      <c:txPr>
+        <a:bodyPr rot="0" spcFirstLastPara="1" vertOverflow="ellipsis" vert="horz" wrap="square" anchor="ctr" anchorCtr="1"/>
+        <a:lstStyle/>
+        <a:p>
+          <a:pPr>
+            <a:defRPr sz="1197" b="0" i="0" u="none" strike="noStrike" kern="1200" baseline="0">
+              <a:solidFill>
+                <a:schemeClr val="tx1">
+                  <a:lumMod val="65000"/>
+                  <a:lumOff val="35000"/>
+                </a:schemeClr>
+              </a:solidFill>
+              <a:latin typeface="+mn-lt"/>
+              <a:ea typeface="+mn-ea"/>
+              <a:cs typeface="+mn-cs"/>
+            </a:defRPr>
+          </a:pPr>
+          <a:endParaRPr lang="es-AR"/>
+        </a:p>
+      </c:txPr>
+    </c:legend>
+    <c:plotVisOnly val="1"/>
+    <c:dispBlanksAs val="gap"/>
+    <c:showDLblsOverMax val="0"/>
+  </c:chart>
+  <c:spPr>
+    <a:noFill/>
+    <a:ln>
+      <a:noFill/>
+    </a:ln>
+    <a:effectLst/>
+  </c:spPr>
+  <c:txPr>
+    <a:bodyPr/>
+    <a:lstStyle/>
+    <a:p>
+      <a:pPr>
+        <a:defRPr/>
+      </a:pPr>
+      <a:endParaRPr lang="es-AR"/>
+    </a:p>
+  </c:txPr>
+  <c:externalData r:id="rId3">
+    <c:autoUpdate val="0"/>
+  </c:externalData>
+</c:chartSpace>
+</file>
+
+<file path=ppt/charts/colors1.xml><?xml version="1.0" encoding="utf-8"?>
+<cs:colorStyle xmlns:cs="http://schemas.microsoft.com/office/drawing/2012/chartStyle" xmlns:a="http://schemas.openxmlformats.org/drawingml/2006/main" meth="cycle" id="10">
+  <a:schemeClr val="accent1"/>
+  <a:schemeClr val="accent2"/>
+  <a:schemeClr val="accent3"/>
+  <a:schemeClr val="accent4"/>
+  <a:schemeClr val="accent5"/>
+  <a:schemeClr val="accent6"/>
+  <cs:variation/>
+  <cs:variation>
+    <a:lumMod val="60000"/>
+  </cs:variation>
+  <cs:variation>
+    <a:lumMod val="80000"/>
+    <a:lumOff val="20000"/>
+  </cs:variation>
+  <cs:variation>
+    <a:lumMod val="80000"/>
+  </cs:variation>
+  <cs:variation>
+    <a:lumMod val="60000"/>
+    <a:lumOff val="40000"/>
+  </cs:variation>
+  <cs:variation>
+    <a:lumMod val="50000"/>
+  </cs:variation>
+  <cs:variation>
+    <a:lumMod val="70000"/>
+    <a:lumOff val="30000"/>
+  </cs:variation>
+  <cs:variation>
+    <a:lumMod val="70000"/>
+  </cs:variation>
+  <cs:variation>
+    <a:lumMod val="50000"/>
+    <a:lumOff val="50000"/>
+  </cs:variation>
+</cs:colorStyle>
+</file>
+
+<file path=ppt/charts/style1.xml><?xml version="1.0" encoding="utf-8"?>
+<cs:chartStyle xmlns:cs="http://schemas.microsoft.com/office/drawing/2012/chartStyle" xmlns:a="http://schemas.openxmlformats.org/drawingml/2006/main" id="251">
+  <cs:axisTitle>
+    <cs:lnRef idx="0"/>
+    <cs:fillRef idx="0"/>
+    <cs:effectRef idx="0"/>
+    <cs:fontRef idx="minor">
+      <a:schemeClr val="tx1">
+        <a:lumMod val="65000"/>
+        <a:lumOff val="35000"/>
+      </a:schemeClr>
+    </cs:fontRef>
+    <cs:defRPr sz="1330" kern="1200"/>
+  </cs:axisTitle>
+  <cs:categoryAxis>
+    <cs:lnRef idx="0"/>
+    <cs:fillRef idx="0"/>
+    <cs:effectRef idx="0"/>
+    <cs:fontRef idx="minor">
+      <a:schemeClr val="tx1">
+        <a:lumMod val="65000"/>
+        <a:lumOff val="35000"/>
+      </a:schemeClr>
+    </cs:fontRef>
+    <cs:spPr>
+      <a:ln w="9525" cap="flat" cmpd="sng" algn="ctr">
+        <a:solidFill>
+          <a:schemeClr val="tx1">
+            <a:lumMod val="15000"/>
+            <a:lumOff val="85000"/>
+          </a:schemeClr>
+        </a:solidFill>
+        <a:round/>
+      </a:ln>
+    </cs:spPr>
+    <cs:defRPr sz="1197" kern="1200"/>
+  </cs:categoryAxis>
+  <cs:chartArea mods="allowNoFillOverride allowNoLineOverride">
+    <cs:lnRef idx="0"/>
+    <cs:fillRef idx="0"/>
+    <cs:effectRef idx="0"/>
+    <cs:fontRef idx="minor">
+      <a:schemeClr val="tx1"/>
+    </cs:fontRef>
+    <cs:spPr>
+      <a:solidFill>
+        <a:schemeClr val="bg1"/>
+      </a:solidFill>
+      <a:ln w="9525" cap="flat" cmpd="sng" algn="ctr">
+        <a:solidFill>
+          <a:schemeClr val="tx1">
+            <a:lumMod val="15000"/>
+            <a:lumOff val="85000"/>
+          </a:schemeClr>
+        </a:solidFill>
+        <a:round/>
+      </a:ln>
+    </cs:spPr>
+    <cs:defRPr sz="1197" kern="1200"/>
+  </cs:chartArea>
+  <cs:dataLabel>
+    <cs:lnRef idx="0"/>
+    <cs:fillRef idx="0"/>
+    <cs:effectRef idx="0"/>
+    <cs:fontRef idx="minor">
+      <a:schemeClr val="tx1">
+        <a:lumMod val="75000"/>
+        <a:lumOff val="25000"/>
+      </a:schemeClr>
+    </cs:fontRef>
+    <cs:defRPr sz="1197" kern="1200"/>
+  </cs:dataLabel>
+  <cs:dataLabelCallout>
+    <cs:lnRef idx="0"/>
+    <cs:fillRef idx="0"/>
+    <cs:effectRef idx="0"/>
+    <cs:fontRef idx="minor">
+      <a:schemeClr val="dk1">
+        <a:lumMod val="65000"/>
+        <a:lumOff val="35000"/>
+      </a:schemeClr>
+    </cs:fontRef>
+    <cs:spPr>
+      <a:solidFill>
+        <a:schemeClr val="lt1"/>
+      </a:solidFill>
+      <a:ln>
+        <a:solidFill>
+          <a:schemeClr val="dk1">
+            <a:lumMod val="25000"/>
+            <a:lumOff val="75000"/>
+          </a:schemeClr>
+        </a:solidFill>
+      </a:ln>
+    </cs:spPr>
+    <cs:defRPr sz="1197" kern="1200"/>
+    <cs:bodyPr rot="0" spcFirstLastPara="1" vertOverflow="clip" horzOverflow="clip" vert="horz" wrap="square" lIns="36576" tIns="18288" rIns="36576" bIns="18288" anchor="ctr" anchorCtr="1">
+      <a:spAutoFit/>
+    </cs:bodyPr>
+  </cs:dataLabelCallout>
+  <cs:dataPoint>
+    <cs:lnRef idx="0"/>
+    <cs:fillRef idx="1">
+      <cs:styleClr val="auto"/>
+    </cs:fillRef>
+    <cs:effectRef idx="0"/>
+    <cs:fontRef idx="minor">
+      <a:schemeClr val="tx1"/>
+    </cs:fontRef>
+    <cs:spPr>
+      <a:ln w="19050">
+        <a:solidFill>
+          <a:schemeClr val="lt1"/>
+        </a:solidFill>
+      </a:ln>
+    </cs:spPr>
+  </cs:dataPoint>
+  <cs:dataPoint3D>
+    <cs:lnRef idx="0"/>
+    <cs:fillRef idx="1">
+      <cs:styleClr val="auto"/>
+    </cs:fillRef>
+    <cs:effectRef idx="0"/>
+    <cs:fontRef idx="minor">
+      <a:schemeClr val="tx1"/>
+    </cs:fontRef>
+    <cs:spPr>
+      <a:ln w="25400">
+        <a:solidFill>
+          <a:schemeClr val="lt1"/>
+        </a:solidFill>
+      </a:ln>
+    </cs:spPr>
+  </cs:dataPoint3D>
+  <cs:dataPointLine>
+    <cs:lnRef idx="0">
+      <cs:styleClr val="auto"/>
+    </cs:lnRef>
+    <cs:fillRef idx="0"/>
+    <cs:effectRef idx="0"/>
+    <cs:fontRef idx="minor">
+      <a:schemeClr val="tx1"/>
+    </cs:fontRef>
+    <cs:spPr>
+      <a:ln w="28575" cap="rnd">
+        <a:solidFill>
+          <a:schemeClr val="phClr"/>
+        </a:solidFill>
+        <a:round/>
+      </a:ln>
+    </cs:spPr>
+  </cs:dataPointLine>
+  <cs:dataPointMarker>
+    <cs:lnRef idx="0">
+      <cs:styleClr val="auto"/>
+    </cs:lnRef>
+    <cs:fillRef idx="1">
+      <cs:styleClr val="auto"/>
+    </cs:fillRef>
+    <cs:effectRef idx="0"/>
+    <cs:fontRef idx="minor">
+      <a:schemeClr val="tx1"/>
+    </cs:fontRef>
+    <cs:spPr>
+      <a:ln w="9525">
+        <a:solidFill>
+          <a:schemeClr val="phClr"/>
+        </a:solidFill>
+      </a:ln>
+    </cs:spPr>
+  </cs:dataPointMarker>
+  <cs:dataPointMarkerLayout symbol="circle" size="5"/>
+  <cs:dataPointWireframe>
+    <cs:lnRef idx="0">
+      <cs:styleClr val="auto"/>
+    </cs:lnRef>
+    <cs:fillRef idx="0"/>
+    <cs:effectRef idx="0"/>
+    <cs:fontRef idx="minor">
+      <a:schemeClr val="tx1"/>
+    </cs:fontRef>
+    <cs:spPr>
+      <a:ln w="9525" cap="rnd">
+        <a:solidFill>
+          <a:schemeClr val="phClr"/>
+        </a:solidFill>
+        <a:round/>
+      </a:ln>
+    </cs:spPr>
+  </cs:dataPointWireframe>
+  <cs:dataTable>
+    <cs:lnRef idx="0"/>
+    <cs:fillRef idx="0"/>
+    <cs:effectRef idx="0"/>
+    <cs:fontRef idx="minor">
+      <a:schemeClr val="tx1">
+        <a:lumMod val="65000"/>
+        <a:lumOff val="35000"/>
+      </a:schemeClr>
+    </cs:fontRef>
+    <cs:spPr>
+      <a:noFill/>
+      <a:ln w="9525" cap="flat" cmpd="sng" algn="ctr">
+        <a:solidFill>
+          <a:schemeClr val="tx1">
+            <a:lumMod val="15000"/>
+            <a:lumOff val="85000"/>
+          </a:schemeClr>
+        </a:solidFill>
+        <a:round/>
+      </a:ln>
+    </cs:spPr>
+    <cs:defRPr sz="1197" kern="1200"/>
+  </cs:dataTable>
+  <cs:downBar>
+    <cs:lnRef idx="0"/>
+    <cs:fillRef idx="0"/>
+    <cs:effectRef idx="0"/>
+    <cs:fontRef idx="minor">
+      <a:schemeClr val="tx1"/>
+    </cs:fontRef>
+    <cs:spPr>
+      <a:solidFill>
+        <a:schemeClr val="dk1">
+          <a:lumMod val="75000"/>
+          <a:lumOff val="25000"/>
+        </a:schemeClr>
+      </a:solidFill>
+      <a:ln w="9525" cap="flat" cmpd="sng" algn="ctr">
+        <a:solidFill>
+          <a:schemeClr val="tx1">
+            <a:lumMod val="65000"/>
+            <a:lumOff val="35000"/>
+          </a:schemeClr>
+        </a:solidFill>
+        <a:round/>
+      </a:ln>
+    </cs:spPr>
+  </cs:downBar>
+  <cs:dropLine>
+    <cs:lnRef idx="0"/>
+    <cs:fillRef idx="0"/>
+    <cs:effectRef idx="0"/>
+    <cs:fontRef idx="minor">
+      <a:schemeClr val="tx1"/>
+    </cs:fontRef>
+    <cs:spPr>
+      <a:ln w="9525" cap="flat" cmpd="sng" algn="ctr">
+        <a:solidFill>
+          <a:schemeClr val="tx1">
+            <a:lumMod val="35000"/>
+            <a:lumOff val="65000"/>
+          </a:schemeClr>
+        </a:solidFill>
+        <a:round/>
+      </a:ln>
+    </cs:spPr>
+  </cs:dropLine>
+  <cs:errorBar>
+    <cs:lnRef idx="0"/>
+    <cs:fillRef idx="0"/>
+    <cs:effectRef idx="0"/>
+    <cs:fontRef idx="minor">
+      <a:schemeClr val="tx1"/>
+    </cs:fontRef>
+    <cs:spPr>
+      <a:ln w="9525" cap="flat" cmpd="sng" algn="ctr">
+        <a:solidFill>
+          <a:schemeClr val="tx1">
+            <a:lumMod val="65000"/>
+            <a:lumOff val="35000"/>
+          </a:schemeClr>
+        </a:solidFill>
+        <a:round/>
+      </a:ln>
+    </cs:spPr>
+  </cs:errorBar>
+  <cs:floor>
+    <cs:lnRef idx="0"/>
+    <cs:fillRef idx="0"/>
+    <cs:effectRef idx="0"/>
+    <cs:fontRef idx="minor">
+      <a:schemeClr val="tx1"/>
+    </cs:fontRef>
+    <cs:spPr>
+      <a:noFill/>
+      <a:ln>
+        <a:noFill/>
+      </a:ln>
+    </cs:spPr>
+  </cs:floor>
+  <cs:gridlineMajor>
+    <cs:lnRef idx="0"/>
+    <cs:fillRef idx="0"/>
+    <cs:effectRef idx="0"/>
+    <cs:fontRef idx="minor">
+      <a:schemeClr val="tx1"/>
+    </cs:fontRef>
+    <cs:spPr>
+      <a:ln w="9525" cap="flat" cmpd="sng" algn="ctr">
+        <a:solidFill>
+          <a:schemeClr val="tx1">
+            <a:lumMod val="15000"/>
+            <a:lumOff val="85000"/>
+          </a:schemeClr>
+        </a:solidFill>
+        <a:round/>
+      </a:ln>
+    </cs:spPr>
+  </cs:gridlineMajor>
+  <cs:gridlineMinor>
+    <cs:lnRef idx="0"/>
+    <cs:fillRef idx="0"/>
+    <cs:effectRef idx="0"/>
+    <cs:fontRef idx="minor">
+      <a:schemeClr val="tx1"/>
+    </cs:fontRef>
+    <cs:spPr>
+      <a:ln w="9525" cap="flat" cmpd="sng" algn="ctr">
+        <a:solidFill>
+          <a:schemeClr val="tx1">
+            <a:lumMod val="5000"/>
+            <a:lumOff val="95000"/>
+          </a:schemeClr>
+        </a:solidFill>
+        <a:round/>
+      </a:ln>
+    </cs:spPr>
+  </cs:gridlineMinor>
+  <cs:hiLoLine>
+    <cs:lnRef idx="0"/>
+    <cs:fillRef idx="0"/>
+    <cs:effectRef idx="0"/>
+    <cs:fontRef idx="minor">
+      <a:schemeClr val="tx1"/>
+    </cs:fontRef>
+    <cs:spPr>
+      <a:ln w="9525" cap="flat" cmpd="sng" algn="ctr">
+        <a:solidFill>
+          <a:schemeClr val="tx1">
+            <a:lumMod val="50000"/>
+            <a:lumOff val="50000"/>
+          </a:schemeClr>
+        </a:solidFill>
+        <a:round/>
+      </a:ln>
+    </cs:spPr>
+  </cs:hiLoLine>
+  <cs:leaderLine>
+    <cs:lnRef idx="0"/>
+    <cs:fillRef idx="0"/>
+    <cs:effectRef idx="0"/>
+    <cs:fontRef idx="minor">
+      <a:schemeClr val="tx1"/>
+    </cs:fontRef>
+    <cs:spPr>
+      <a:ln w="9525" cap="flat" cmpd="sng" algn="ctr">
+        <a:solidFill>
+          <a:schemeClr val="tx1">
+            <a:lumMod val="35000"/>
+            <a:lumOff val="65000"/>
+          </a:schemeClr>
+        </a:solidFill>
+        <a:round/>
+      </a:ln>
+    </cs:spPr>
+  </cs:leaderLine>
+  <cs:legend>
+    <cs:lnRef idx="0"/>
+    <cs:fillRef idx="0"/>
+    <cs:effectRef idx="0"/>
+    <cs:fontRef idx="minor">
+      <a:schemeClr val="tx1">
+        <a:lumMod val="65000"/>
+        <a:lumOff val="35000"/>
+      </a:schemeClr>
+    </cs:fontRef>
+    <cs:defRPr sz="1197" kern="1200"/>
+  </cs:legend>
+  <cs:plotArea mods="allowNoFillOverride allowNoLineOverride">
+    <cs:lnRef idx="0"/>
+    <cs:fillRef idx="0"/>
+    <cs:effectRef idx="0"/>
+    <cs:fontRef idx="minor">
+      <a:schemeClr val="tx1"/>
+    </cs:fontRef>
+  </cs:plotArea>
+  <cs:plotArea3D mods="allowNoFillOverride allowNoLineOverride">
+    <cs:lnRef idx="0"/>
+    <cs:fillRef idx="0"/>
+    <cs:effectRef idx="0"/>
+    <cs:fontRef idx="minor">
+      <a:schemeClr val="tx1"/>
+    </cs:fontRef>
+  </cs:plotArea3D>
+  <cs:seriesAxis>
+    <cs:lnRef idx="0"/>
+    <cs:fillRef idx="0"/>
+    <cs:effectRef idx="0"/>
+    <cs:fontRef idx="minor">
+      <a:schemeClr val="tx1">
+        <a:lumMod val="65000"/>
+        <a:lumOff val="35000"/>
+      </a:schemeClr>
+    </cs:fontRef>
+    <cs:defRPr sz="1197" kern="1200"/>
+  </cs:seriesAxis>
+  <cs:seriesLine>
+    <cs:lnRef idx="0"/>
+    <cs:fillRef idx="0"/>
+    <cs:effectRef idx="0"/>
+    <cs:fontRef idx="minor">
+      <a:schemeClr val="tx1"/>
+    </cs:fontRef>
+    <cs:spPr>
+      <a:ln w="9525" cap="flat" cmpd="sng" algn="ctr">
+        <a:solidFill>
+          <a:schemeClr val="tx1">
+            <a:lumMod val="35000"/>
+            <a:lumOff val="65000"/>
+          </a:schemeClr>
+        </a:solidFill>
+        <a:round/>
+      </a:ln>
+    </cs:spPr>
+  </cs:seriesLine>
+  <cs:title>
+    <cs:lnRef idx="0"/>
+    <cs:fillRef idx="0"/>
+    <cs:effectRef idx="0"/>
+    <cs:fontRef idx="minor">
+      <a:schemeClr val="tx1">
+        <a:lumMod val="65000"/>
+        <a:lumOff val="35000"/>
+      </a:schemeClr>
+    </cs:fontRef>
+    <cs:defRPr sz="1862" b="0" kern="1200" spc="0" baseline="0"/>
+  </cs:title>
+  <cs:trendline>
+    <cs:lnRef idx="0">
+      <cs:styleClr val="auto"/>
+    </cs:lnRef>
+    <cs:fillRef idx="0"/>
+    <cs:effectRef idx="0"/>
+    <cs:fontRef idx="minor">
+      <a:schemeClr val="tx1"/>
+    </cs:fontRef>
+    <cs:spPr>
+      <a:ln w="19050" cap="rnd">
+        <a:solidFill>
+          <a:schemeClr val="phClr"/>
+        </a:solidFill>
+        <a:prstDash val="sysDot"/>
+      </a:ln>
+    </cs:spPr>
+  </cs:trendline>
+  <cs:trendlineLabel>
+    <cs:lnRef idx="0"/>
+    <cs:fillRef idx="0"/>
+    <cs:effectRef idx="0"/>
+    <cs:fontRef idx="minor">
+      <a:schemeClr val="tx1">
+        <a:lumMod val="65000"/>
+        <a:lumOff val="35000"/>
+      </a:schemeClr>
+    </cs:fontRef>
+    <cs:defRPr sz="1197" kern="1200"/>
+  </cs:trendlineLabel>
+  <cs:upBar>
+    <cs:lnRef idx="0"/>
+    <cs:fillRef idx="0"/>
+    <cs:effectRef idx="0"/>
+    <cs:fontRef idx="minor">
+      <a:schemeClr val="tx1"/>
+    </cs:fontRef>
+    <cs:spPr>
+      <a:solidFill>
+        <a:schemeClr val="lt1"/>
+      </a:solidFill>
+      <a:ln w="9525" cap="flat" cmpd="sng" algn="ctr">
+        <a:solidFill>
+          <a:schemeClr val="tx1">
+            <a:lumMod val="65000"/>
+            <a:lumOff val="35000"/>
+          </a:schemeClr>
+        </a:solidFill>
+        <a:round/>
+      </a:ln>
+    </cs:spPr>
+  </cs:upBar>
+  <cs:valueAxis>
+    <cs:lnRef idx="0"/>
+    <cs:fillRef idx="0"/>
+    <cs:effectRef idx="0"/>
+    <cs:fontRef idx="minor">
+      <a:schemeClr val="tx1">
+        <a:lumMod val="65000"/>
+        <a:lumOff val="35000"/>
+      </a:schemeClr>
+    </cs:fontRef>
+    <cs:defRPr sz="1197" kern="1200"/>
+  </cs:valueAxis>
+  <cs:wall>
+    <cs:lnRef idx="0"/>
+    <cs:fillRef idx="0"/>
+    <cs:effectRef idx="0"/>
+    <cs:fontRef idx="minor">
+      <a:schemeClr val="tx1"/>
+    </cs:fontRef>
+    <cs:spPr>
+      <a:noFill/>
+      <a:ln>
+        <a:noFill/>
+      </a:ln>
+    </cs:spPr>
+  </cs:wall>
+</cs:chartStyle>
 </file>
 
 <file path=ppt/notesMasters/notesMaster1.xml><?xml version="1.0" encoding="utf-8"?>
@@ -448,7 +1386,7 @@
             <a:fld id="{F55F861E-3C59-4235-9924-AE3FDF166F3F}" type="datetimeFigureOut">
               <a:rPr lang="es-AR" smtClean="0"/>
               <a:pPr/>
-              <a:t>09/11/2019</a:t>
+              <a:t>10/11/2019</a:t>
             </a:fld>
             <a:endParaRPr lang="es-AR"/>
           </a:p>
@@ -617,7 +1555,7 @@
     </p:spTree>
     <p:extLst>
       <p:ext uri="{BB962C8B-B14F-4D97-AF65-F5344CB8AC3E}">
-        <p14:creationId xmlns:p14="http://schemas.microsoft.com/office/powerpoint/2010/main" xmlns="" val="1580866007"/>
+        <p14:creationId xmlns:p14="http://schemas.microsoft.com/office/powerpoint/2010/main" val="1580866007"/>
       </p:ext>
     </p:extLst>
   </p:cSld>
@@ -1220,7 +2158,7 @@
             <a:fld id="{59D4168E-E6F0-4E6D-9E98-0FBF44047F1D}" type="datetimeFigureOut">
               <a:rPr lang="es-AR" smtClean="0"/>
               <a:pPr/>
-              <a:t>09/11/2019</a:t>
+              <a:t>10/11/2019</a:t>
             </a:fld>
             <a:endParaRPr lang="es-AR"/>
           </a:p>
@@ -1279,7 +2217,7 @@
           <p:cNvPr id="8" name="Imagen 7">
             <a:extLst>
               <a:ext uri="{FF2B5EF4-FFF2-40B4-BE49-F238E27FC236}">
-                <a16:creationId xmlns:a16="http://schemas.microsoft.com/office/drawing/2014/main" xmlns="" id="{153E41C7-C0FB-4283-8821-79FB890C108B}"/>
+                <a16:creationId xmlns:a16="http://schemas.microsoft.com/office/drawing/2014/main" id="{153E41C7-C0FB-4283-8821-79FB890C108B}"/>
               </a:ext>
             </a:extLst>
           </p:cNvPr>
@@ -1292,7 +2230,7 @@
           <a:blip r:embed="rId2" cstate="print">
             <a:extLst>
               <a:ext uri="{28A0092B-C50C-407E-A947-70E740481C1C}">
-                <a14:useLocalDpi xmlns:a14="http://schemas.microsoft.com/office/drawing/2010/main" xmlns="" val="0"/>
+                <a14:useLocalDpi xmlns:a14="http://schemas.microsoft.com/office/drawing/2010/main" val="0"/>
               </a:ext>
             </a:extLst>
           </a:blip>
@@ -1313,7 +2251,7 @@
     </p:spTree>
     <p:extLst>
       <p:ext uri="{BB962C8B-B14F-4D97-AF65-F5344CB8AC3E}">
-        <p14:creationId xmlns:p14="http://schemas.microsoft.com/office/powerpoint/2010/main" xmlns="" val="594578851"/>
+        <p14:creationId xmlns:p14="http://schemas.microsoft.com/office/powerpoint/2010/main" val="594578851"/>
       </p:ext>
     </p:extLst>
   </p:cSld>
@@ -1554,7 +2492,7 @@
             <a:fld id="{59D4168E-E6F0-4E6D-9E98-0FBF44047F1D}" type="datetimeFigureOut">
               <a:rPr lang="es-AR" smtClean="0"/>
               <a:pPr/>
-              <a:t>09/11/2019</a:t>
+              <a:t>10/11/2019</a:t>
             </a:fld>
             <a:endParaRPr lang="es-AR"/>
           </a:p>
@@ -1606,7 +2544,7 @@
     </p:spTree>
     <p:extLst>
       <p:ext uri="{BB962C8B-B14F-4D97-AF65-F5344CB8AC3E}">
-        <p14:creationId xmlns:p14="http://schemas.microsoft.com/office/powerpoint/2010/main" xmlns="" val="2858870748"/>
+        <p14:creationId xmlns:p14="http://schemas.microsoft.com/office/powerpoint/2010/main" val="2858870748"/>
       </p:ext>
     </p:extLst>
   </p:cSld>
@@ -1804,7 +2742,7 @@
             <a:fld id="{59D4168E-E6F0-4E6D-9E98-0FBF44047F1D}" type="datetimeFigureOut">
               <a:rPr lang="es-AR" smtClean="0"/>
               <a:pPr/>
-              <a:t>09/11/2019</a:t>
+              <a:t>10/11/2019</a:t>
             </a:fld>
             <a:endParaRPr lang="es-AR"/>
           </a:p>
@@ -1856,7 +2794,7 @@
     </p:spTree>
     <p:extLst>
       <p:ext uri="{BB962C8B-B14F-4D97-AF65-F5344CB8AC3E}">
-        <p14:creationId xmlns:p14="http://schemas.microsoft.com/office/powerpoint/2010/main" xmlns="" val="2887001581"/>
+        <p14:creationId xmlns:p14="http://schemas.microsoft.com/office/powerpoint/2010/main" val="2887001581"/>
       </p:ext>
     </p:extLst>
   </p:cSld>
@@ -2346,7 +3284,7 @@
             <a:fld id="{59D4168E-E6F0-4E6D-9E98-0FBF44047F1D}" type="datetimeFigureOut">
               <a:rPr lang="es-AR" smtClean="0"/>
               <a:pPr/>
-              <a:t>09/11/2019</a:t>
+              <a:t>10/11/2019</a:t>
             </a:fld>
             <a:endParaRPr lang="es-AR"/>
           </a:p>
@@ -2398,7 +3336,7 @@
     </p:spTree>
     <p:extLst>
       <p:ext uri="{BB962C8B-B14F-4D97-AF65-F5344CB8AC3E}">
-        <p14:creationId xmlns:p14="http://schemas.microsoft.com/office/powerpoint/2010/main" xmlns="" val="953477666"/>
+        <p14:creationId xmlns:p14="http://schemas.microsoft.com/office/powerpoint/2010/main" val="953477666"/>
       </p:ext>
     </p:extLst>
   </p:cSld>
@@ -2596,7 +3534,7 @@
             <a:fld id="{59D4168E-E6F0-4E6D-9E98-0FBF44047F1D}" type="datetimeFigureOut">
               <a:rPr lang="es-AR" smtClean="0"/>
               <a:pPr/>
-              <a:t>09/11/2019</a:t>
+              <a:t>10/11/2019</a:t>
             </a:fld>
             <a:endParaRPr lang="es-AR"/>
           </a:p>
@@ -2648,7 +3586,7 @@
     </p:spTree>
     <p:extLst>
       <p:ext uri="{BB962C8B-B14F-4D97-AF65-F5344CB8AC3E}">
-        <p14:creationId xmlns:p14="http://schemas.microsoft.com/office/powerpoint/2010/main" xmlns="" val="2881036134"/>
+        <p14:creationId xmlns:p14="http://schemas.microsoft.com/office/powerpoint/2010/main" val="2881036134"/>
       </p:ext>
     </p:extLst>
   </p:cSld>
@@ -3130,7 +4068,7 @@
             <a:fld id="{59D4168E-E6F0-4E6D-9E98-0FBF44047F1D}" type="datetimeFigureOut">
               <a:rPr lang="es-AR" smtClean="0"/>
               <a:pPr/>
-              <a:t>09/11/2019</a:t>
+              <a:t>10/11/2019</a:t>
             </a:fld>
             <a:endParaRPr lang="es-AR"/>
           </a:p>
@@ -3182,7 +4120,7 @@
     </p:spTree>
     <p:extLst>
       <p:ext uri="{BB962C8B-B14F-4D97-AF65-F5344CB8AC3E}">
-        <p14:creationId xmlns:p14="http://schemas.microsoft.com/office/powerpoint/2010/main" xmlns="" val="3557333580"/>
+        <p14:creationId xmlns:p14="http://schemas.microsoft.com/office/powerpoint/2010/main" val="3557333580"/>
       </p:ext>
     </p:extLst>
   </p:cSld>
@@ -3429,7 +4367,7 @@
             <a:fld id="{59D4168E-E6F0-4E6D-9E98-0FBF44047F1D}" type="datetimeFigureOut">
               <a:rPr lang="es-AR" smtClean="0"/>
               <a:pPr/>
-              <a:t>09/11/2019</a:t>
+              <a:t>10/11/2019</a:t>
             </a:fld>
             <a:endParaRPr lang="es-AR"/>
           </a:p>
@@ -3481,7 +4419,7 @@
     </p:spTree>
     <p:extLst>
       <p:ext uri="{BB962C8B-B14F-4D97-AF65-F5344CB8AC3E}">
-        <p14:creationId xmlns:p14="http://schemas.microsoft.com/office/powerpoint/2010/main" xmlns="" val="2020671905"/>
+        <p14:creationId xmlns:p14="http://schemas.microsoft.com/office/powerpoint/2010/main" val="2020671905"/>
       </p:ext>
     </p:extLst>
   </p:cSld>
@@ -3605,7 +4543,7 @@
             <a:fld id="{59D4168E-E6F0-4E6D-9E98-0FBF44047F1D}" type="datetimeFigureOut">
               <a:rPr lang="es-AR" smtClean="0"/>
               <a:pPr/>
-              <a:t>09/11/2019</a:t>
+              <a:t>10/11/2019</a:t>
             </a:fld>
             <a:endParaRPr lang="es-AR"/>
           </a:p>
@@ -3657,7 +4595,7 @@
     </p:spTree>
     <p:extLst>
       <p:ext uri="{BB962C8B-B14F-4D97-AF65-F5344CB8AC3E}">
-        <p14:creationId xmlns:p14="http://schemas.microsoft.com/office/powerpoint/2010/main" xmlns="" val="3698065381"/>
+        <p14:creationId xmlns:p14="http://schemas.microsoft.com/office/powerpoint/2010/main" val="3698065381"/>
       </p:ext>
     </p:extLst>
   </p:cSld>
@@ -3787,7 +4725,7 @@
             <a:fld id="{59D4168E-E6F0-4E6D-9E98-0FBF44047F1D}" type="datetimeFigureOut">
               <a:rPr lang="es-AR" smtClean="0"/>
               <a:pPr/>
-              <a:t>09/11/2019</a:t>
+              <a:t>10/11/2019</a:t>
             </a:fld>
             <a:endParaRPr lang="es-AR"/>
           </a:p>
@@ -3839,7 +4777,7 @@
     </p:spTree>
     <p:extLst>
       <p:ext uri="{BB962C8B-B14F-4D97-AF65-F5344CB8AC3E}">
-        <p14:creationId xmlns:p14="http://schemas.microsoft.com/office/powerpoint/2010/main" xmlns="" val="2361575083"/>
+        <p14:creationId xmlns:p14="http://schemas.microsoft.com/office/powerpoint/2010/main" val="2361575083"/>
       </p:ext>
     </p:extLst>
   </p:cSld>
@@ -3965,7 +4903,7 @@
             <a:fld id="{59D4168E-E6F0-4E6D-9E98-0FBF44047F1D}" type="datetimeFigureOut">
               <a:rPr lang="es-AR" smtClean="0"/>
               <a:pPr/>
-              <a:t>09/11/2019</a:t>
+              <a:t>10/11/2019</a:t>
             </a:fld>
             <a:endParaRPr lang="es-AR"/>
           </a:p>
@@ -4024,7 +4962,7 @@
           <p:cNvPr id="8" name="Imagen 7">
             <a:extLst>
               <a:ext uri="{FF2B5EF4-FFF2-40B4-BE49-F238E27FC236}">
-                <a16:creationId xmlns:a16="http://schemas.microsoft.com/office/drawing/2014/main" xmlns="" id="{F65BAB47-52C5-4418-98C7-5ABDFBAB2220}"/>
+                <a16:creationId xmlns:a16="http://schemas.microsoft.com/office/drawing/2014/main" id="{F65BAB47-52C5-4418-98C7-5ABDFBAB2220}"/>
               </a:ext>
             </a:extLst>
           </p:cNvPr>
@@ -4037,7 +4975,7 @@
           <a:blip r:embed="rId2" cstate="print">
             <a:extLst>
               <a:ext uri="{28A0092B-C50C-407E-A947-70E740481C1C}">
-                <a14:useLocalDpi xmlns:a14="http://schemas.microsoft.com/office/drawing/2010/main" xmlns="" val="0"/>
+                <a14:useLocalDpi xmlns:a14="http://schemas.microsoft.com/office/drawing/2010/main" val="0"/>
               </a:ext>
             </a:extLst>
           </a:blip>
@@ -4058,7 +4996,7 @@
     </p:spTree>
     <p:extLst>
       <p:ext uri="{BB962C8B-B14F-4D97-AF65-F5344CB8AC3E}">
-        <p14:creationId xmlns:p14="http://schemas.microsoft.com/office/powerpoint/2010/main" xmlns="" val="3522170283"/>
+        <p14:creationId xmlns:p14="http://schemas.microsoft.com/office/powerpoint/2010/main" val="3522170283"/>
       </p:ext>
     </p:extLst>
   </p:cSld>
@@ -4254,7 +5192,7 @@
             <a:fld id="{59D4168E-E6F0-4E6D-9E98-0FBF44047F1D}" type="datetimeFigureOut">
               <a:rPr lang="es-AR" smtClean="0"/>
               <a:pPr/>
-              <a:t>09/11/2019</a:t>
+              <a:t>10/11/2019</a:t>
             </a:fld>
             <a:endParaRPr lang="es-AR"/>
           </a:p>
@@ -4306,7 +5244,7 @@
     </p:spTree>
     <p:extLst>
       <p:ext uri="{BB962C8B-B14F-4D97-AF65-F5344CB8AC3E}">
-        <p14:creationId xmlns:p14="http://schemas.microsoft.com/office/powerpoint/2010/main" xmlns="" val="2921707453"/>
+        <p14:creationId xmlns:p14="http://schemas.microsoft.com/office/powerpoint/2010/main" val="2921707453"/>
       </p:ext>
     </p:extLst>
   </p:cSld>
@@ -4553,7 +5491,7 @@
             <a:fld id="{59D4168E-E6F0-4E6D-9E98-0FBF44047F1D}" type="datetimeFigureOut">
               <a:rPr lang="es-AR" smtClean="0"/>
               <a:pPr/>
-              <a:t>09/11/2019</a:t>
+              <a:t>10/11/2019</a:t>
             </a:fld>
             <a:endParaRPr lang="es-AR"/>
           </a:p>
@@ -4605,7 +5543,7 @@
     </p:spTree>
     <p:extLst>
       <p:ext uri="{BB962C8B-B14F-4D97-AF65-F5344CB8AC3E}">
-        <p14:creationId xmlns:p14="http://schemas.microsoft.com/office/powerpoint/2010/main" xmlns="" val="1855319959"/>
+        <p14:creationId xmlns:p14="http://schemas.microsoft.com/office/powerpoint/2010/main" val="1855319959"/>
       </p:ext>
     </p:extLst>
   </p:cSld>
@@ -4997,7 +5935,7 @@
             <a:fld id="{59D4168E-E6F0-4E6D-9E98-0FBF44047F1D}" type="datetimeFigureOut">
               <a:rPr lang="es-AR" smtClean="0"/>
               <a:pPr/>
-              <a:t>09/11/2019</a:t>
+              <a:t>10/11/2019</a:t>
             </a:fld>
             <a:endParaRPr lang="es-AR"/>
           </a:p>
@@ -5049,7 +5987,7 @@
     </p:spTree>
     <p:extLst>
       <p:ext uri="{BB962C8B-B14F-4D97-AF65-F5344CB8AC3E}">
-        <p14:creationId xmlns:p14="http://schemas.microsoft.com/office/powerpoint/2010/main" xmlns="" val="522982594"/>
+        <p14:creationId xmlns:p14="http://schemas.microsoft.com/office/powerpoint/2010/main" val="522982594"/>
       </p:ext>
     </p:extLst>
   </p:cSld>
@@ -5117,7 +6055,7 @@
             <a:fld id="{59D4168E-E6F0-4E6D-9E98-0FBF44047F1D}" type="datetimeFigureOut">
               <a:rPr lang="es-AR" smtClean="0"/>
               <a:pPr/>
-              <a:t>09/11/2019</a:t>
+              <a:t>10/11/2019</a:t>
             </a:fld>
             <a:endParaRPr lang="es-AR"/>
           </a:p>
@@ -5169,7 +6107,7 @@
     </p:spTree>
     <p:extLst>
       <p:ext uri="{BB962C8B-B14F-4D97-AF65-F5344CB8AC3E}">
-        <p14:creationId xmlns:p14="http://schemas.microsoft.com/office/powerpoint/2010/main" xmlns="" val="3355991177"/>
+        <p14:creationId xmlns:p14="http://schemas.microsoft.com/office/powerpoint/2010/main" val="3355991177"/>
       </p:ext>
     </p:extLst>
   </p:cSld>
@@ -5214,7 +6152,7 @@
             <a:fld id="{59D4168E-E6F0-4E6D-9E98-0FBF44047F1D}" type="datetimeFigureOut">
               <a:rPr lang="es-AR" smtClean="0"/>
               <a:pPr/>
-              <a:t>09/11/2019</a:t>
+              <a:t>10/11/2019</a:t>
             </a:fld>
             <a:endParaRPr lang="es-AR"/>
           </a:p>
@@ -5266,7 +6204,7 @@
     </p:spTree>
     <p:extLst>
       <p:ext uri="{BB962C8B-B14F-4D97-AF65-F5344CB8AC3E}">
-        <p14:creationId xmlns:p14="http://schemas.microsoft.com/office/powerpoint/2010/main" xmlns="" val="2067178301"/>
+        <p14:creationId xmlns:p14="http://schemas.microsoft.com/office/powerpoint/2010/main" val="2067178301"/>
       </p:ext>
     </p:extLst>
   </p:cSld>
@@ -5499,7 +6437,7 @@
             <a:fld id="{59D4168E-E6F0-4E6D-9E98-0FBF44047F1D}" type="datetimeFigureOut">
               <a:rPr lang="es-AR" smtClean="0"/>
               <a:pPr/>
-              <a:t>09/11/2019</a:t>
+              <a:t>10/11/2019</a:t>
             </a:fld>
             <a:endParaRPr lang="es-AR"/>
           </a:p>
@@ -5551,7 +6489,7 @@
     </p:spTree>
     <p:extLst>
       <p:ext uri="{BB962C8B-B14F-4D97-AF65-F5344CB8AC3E}">
-        <p14:creationId xmlns:p14="http://schemas.microsoft.com/office/powerpoint/2010/main" xmlns="" val="1822716033"/>
+        <p14:creationId xmlns:p14="http://schemas.microsoft.com/office/powerpoint/2010/main" val="1822716033"/>
       </p:ext>
     </p:extLst>
   </p:cSld>
@@ -5792,7 +6730,7 @@
             <a:fld id="{59D4168E-E6F0-4E6D-9E98-0FBF44047F1D}" type="datetimeFigureOut">
               <a:rPr lang="es-AR" smtClean="0"/>
               <a:pPr/>
-              <a:t>09/11/2019</a:t>
+              <a:t>10/11/2019</a:t>
             </a:fld>
             <a:endParaRPr lang="es-AR"/>
           </a:p>
@@ -5844,7 +6782,7 @@
     </p:spTree>
     <p:extLst>
       <p:ext uri="{BB962C8B-B14F-4D97-AF65-F5344CB8AC3E}">
-        <p14:creationId xmlns:p14="http://schemas.microsoft.com/office/powerpoint/2010/main" xmlns="" val="2752311715"/>
+        <p14:creationId xmlns:p14="http://schemas.microsoft.com/office/powerpoint/2010/main" val="2752311715"/>
       </p:ext>
     </p:extLst>
   </p:cSld>
@@ -6324,7 +7262,7 @@
             <a:fld id="{59D4168E-E6F0-4E6D-9E98-0FBF44047F1D}" type="datetimeFigureOut">
               <a:rPr lang="es-AR" smtClean="0"/>
               <a:pPr/>
-              <a:t>09/11/2019</a:t>
+              <a:t>10/11/2019</a:t>
             </a:fld>
             <a:endParaRPr lang="es-AR"/>
           </a:p>
@@ -6412,7 +7350,7 @@
     </p:spTree>
     <p:extLst>
       <p:ext uri="{BB962C8B-B14F-4D97-AF65-F5344CB8AC3E}">
-        <p14:creationId xmlns:p14="http://schemas.microsoft.com/office/powerpoint/2010/main" xmlns="" val="761644953"/>
+        <p14:creationId xmlns:p14="http://schemas.microsoft.com/office/powerpoint/2010/main" val="761644953"/>
       </p:ext>
     </p:extLst>
   </p:cSld>
@@ -6861,7 +7799,7 @@
           <p:cNvPr id="2" name="Título 1">
             <a:extLst>
               <a:ext uri="{FF2B5EF4-FFF2-40B4-BE49-F238E27FC236}">
-                <a16:creationId xmlns:a16="http://schemas.microsoft.com/office/drawing/2014/main" xmlns="" id="{8CE1749D-25BE-4B8A-9C39-0568C1DB7176}"/>
+                <a16:creationId xmlns:a16="http://schemas.microsoft.com/office/drawing/2014/main" id="{8CE1749D-25BE-4B8A-9C39-0568C1DB7176}"/>
               </a:ext>
             </a:extLst>
           </p:cNvPr>
@@ -6894,7 +7832,7 @@
           <p:cNvPr id="5" name="Subtítulo 2">
             <a:extLst>
               <a:ext uri="{FF2B5EF4-FFF2-40B4-BE49-F238E27FC236}">
-                <a16:creationId xmlns:a16="http://schemas.microsoft.com/office/drawing/2014/main" xmlns="" id="{77C0998F-42B9-4F94-A4C5-FB800997D545}"/>
+                <a16:creationId xmlns:a16="http://schemas.microsoft.com/office/drawing/2014/main" id="{77C0998F-42B9-4F94-A4C5-FB800997D545}"/>
               </a:ext>
             </a:extLst>
           </p:cNvPr>
@@ -6929,7 +7867,7 @@
           <p:cNvPr id="3" name="CuadroTexto 2">
             <a:extLst>
               <a:ext uri="{FF2B5EF4-FFF2-40B4-BE49-F238E27FC236}">
-                <a16:creationId xmlns:a16="http://schemas.microsoft.com/office/drawing/2014/main" xmlns="" id="{EC53297C-9824-45B9-8927-A6834EB1DBD1}"/>
+                <a16:creationId xmlns:a16="http://schemas.microsoft.com/office/drawing/2014/main" id="{EC53297C-9824-45B9-8927-A6834EB1DBD1}"/>
               </a:ext>
             </a:extLst>
           </p:cNvPr>
@@ -6994,7 +7932,7 @@
           <p:cNvPr id="6" name="Imagen 5">
             <a:extLst>
               <a:ext uri="{FF2B5EF4-FFF2-40B4-BE49-F238E27FC236}">
-                <a16:creationId xmlns:a16="http://schemas.microsoft.com/office/drawing/2014/main" xmlns="" id="{765DC11C-9D6D-4F31-9AC7-1EFE6E6D455C}"/>
+                <a16:creationId xmlns:a16="http://schemas.microsoft.com/office/drawing/2014/main" id="{765DC11C-9D6D-4F31-9AC7-1EFE6E6D455C}"/>
               </a:ext>
             </a:extLst>
           </p:cNvPr>
@@ -7007,7 +7945,7 @@
           <a:blip r:embed="rId2" cstate="print">
             <a:extLst>
               <a:ext uri="{28A0092B-C50C-407E-A947-70E740481C1C}">
-                <a14:useLocalDpi xmlns:a14="http://schemas.microsoft.com/office/drawing/2010/main" xmlns="" val="0"/>
+                <a14:useLocalDpi xmlns:a14="http://schemas.microsoft.com/office/drawing/2010/main" val="0"/>
               </a:ext>
             </a:extLst>
           </a:blip>
@@ -7028,7 +7966,7 @@
     </p:spTree>
     <p:extLst>
       <p:ext uri="{BB962C8B-B14F-4D97-AF65-F5344CB8AC3E}">
-        <p14:creationId xmlns:p14="http://schemas.microsoft.com/office/powerpoint/2010/main" xmlns="" val="2967959437"/>
+        <p14:creationId xmlns:p14="http://schemas.microsoft.com/office/powerpoint/2010/main" val="2967959437"/>
       </p:ext>
     </p:extLst>
   </p:cSld>
@@ -7060,7 +7998,7 @@
           <p:cNvPr id="2" name="Título 1">
             <a:extLst>
               <a:ext uri="{FF2B5EF4-FFF2-40B4-BE49-F238E27FC236}">
-                <a16:creationId xmlns:a16="http://schemas.microsoft.com/office/drawing/2014/main" xmlns="" id="{CAF4FE63-0F55-4EEF-8842-BB6A3638AF69}"/>
+                <a16:creationId xmlns:a16="http://schemas.microsoft.com/office/drawing/2014/main" id="{CAF4FE63-0F55-4EEF-8842-BB6A3638AF69}"/>
               </a:ext>
             </a:extLst>
           </p:cNvPr>
@@ -7093,7 +8031,7 @@
           <p:cNvPr id="3" name="Marcador de contenido 2">
             <a:extLst>
               <a:ext uri="{FF2B5EF4-FFF2-40B4-BE49-F238E27FC236}">
-                <a16:creationId xmlns:a16="http://schemas.microsoft.com/office/drawing/2014/main" xmlns="" id="{7C013F95-5617-4D6D-B332-E32197B1B877}"/>
+                <a16:creationId xmlns:a16="http://schemas.microsoft.com/office/drawing/2014/main" id="{7C013F95-5617-4D6D-B332-E32197B1B877}"/>
               </a:ext>
             </a:extLst>
           </p:cNvPr>
@@ -7152,7 +8090,7 @@
     </p:spTree>
     <p:extLst>
       <p:ext uri="{BB962C8B-B14F-4D97-AF65-F5344CB8AC3E}">
-        <p14:creationId xmlns:p14="http://schemas.microsoft.com/office/powerpoint/2010/main" xmlns="" val="1323728016"/>
+        <p14:creationId xmlns:p14="http://schemas.microsoft.com/office/powerpoint/2010/main" val="1323728016"/>
       </p:ext>
     </p:extLst>
   </p:cSld>
@@ -7184,7 +8122,7 @@
           <p:cNvPr id="2" name="Título 1">
             <a:extLst>
               <a:ext uri="{FF2B5EF4-FFF2-40B4-BE49-F238E27FC236}">
-                <a16:creationId xmlns:a16="http://schemas.microsoft.com/office/drawing/2014/main" xmlns="" id="{160713EF-2C24-4802-8755-A926FAEF4588}"/>
+                <a16:creationId xmlns:a16="http://schemas.microsoft.com/office/drawing/2014/main" id="{160713EF-2C24-4802-8755-A926FAEF4588}"/>
               </a:ext>
             </a:extLst>
           </p:cNvPr>
@@ -7221,7 +8159,7 @@
           <p:nvPr>
             <p:extLst>
               <p:ext uri="{D42A27DB-BD31-4B8C-83A1-F6EECF244321}">
-                <p14:modId xmlns:p14="http://schemas.microsoft.com/office/powerpoint/2010/main" xmlns="" val="4061205486"/>
+                <p14:modId xmlns:p14="http://schemas.microsoft.com/office/powerpoint/2010/main" val="4061205486"/>
               </p:ext>
             </p:extLst>
           </p:nvPr>
@@ -7238,14 +8176,14 @@
                 <a:gridCol w="7177710">
                   <a:extLst>
                     <a:ext uri="{9D8B030D-6E8A-4147-A177-3AD203B41FA5}">
-                      <a16:colId xmlns:a16="http://schemas.microsoft.com/office/drawing/2014/main" xmlns="" val="20000"/>
+                      <a16:colId xmlns:a16="http://schemas.microsoft.com/office/drawing/2014/main" val="20000"/>
                     </a:ext>
                   </a:extLst>
                 </a:gridCol>
                 <a:gridCol w="2482106">
                   <a:extLst>
                     <a:ext uri="{9D8B030D-6E8A-4147-A177-3AD203B41FA5}">
-                      <a16:colId xmlns:a16="http://schemas.microsoft.com/office/drawing/2014/main" xmlns="" val="20001"/>
+                      <a16:colId xmlns:a16="http://schemas.microsoft.com/office/drawing/2014/main" val="20001"/>
                     </a:ext>
                   </a:extLst>
                 </a:gridCol>
@@ -7399,7 +8337,7 @@
                 </a:tc>
                 <a:extLst>
                   <a:ext uri="{0D108BD9-81ED-4DB2-BD59-A6C34878D82A}">
-                    <a16:rowId xmlns:a16="http://schemas.microsoft.com/office/drawing/2014/main" xmlns="" val="10000"/>
+                    <a16:rowId xmlns:a16="http://schemas.microsoft.com/office/drawing/2014/main" val="10000"/>
                   </a:ext>
                 </a:extLst>
               </a:tr>
@@ -7546,7 +8484,7 @@
                 </a:tc>
                 <a:extLst>
                   <a:ext uri="{0D108BD9-81ED-4DB2-BD59-A6C34878D82A}">
-                    <a16:rowId xmlns:a16="http://schemas.microsoft.com/office/drawing/2014/main" xmlns="" val="10001"/>
+                    <a16:rowId xmlns:a16="http://schemas.microsoft.com/office/drawing/2014/main" val="10001"/>
                   </a:ext>
                 </a:extLst>
               </a:tr>
@@ -7693,7 +8631,7 @@
                 </a:tc>
                 <a:extLst>
                   <a:ext uri="{0D108BD9-81ED-4DB2-BD59-A6C34878D82A}">
-                    <a16:rowId xmlns:a16="http://schemas.microsoft.com/office/drawing/2014/main" xmlns="" val="10002"/>
+                    <a16:rowId xmlns:a16="http://schemas.microsoft.com/office/drawing/2014/main" val="10002"/>
                   </a:ext>
                 </a:extLst>
               </a:tr>
@@ -7861,7 +8799,7 @@
                 </a:tc>
                 <a:extLst>
                   <a:ext uri="{0D108BD9-81ED-4DB2-BD59-A6C34878D82A}">
-                    <a16:rowId xmlns:a16="http://schemas.microsoft.com/office/drawing/2014/main" xmlns="" val="10003"/>
+                    <a16:rowId xmlns:a16="http://schemas.microsoft.com/office/drawing/2014/main" val="10003"/>
                   </a:ext>
                 </a:extLst>
               </a:tr>
@@ -8008,7 +8946,7 @@
                 </a:tc>
                 <a:extLst>
                   <a:ext uri="{0D108BD9-81ED-4DB2-BD59-A6C34878D82A}">
-                    <a16:rowId xmlns:a16="http://schemas.microsoft.com/office/drawing/2014/main" xmlns="" val="10004"/>
+                    <a16:rowId xmlns:a16="http://schemas.microsoft.com/office/drawing/2014/main" val="10004"/>
                   </a:ext>
                 </a:extLst>
               </a:tr>
@@ -8155,7 +9093,7 @@
                 </a:tc>
                 <a:extLst>
                   <a:ext uri="{0D108BD9-81ED-4DB2-BD59-A6C34878D82A}">
-                    <a16:rowId xmlns:a16="http://schemas.microsoft.com/office/drawing/2014/main" xmlns="" val="10005"/>
+                    <a16:rowId xmlns:a16="http://schemas.microsoft.com/office/drawing/2014/main" val="10005"/>
                   </a:ext>
                 </a:extLst>
               </a:tr>
@@ -8323,7 +9261,7 @@
                 </a:tc>
                 <a:extLst>
                   <a:ext uri="{0D108BD9-81ED-4DB2-BD59-A6C34878D82A}">
-                    <a16:rowId xmlns:a16="http://schemas.microsoft.com/office/drawing/2014/main" xmlns="" val="10006"/>
+                    <a16:rowId xmlns:a16="http://schemas.microsoft.com/office/drawing/2014/main" val="10006"/>
                   </a:ext>
                 </a:extLst>
               </a:tr>
@@ -8491,7 +9429,7 @@
                 </a:tc>
                 <a:extLst>
                   <a:ext uri="{0D108BD9-81ED-4DB2-BD59-A6C34878D82A}">
-                    <a16:rowId xmlns:a16="http://schemas.microsoft.com/office/drawing/2014/main" xmlns="" val="10007"/>
+                    <a16:rowId xmlns:a16="http://schemas.microsoft.com/office/drawing/2014/main" val="10007"/>
                   </a:ext>
                 </a:extLst>
               </a:tr>
@@ -8638,7 +9576,7 @@
                 </a:tc>
                 <a:extLst>
                   <a:ext uri="{0D108BD9-81ED-4DB2-BD59-A6C34878D82A}">
-                    <a16:rowId xmlns:a16="http://schemas.microsoft.com/office/drawing/2014/main" xmlns="" val="10008"/>
+                    <a16:rowId xmlns:a16="http://schemas.microsoft.com/office/drawing/2014/main" val="10008"/>
                   </a:ext>
                 </a:extLst>
               </a:tr>
@@ -8785,7 +9723,7 @@
                 </a:tc>
                 <a:extLst>
                   <a:ext uri="{0D108BD9-81ED-4DB2-BD59-A6C34878D82A}">
-                    <a16:rowId xmlns:a16="http://schemas.microsoft.com/office/drawing/2014/main" xmlns="" val="10009"/>
+                    <a16:rowId xmlns:a16="http://schemas.microsoft.com/office/drawing/2014/main" val="10009"/>
                   </a:ext>
                 </a:extLst>
               </a:tr>
@@ -8932,7 +9870,7 @@
                 </a:tc>
                 <a:extLst>
                   <a:ext uri="{0D108BD9-81ED-4DB2-BD59-A6C34878D82A}">
-                    <a16:rowId xmlns:a16="http://schemas.microsoft.com/office/drawing/2014/main" xmlns="" val="10010"/>
+                    <a16:rowId xmlns:a16="http://schemas.microsoft.com/office/drawing/2014/main" val="10010"/>
                   </a:ext>
                 </a:extLst>
               </a:tr>
@@ -8943,7 +9881,7 @@
     </p:spTree>
     <p:extLst>
       <p:ext uri="{BB962C8B-B14F-4D97-AF65-F5344CB8AC3E}">
-        <p14:creationId xmlns:p14="http://schemas.microsoft.com/office/powerpoint/2010/main" xmlns="" val="2337319428"/>
+        <p14:creationId xmlns:p14="http://schemas.microsoft.com/office/powerpoint/2010/main" val="2337319428"/>
       </p:ext>
     </p:extLst>
   </p:cSld>
@@ -8975,7 +9913,7 @@
           <p:cNvPr id="2" name="Título 1">
             <a:extLst>
               <a:ext uri="{FF2B5EF4-FFF2-40B4-BE49-F238E27FC236}">
-                <a16:creationId xmlns:a16="http://schemas.microsoft.com/office/drawing/2014/main" xmlns="" id="{6EB0A5A3-C538-4066-BB19-7EA82C4802A3}"/>
+                <a16:creationId xmlns:a16="http://schemas.microsoft.com/office/drawing/2014/main" id="{6EB0A5A3-C538-4066-BB19-7EA82C4802A3}"/>
               </a:ext>
             </a:extLst>
           </p:cNvPr>
@@ -9008,7 +9946,7 @@
           <p:cNvPr id="3" name="Marcador de contenido 2">
             <a:extLst>
               <a:ext uri="{FF2B5EF4-FFF2-40B4-BE49-F238E27FC236}">
-                <a16:creationId xmlns:a16="http://schemas.microsoft.com/office/drawing/2014/main" xmlns="" id="{C0C1B49A-983E-49F2-B559-B071EE7D9A5F}"/>
+                <a16:creationId xmlns:a16="http://schemas.microsoft.com/office/drawing/2014/main" id="{C0C1B49A-983E-49F2-B559-B071EE7D9A5F}"/>
               </a:ext>
             </a:extLst>
           </p:cNvPr>
@@ -9101,7 +10039,7 @@
     </p:spTree>
     <p:extLst>
       <p:ext uri="{BB962C8B-B14F-4D97-AF65-F5344CB8AC3E}">
-        <p14:creationId xmlns:p14="http://schemas.microsoft.com/office/powerpoint/2010/main" xmlns="" val="1277102518"/>
+        <p14:creationId xmlns:p14="http://schemas.microsoft.com/office/powerpoint/2010/main" val="1277102518"/>
       </p:ext>
     </p:extLst>
   </p:cSld>
@@ -9133,7 +10071,7 @@
           <p:cNvPr id="2" name="Título 1">
             <a:extLst>
               <a:ext uri="{FF2B5EF4-FFF2-40B4-BE49-F238E27FC236}">
-                <a16:creationId xmlns:a16="http://schemas.microsoft.com/office/drawing/2014/main" xmlns="" id="{6EB0A5A3-C538-4066-BB19-7EA82C4802A3}"/>
+                <a16:creationId xmlns:a16="http://schemas.microsoft.com/office/drawing/2014/main" id="{6EB0A5A3-C538-4066-BB19-7EA82C4802A3}"/>
               </a:ext>
             </a:extLst>
           </p:cNvPr>
@@ -9166,7 +10104,7 @@
           <p:cNvPr id="3" name="Marcador de contenido 2">
             <a:extLst>
               <a:ext uri="{FF2B5EF4-FFF2-40B4-BE49-F238E27FC236}">
-                <a16:creationId xmlns:a16="http://schemas.microsoft.com/office/drawing/2014/main" xmlns="" id="{C0C1B49A-983E-49F2-B559-B071EE7D9A5F}"/>
+                <a16:creationId xmlns:a16="http://schemas.microsoft.com/office/drawing/2014/main" id="{C0C1B49A-983E-49F2-B559-B071EE7D9A5F}"/>
               </a:ext>
             </a:extLst>
           </p:cNvPr>
@@ -9201,11 +10139,7 @@
           <a:p>
             <a:r>
               <a:rPr lang="es-AR" dirty="0" smtClean="0"/>
-              <a:t>	De un total de 26 documentos solicitados, </a:t>
-            </a:r>
-            <a:r>
-              <a:rPr lang="es-AR" dirty="0" smtClean="0"/>
-              <a:t>se cuenta con: </a:t>
+              <a:t>	De un total de 26 documentos solicitados, se cuenta con: </a:t>
             </a:r>
           </a:p>
           <a:p>
@@ -9219,27 +10153,14 @@
             <a:pPr lvl="2"/>
             <a:r>
               <a:rPr lang="es-AR" dirty="0" smtClean="0"/>
-              <a:t> </a:t>
-            </a:r>
+              <a:t> 4 corresponden a la categoría de Análisis y Diseño; 5 corresponden a la Gestión del Proyecto y 2 a Requerimientos.</a:t>
+            </a:r>
+          </a:p>
+          <a:p>
+            <a:pPr lvl="1"/>
             <a:r>
               <a:rPr lang="es-AR" dirty="0" smtClean="0"/>
-              <a:t>4 corresponden a la categoría de Análisis y Diseño; 5 corresponden a la Gestión del Proyecto y 2 a Requerimientos.</a:t>
-            </a:r>
-            <a:endParaRPr lang="es-AR" dirty="0" smtClean="0"/>
-          </a:p>
-          <a:p>
-            <a:pPr lvl="1"/>
-            <a:r>
-              <a:rPr lang="es-AR" dirty="0" smtClean="0"/>
-              <a:t>12 </a:t>
-            </a:r>
-            <a:r>
-              <a:rPr lang="es-AR" dirty="0" smtClean="0"/>
-              <a:t>incompletos pero bastante avanzados (+ 50 </a:t>
-            </a:r>
-            <a:r>
-              <a:rPr lang="es-AR" dirty="0" smtClean="0"/>
-              <a:t>%) </a:t>
+              <a:t>12 incompletos pero bastante avanzados (+ 50 %) </a:t>
             </a:r>
           </a:p>
           <a:p>
@@ -9248,40 +10169,19 @@
               <a:rPr lang="es-AR" dirty="0" smtClean="0"/>
               <a:t>3 corresponden a la categoría de Análisis y Diseño; 6 corresponden a la Gestión del Proyecto; 1 a la Propuesta y 2 a Pruebas.</a:t>
             </a:r>
-            <a:endParaRPr lang="es-AR" dirty="0" smtClean="0"/>
           </a:p>
           <a:p>
             <a:pPr lvl="1"/>
             <a:r>
               <a:rPr lang="es-AR" dirty="0" smtClean="0"/>
-              <a:t>3 incompletos </a:t>
-            </a:r>
+              <a:t>3 incompletos (todavía no se han realizado)</a:t>
+            </a:r>
+          </a:p>
+          <a:p>
+            <a:pPr lvl="2"/>
             <a:r>
               <a:rPr lang="es-AR" dirty="0" smtClean="0"/>
-              <a:t>(todavía no se han realizado</a:t>
-            </a:r>
-            <a:r>
-              <a:rPr lang="es-AR" dirty="0" smtClean="0"/>
-              <a:t>)</a:t>
-            </a:r>
-          </a:p>
-          <a:p>
-            <a:pPr lvl="2"/>
-            <a:r>
-              <a:rPr lang="es-AR" dirty="0" smtClean="0"/>
-              <a:t>Corresponden </a:t>
-            </a:r>
-            <a:r>
-              <a:rPr lang="es-AR" dirty="0" smtClean="0"/>
-              <a:t>a la categoría </a:t>
-            </a:r>
-            <a:r>
-              <a:rPr lang="es-AR" dirty="0" smtClean="0"/>
-              <a:t>Manuales. </a:t>
-            </a:r>
-            <a:r>
-              <a:rPr lang="es-AR" dirty="0" smtClean="0"/>
-              <a:t>	</a:t>
+              <a:t>Corresponden a la categoría Manuales. 	</a:t>
             </a:r>
           </a:p>
         </p:txBody>
@@ -9289,7 +10189,7 @@
     </p:spTree>
     <p:extLst>
       <p:ext uri="{BB962C8B-B14F-4D97-AF65-F5344CB8AC3E}">
-        <p14:creationId xmlns:p14="http://schemas.microsoft.com/office/powerpoint/2010/main" xmlns="" val="421573175"/>
+        <p14:creationId xmlns:p14="http://schemas.microsoft.com/office/powerpoint/2010/main" val="421573175"/>
       </p:ext>
     </p:extLst>
   </p:cSld>
@@ -9321,7 +10221,7 @@
           <p:cNvPr id="2" name="Título 1">
             <a:extLst>
               <a:ext uri="{FF2B5EF4-FFF2-40B4-BE49-F238E27FC236}">
-                <a16:creationId xmlns:a16="http://schemas.microsoft.com/office/drawing/2014/main" xmlns="" id="{6EB0A5A3-C538-4066-BB19-7EA82C4802A3}"/>
+                <a16:creationId xmlns:a16="http://schemas.microsoft.com/office/drawing/2014/main" id="{6EB0A5A3-C538-4066-BB19-7EA82C4802A3}"/>
               </a:ext>
             </a:extLst>
           </p:cNvPr>
@@ -9372,7 +10272,7 @@
     </p:spTree>
     <p:extLst>
       <p:ext uri="{BB962C8B-B14F-4D97-AF65-F5344CB8AC3E}">
-        <p14:creationId xmlns:p14="http://schemas.microsoft.com/office/powerpoint/2010/main" xmlns="" val="2041564413"/>
+        <p14:creationId xmlns:p14="http://schemas.microsoft.com/office/powerpoint/2010/main" val="2041564413"/>
       </p:ext>
     </p:extLst>
   </p:cSld>
@@ -9421,11 +10321,7 @@
           <a:p>
             <a:r>
               <a:rPr lang="es-AR" dirty="0" smtClean="0"/>
-              <a:t>Estado del Proyecto </a:t>
-            </a:r>
-            <a:r>
-              <a:rPr lang="es-AR" dirty="0" smtClean="0"/>
-              <a:t>III</a:t>
+              <a:t>Estado del Proyecto III</a:t>
             </a:r>
             <a:endParaRPr lang="es-AR" dirty="0"/>
           </a:p>
@@ -9464,69 +10360,42 @@
             </a:pPr>
             <a:r>
               <a:rPr lang="es-AR" b="1" dirty="0" smtClean="0"/>
-              <a:t>Pruebas</a:t>
-            </a:r>
-            <a:r>
-              <a:rPr lang="es-AR" b="1" dirty="0" smtClean="0"/>
-              <a:t>: </a:t>
+              <a:t>Pruebas: </a:t>
             </a:r>
             <a:endParaRPr lang="es-AR" dirty="0" smtClean="0"/>
           </a:p>
           <a:p>
             <a:r>
               <a:rPr lang="es-AR" dirty="0" smtClean="0"/>
-              <a:t>De un total de 17 CU </a:t>
-            </a:r>
+              <a:t>De un total de 17 CU , se cuenta con lo siguiente:</a:t>
+            </a:r>
+          </a:p>
+          <a:p>
+            <a:pPr lvl="1"/>
             <a:r>
               <a:rPr lang="es-AR" dirty="0" smtClean="0"/>
-              <a:t>, se cuenta con lo siguiente:</a:t>
+              <a:t> 7 de ellos han sido implementados con pruebas, </a:t>
             </a:r>
           </a:p>
           <a:p>
             <a:pPr lvl="1"/>
             <a:r>
               <a:rPr lang="es-AR" dirty="0" smtClean="0"/>
-              <a:t> </a:t>
-            </a:r>
+              <a:t>6 se encuentran implementados sin pruebas y </a:t>
+            </a:r>
+          </a:p>
+          <a:p>
+            <a:pPr lvl="1"/>
             <a:r>
               <a:rPr lang="es-AR" dirty="0" smtClean="0"/>
-              <a:t>7 de ellos han sido implementados con pruebas, </a:t>
-            </a:r>
-            <a:endParaRPr lang="es-AR" dirty="0" smtClean="0"/>
+              <a:t>4 se encuentran sin implementar. </a:t>
+            </a:r>
           </a:p>
           <a:p>
             <a:pPr lvl="1"/>
             <a:r>
               <a:rPr lang="es-AR" dirty="0" smtClean="0"/>
-              <a:t>6 </a:t>
-            </a:r>
-            <a:r>
-              <a:rPr lang="es-AR" dirty="0" smtClean="0"/>
-              <a:t>se encuentran implementados sin pruebas y </a:t>
-            </a:r>
-            <a:endParaRPr lang="es-AR" dirty="0" smtClean="0"/>
-          </a:p>
-          <a:p>
-            <a:pPr lvl="1"/>
-            <a:r>
-              <a:rPr lang="es-AR" dirty="0" smtClean="0"/>
-              <a:t>4 </a:t>
-            </a:r>
-            <a:r>
-              <a:rPr lang="es-AR" dirty="0" smtClean="0"/>
-              <a:t>se encuentran sin implementar. </a:t>
-            </a:r>
-            <a:endParaRPr lang="es-AR" dirty="0" smtClean="0"/>
-          </a:p>
-          <a:p>
-            <a:pPr lvl="1"/>
-            <a:r>
-              <a:rPr lang="es-AR" dirty="0" smtClean="0"/>
-              <a:t> </a:t>
-            </a:r>
-            <a:r>
-              <a:rPr lang="es-AR" dirty="0" smtClean="0"/>
-              <a:t>Sumando los CU implementados con y sin pruebas, tenemos el 76 % del sistema desarrollado. </a:t>
+              <a:t> Sumando los CU implementados con y sin pruebas, tenemos el 76 % del sistema desarrollado. </a:t>
             </a:r>
           </a:p>
           <a:p>
@@ -9603,11 +10472,7 @@
           <a:p>
             <a:r>
               <a:rPr lang="es-AR" dirty="0" smtClean="0"/>
-              <a:t>Estado del </a:t>
-            </a:r>
-            <a:r>
-              <a:rPr lang="es-AR" dirty="0" smtClean="0"/>
-              <a:t>Proyecto IV</a:t>
+              <a:t>Estado del Proyecto IV</a:t>
             </a:r>
             <a:endParaRPr lang="es-AR" dirty="0"/>
           </a:p>
@@ -9652,61 +10517,35 @@
             </a:pPr>
             <a:r>
               <a:rPr lang="es-AR" b="1" dirty="0" smtClean="0"/>
-              <a:t>Pruebas</a:t>
-            </a:r>
-            <a:r>
-              <a:rPr lang="es-AR" b="1" dirty="0" smtClean="0"/>
-              <a:t>: </a:t>
+              <a:t>Pruebas: </a:t>
             </a:r>
             <a:endParaRPr lang="es-AR" dirty="0" smtClean="0"/>
           </a:p>
           <a:p>
             <a:r>
               <a:rPr lang="es-AR" dirty="0" smtClean="0"/>
-              <a:t>En </a:t>
-            </a:r>
+              <a:t>En cuanto a las pruebas realizadas hasta el momento: </a:t>
+            </a:r>
+          </a:p>
+          <a:p>
+            <a:pPr lvl="1"/>
             <a:r>
               <a:rPr lang="es-AR" dirty="0" smtClean="0"/>
-              <a:t>cuanto a las pruebas realizadas hasta el </a:t>
-            </a:r>
+              <a:t>7 CU que han sido implementados, 2 de las pruebas han resultado con éxito (pruebas iniciales y de regresión). </a:t>
+            </a:r>
+          </a:p>
+          <a:p>
+            <a:pPr lvl="1"/>
             <a:r>
               <a:rPr lang="es-AR" dirty="0" smtClean="0"/>
-              <a:t>momento: </a:t>
+              <a:t>4 de ellos no presentan errores solo que hasta no tener la pantalla principal del Sistema, no se puede agregar funcionalidad al botón volver a Inicio. Por lo tanto no han sido aprobados oficialmente.  </a:t>
             </a:r>
           </a:p>
           <a:p>
             <a:pPr lvl="1"/>
             <a:r>
               <a:rPr lang="es-AR" dirty="0" smtClean="0"/>
-              <a:t>7 </a:t>
-            </a:r>
-            <a:r>
-              <a:rPr lang="es-AR" dirty="0" smtClean="0"/>
-              <a:t>CU que han sido implementados, 2 de las pruebas han resultado con éxito (pruebas iniciales y de regresión). </a:t>
-            </a:r>
-            <a:endParaRPr lang="es-AR" dirty="0" smtClean="0"/>
-          </a:p>
-          <a:p>
-            <a:pPr lvl="1"/>
-            <a:r>
-              <a:rPr lang="es-AR" dirty="0" smtClean="0"/>
-              <a:t>4 </a:t>
-            </a:r>
-            <a:r>
-              <a:rPr lang="es-AR" dirty="0" smtClean="0"/>
-              <a:t>de ellos no presentan errores solo que hasta no tener la pantalla principal del Sistema, no se puede agregar funcionalidad al botón volver a Inicio. Por lo tanto no han sido aprobados oficialmente.  </a:t>
-            </a:r>
-            <a:endParaRPr lang="es-AR" dirty="0" smtClean="0"/>
-          </a:p>
-          <a:p>
-            <a:pPr lvl="1"/>
-            <a:r>
-              <a:rPr lang="es-AR" dirty="0" smtClean="0"/>
-              <a:t>1 </a:t>
-            </a:r>
-            <a:r>
-              <a:rPr lang="es-AR" dirty="0" smtClean="0"/>
-              <a:t>solo tiene errores que se deben corregir, que han surgido de las pruebas de regresión. </a:t>
+              <a:t>1 solo tiene errores que se deben corregir, que han surgido de las pruebas de regresión. </a:t>
             </a:r>
           </a:p>
           <a:p>
@@ -9767,11 +10606,7 @@
           <a:p>
             <a:r>
               <a:rPr lang="es-AR" dirty="0" smtClean="0"/>
-              <a:t>Estado del Proyecto </a:t>
-            </a:r>
-            <a:r>
-              <a:rPr lang="es-AR" dirty="0" smtClean="0"/>
-              <a:t>V</a:t>
+              <a:t>Estado del Proyecto V</a:t>
             </a:r>
             <a:endParaRPr lang="es-AR" dirty="0"/>
           </a:p>
@@ -9834,7 +10669,7 @@
         </p:nvSpPr>
         <p:spPr>
           <a:xfrm>
-            <a:off x="1484311" y="-241481"/>
+            <a:off x="1484311" y="-185055"/>
             <a:ext cx="10018713" cy="1752599"/>
           </a:xfrm>
         </p:spPr>
@@ -9844,18 +10679,28 @@
           <a:p>
             <a:r>
               <a:rPr lang="es-AR" dirty="0"/>
-              <a:t>Gestión de Riesgos</a:t>
+              <a:t>Gestión de Riesgos </a:t>
+            </a:r>
+            <a:r>
+              <a:rPr lang="es-AR" dirty="0" smtClean="0"/>
+              <a:t>I - Riesgos </a:t>
+            </a:r>
+            <a:r>
+              <a:rPr lang="es-AR" dirty="0"/>
+              <a:t>a futuro</a:t>
             </a:r>
           </a:p>
         </p:txBody>
       </p:sp>
       <p:pic>
         <p:nvPicPr>
-          <p:cNvPr id="6" name="Imagen 5"/>
+          <p:cNvPr id="4" name="Marcador de contenido 3"/>
           <p:cNvPicPr>
-            <a:picLocks noChangeAspect="1"/>
+            <a:picLocks noGrp="1" noChangeAspect="1"/>
           </p:cNvPicPr>
-          <p:nvPr/>
+          <p:nvPr>
+            <p:ph idx="1"/>
+          </p:nvPr>
         </p:nvPicPr>
         <p:blipFill>
           <a:blip r:embed="rId2" cstate="print"/>
@@ -9865,8 +10710,8 @@
         </p:blipFill>
         <p:spPr>
           <a:xfrm>
-            <a:off x="2571037" y="1194092"/>
-            <a:ext cx="9178729" cy="5317484"/>
+            <a:off x="2038126" y="1494970"/>
+            <a:ext cx="10021721" cy="4920344"/>
           </a:xfrm>
           <a:prstGeom prst="rect">
             <a:avLst/>
@@ -9876,7 +10721,7 @@
     </p:spTree>
     <p:extLst>
       <p:ext uri="{BB962C8B-B14F-4D97-AF65-F5344CB8AC3E}">
-        <p14:creationId xmlns:p14="http://schemas.microsoft.com/office/powerpoint/2010/main" xmlns="" val="1433634853"/>
+        <p14:creationId xmlns:p14="http://schemas.microsoft.com/office/powerpoint/2010/main" val="3954742130"/>
       </p:ext>
     </p:extLst>
   </p:cSld>
@@ -9915,7 +10760,7 @@
         </p:nvSpPr>
         <p:spPr>
           <a:xfrm>
-            <a:off x="1484311" y="-185055"/>
+            <a:off x="1484311" y="20776"/>
             <a:ext cx="10018713" cy="1752599"/>
           </a:xfrm>
         </p:spPr>
@@ -9925,41 +10770,114 @@
           <a:p>
             <a:r>
               <a:rPr lang="es-AR" dirty="0"/>
-              <a:t>Riesgos a futuro</a:t>
-            </a:r>
-          </a:p>
-        </p:txBody>
-      </p:sp>
-      <p:pic>
-        <p:nvPicPr>
-          <p:cNvPr id="4" name="Marcador de contenido 3"/>
-          <p:cNvPicPr>
-            <a:picLocks noGrp="1" noChangeAspect="1"/>
-          </p:cNvPicPr>
+              <a:t>Gestión de </a:t>
+            </a:r>
+            <a:r>
+              <a:rPr lang="es-AR" dirty="0" smtClean="0"/>
+              <a:t>Riesgos II</a:t>
+            </a:r>
+            <a:endParaRPr lang="es-AR" dirty="0"/>
+          </a:p>
+        </p:txBody>
+      </p:sp>
+      <p:sp>
+        <p:nvSpPr>
+          <p:cNvPr id="3" name="Marcador de contenido 2"/>
+          <p:cNvSpPr>
+            <a:spLocks noGrp="1"/>
+          </p:cNvSpPr>
           <p:nvPr>
             <p:ph idx="1"/>
           </p:nvPr>
-        </p:nvPicPr>
-        <p:blipFill>
-          <a:blip r:embed="rId2" cstate="print"/>
-          <a:stretch>
-            <a:fillRect/>
-          </a:stretch>
-        </p:blipFill>
+        </p:nvSpPr>
         <p:spPr>
           <a:xfrm>
-            <a:off x="2038126" y="1494970"/>
-            <a:ext cx="10021721" cy="4920344"/>
+            <a:off x="1484310" y="609606"/>
+            <a:ext cx="10018713" cy="4405745"/>
           </a:xfrm>
-          <a:prstGeom prst="rect">
-            <a:avLst/>
-          </a:prstGeom>
         </p:spPr>
-      </p:pic>
+        <p:txBody>
+          <a:bodyPr>
+            <a:normAutofit/>
+          </a:bodyPr>
+          <a:lstStyle/>
+          <a:p>
+            <a:pPr marL="0" indent="0">
+              <a:buNone/>
+            </a:pPr>
+            <a:r>
+              <a:rPr lang="es-AR" b="1" dirty="0" smtClean="0"/>
+              <a:t>Estado de los riesgos :</a:t>
+            </a:r>
+          </a:p>
+          <a:p>
+            <a:pPr lvl="1"/>
+            <a:r>
+              <a:rPr lang="es-AR" dirty="0" smtClean="0"/>
+              <a:t>Riesgos totales 17:</a:t>
+            </a:r>
+          </a:p>
+          <a:p>
+            <a:pPr lvl="2"/>
+            <a:r>
+              <a:rPr lang="es-AR" dirty="0" smtClean="0"/>
+              <a:t>De los cuales 6 se encuentran </a:t>
+            </a:r>
+            <a:r>
+              <a:rPr lang="es-AR" i="1" dirty="0" smtClean="0"/>
+              <a:t>activos</a:t>
+            </a:r>
+            <a:r>
+              <a:rPr lang="es-AR" dirty="0" smtClean="0"/>
+              <a:t>.</a:t>
+            </a:r>
+          </a:p>
+          <a:p>
+            <a:pPr lvl="2"/>
+            <a:r>
+              <a:rPr lang="es-AR" dirty="0" smtClean="0"/>
+              <a:t>Los 11 restantes se encuentra en el estado </a:t>
+            </a:r>
+            <a:r>
+              <a:rPr lang="es-AR" i="1" dirty="0" smtClean="0"/>
+              <a:t>cerrado</a:t>
+            </a:r>
+            <a:r>
+              <a:rPr lang="es-AR" dirty="0" smtClean="0"/>
+              <a:t>. </a:t>
+            </a:r>
+          </a:p>
+          <a:p>
+            <a:endParaRPr lang="es-AR" dirty="0"/>
+          </a:p>
+        </p:txBody>
+      </p:sp>
+      <p:graphicFrame>
+        <p:nvGraphicFramePr>
+          <p:cNvPr id="6" name="Gráfico 5"/>
+          <p:cNvGraphicFramePr/>
+          <p:nvPr>
+            <p:extLst>
+              <p:ext uri="{D42A27DB-BD31-4B8C-83A1-F6EECF244321}">
+                <p14:modId xmlns:p14="http://schemas.microsoft.com/office/powerpoint/2010/main" val="2955110295"/>
+              </p:ext>
+            </p:extLst>
+          </p:nvPr>
+        </p:nvGraphicFramePr>
+        <p:xfrm>
+          <a:off x="5458690" y="2064328"/>
+          <a:ext cx="8132619" cy="4503496"/>
+        </p:xfrm>
+        <a:graphic>
+          <a:graphicData uri="http://schemas.openxmlformats.org/drawingml/2006/chart">
+            <c:chart xmlns:c="http://schemas.openxmlformats.org/drawingml/2006/chart" xmlns:r="http://schemas.openxmlformats.org/officeDocument/2006/relationships" r:id="rId2"/>
+          </a:graphicData>
+        </a:graphic>
+      </p:graphicFrame>
     </p:spTree>
     <p:extLst>
       <p:ext uri="{BB962C8B-B14F-4D97-AF65-F5344CB8AC3E}">
-        <p14:creationId xmlns:p14="http://schemas.microsoft.com/office/powerpoint/2010/main" xmlns="" val="3954742130"/>
+        <p14:creationId xmlns:p14="http://schemas.microsoft.com/office/powerpoint/2010/main" val="1735037010"/>
       </p:ext>
     </p:extLst>
   </p:cSld>
@@ -9991,7 +10909,7 @@
           <p:cNvPr id="2" name="Título 1">
             <a:extLst>
               <a:ext uri="{FF2B5EF4-FFF2-40B4-BE49-F238E27FC236}">
-                <a16:creationId xmlns:a16="http://schemas.microsoft.com/office/drawing/2014/main" xmlns="" id="{A08BF852-5F19-46F2-83FE-6528AEC95981}"/>
+                <a16:creationId xmlns:a16="http://schemas.microsoft.com/office/drawing/2014/main" id="{A08BF852-5F19-46F2-83FE-6528AEC95981}"/>
               </a:ext>
             </a:extLst>
           </p:cNvPr>
@@ -10019,7 +10937,7 @@
           <p:cNvPr id="3" name="Marcador de contenido 2">
             <a:extLst>
               <a:ext uri="{FF2B5EF4-FFF2-40B4-BE49-F238E27FC236}">
-                <a16:creationId xmlns:a16="http://schemas.microsoft.com/office/drawing/2014/main" xmlns="" id="{4825B7B8-2642-4E50-9E0D-E85148EB6652}"/>
+                <a16:creationId xmlns:a16="http://schemas.microsoft.com/office/drawing/2014/main" id="{4825B7B8-2642-4E50-9E0D-E85148EB6652}"/>
               </a:ext>
             </a:extLst>
           </p:cNvPr>
@@ -10098,7 +11016,7 @@
     </p:spTree>
     <p:extLst>
       <p:ext uri="{BB962C8B-B14F-4D97-AF65-F5344CB8AC3E}">
-        <p14:creationId xmlns:p14="http://schemas.microsoft.com/office/powerpoint/2010/main" xmlns="" val="493199861"/>
+        <p14:creationId xmlns:p14="http://schemas.microsoft.com/office/powerpoint/2010/main" val="493199861"/>
       </p:ext>
     </p:extLst>
   </p:cSld>
@@ -10127,13 +11045,7 @@
       </p:grpSpPr>
       <p:sp>
         <p:nvSpPr>
-          <p:cNvPr id="2" name="Título 1">
-            <a:extLst>
-              <a:ext uri="{FF2B5EF4-FFF2-40B4-BE49-F238E27FC236}">
-                <a16:creationId xmlns:a16="http://schemas.microsoft.com/office/drawing/2014/main" xmlns="" id="{2458DF6C-430A-4FE6-BEE9-9873D9821768}"/>
-              </a:ext>
-            </a:extLst>
-          </p:cNvPr>
+          <p:cNvPr id="2" name="Título 1"/>
           <p:cNvSpPr>
             <a:spLocks noGrp="1"/>
           </p:cNvSpPr>
@@ -10143,8 +11055,8 @@
         </p:nvSpPr>
         <p:spPr>
           <a:xfrm>
-            <a:off x="1484310" y="392205"/>
-            <a:ext cx="10018713" cy="1349188"/>
+            <a:off x="1484311" y="20776"/>
+            <a:ext cx="10018713" cy="1752599"/>
           </a:xfrm>
         </p:spPr>
         <p:txBody>
@@ -10153,20 +11065,19 @@
           <a:p>
             <a:r>
               <a:rPr lang="es-AR" dirty="0"/>
-              <a:t>Cuestiones a definir I</a:t>
-            </a:r>
-          </a:p>
-        </p:txBody>
-      </p:sp>
-      <p:sp>
-        <p:nvSpPr>
-          <p:cNvPr id="3" name="Marcador de contenido 2">
-            <a:extLst>
-              <a:ext uri="{FF2B5EF4-FFF2-40B4-BE49-F238E27FC236}">
-                <a16:creationId xmlns:a16="http://schemas.microsoft.com/office/drawing/2014/main" xmlns="" id="{74D85991-244B-440C-9B99-B3E7D6695501}"/>
-              </a:ext>
-            </a:extLst>
-          </p:cNvPr>
+              <a:t>Gestión de </a:t>
+            </a:r>
+            <a:r>
+              <a:rPr lang="es-AR" dirty="0" smtClean="0"/>
+              <a:t>Riesgos III</a:t>
+            </a:r>
+            <a:endParaRPr lang="es-AR" dirty="0"/>
+          </a:p>
+        </p:txBody>
+      </p:sp>
+      <p:sp>
+        <p:nvSpPr>
+          <p:cNvPr id="3" name="Marcador de contenido 2"/>
           <p:cNvSpPr>
             <a:spLocks noGrp="1"/>
           </p:cNvSpPr>
@@ -10176,53 +11087,147 @@
         </p:nvSpPr>
         <p:spPr>
           <a:xfrm>
-            <a:off x="1484310" y="1443318"/>
-            <a:ext cx="10018713" cy="4347883"/>
+            <a:off x="1484310" y="1870372"/>
+            <a:ext cx="10018713" cy="4405745"/>
           </a:xfrm>
         </p:spPr>
         <p:txBody>
           <a:bodyPr>
-            <a:normAutofit/>
+            <a:normAutofit fontScale="85000" lnSpcReduction="20000"/>
           </a:bodyPr>
           <a:lstStyle/>
           <a:p>
+            <a:pPr marL="0" indent="0">
+              <a:buNone/>
+            </a:pPr>
+            <a:r>
+              <a:rPr lang="es-AR" b="1" dirty="0" smtClean="0"/>
+              <a:t>Estado de algunos riesgos :</a:t>
+            </a:r>
+          </a:p>
+          <a:p>
+            <a:r>
+              <a:rPr lang="es-AR" b="1" dirty="0" smtClean="0"/>
+              <a:t>Activos</a:t>
+            </a:r>
+          </a:p>
+          <a:p>
+            <a:pPr lvl="1"/>
+            <a:r>
+              <a:rPr lang="es-ES" dirty="0"/>
+              <a:t>Complejidad técnica en la solución del problema en cuanto a la Generación del programa en PDF con </a:t>
+            </a:r>
+            <a:r>
+              <a:rPr lang="es-ES" dirty="0" smtClean="0"/>
+              <a:t>PHP.</a:t>
+            </a:r>
+          </a:p>
+          <a:p>
+            <a:pPr lvl="1"/>
+            <a:r>
+              <a:rPr lang="es-ES" dirty="0"/>
+              <a:t>Tener que modificar el código fuente debido a cambios en la </a:t>
+            </a:r>
+            <a:r>
+              <a:rPr lang="es-ES" dirty="0" smtClean="0"/>
+              <a:t>BD.</a:t>
+            </a:r>
+          </a:p>
+          <a:p>
+            <a:pPr lvl="1"/>
+            <a:r>
+              <a:rPr lang="es-ES" dirty="0"/>
+              <a:t>Algunos de los integrantes consiga </a:t>
+            </a:r>
+            <a:r>
+              <a:rPr lang="es-ES" dirty="0" smtClean="0"/>
+              <a:t>trabajo.</a:t>
+            </a:r>
+          </a:p>
+          <a:p>
+            <a:pPr lvl="1"/>
+            <a:r>
+              <a:rPr lang="es-ES" dirty="0"/>
+              <a:t>No se realicen reuniones con el equipo docente para mostrar avances del proyecto.</a:t>
+            </a:r>
+            <a:endParaRPr lang="es-ES" dirty="0" smtClean="0"/>
+          </a:p>
+          <a:p>
+            <a:pPr lvl="1"/>
+            <a:endParaRPr lang="es-AR" dirty="0" smtClean="0"/>
+          </a:p>
+          <a:p>
+            <a:r>
+              <a:rPr lang="es-AR" b="1" dirty="0" smtClean="0"/>
+              <a:t>Cerrados</a:t>
+            </a:r>
+            <a:r>
+              <a:rPr lang="es-AR" dirty="0" smtClean="0"/>
+              <a:t> </a:t>
+            </a:r>
+          </a:p>
+          <a:p>
+            <a:pPr lvl="1"/>
+            <a:r>
+              <a:rPr lang="es-ES" dirty="0"/>
+              <a:t>Falta de experiencia de dos de los integrantes en el lenguaje PHP</a:t>
+            </a:r>
+            <a:r>
+              <a:rPr lang="es-ES" dirty="0" smtClean="0"/>
+              <a:t>.</a:t>
+            </a:r>
+          </a:p>
+          <a:p>
+            <a:pPr lvl="1"/>
+            <a:r>
+              <a:rPr lang="es-ES" dirty="0"/>
+              <a:t>Tener problemas para llegar a un acuerdo sobre el Modelo de Datos con el </a:t>
+            </a:r>
+            <a:r>
+              <a:rPr lang="es-ES" dirty="0" smtClean="0"/>
+              <a:t>Grupo 1.</a:t>
+            </a:r>
+          </a:p>
+          <a:p>
+            <a:pPr lvl="1"/>
+            <a:r>
+              <a:rPr lang="es-ES" dirty="0"/>
+              <a:t>Falta de utilización de las herramientas </a:t>
+            </a:r>
+            <a:r>
+              <a:rPr lang="es-ES" dirty="0" err="1"/>
+              <a:t>Git</a:t>
+            </a:r>
+            <a:r>
+              <a:rPr lang="es-ES" dirty="0"/>
+              <a:t> y </a:t>
+            </a:r>
+            <a:r>
+              <a:rPr lang="es-ES" dirty="0" smtClean="0"/>
+              <a:t>GitHub.</a:t>
+            </a:r>
+          </a:p>
+          <a:p>
+            <a:pPr lvl="1"/>
             <a:r>
               <a:rPr lang="es-AR" dirty="0"/>
-              <a:t>Fechas límite:</a:t>
-            </a:r>
+              <a:t>No se lleven a cabo reuniones entre los integrantes.</a:t>
+            </a:r>
+            <a:endParaRPr lang="es-ES" dirty="0" smtClean="0"/>
           </a:p>
           <a:p>
             <a:pPr lvl="1"/>
-            <a:r>
-              <a:rPr lang="es-AR" dirty="0"/>
-              <a:t>¿Un docente debe poder cargar un programa fuera de término? ¿Existiría alguna “marca” sobre el programa cuando esto suceda?</a:t>
-            </a:r>
-          </a:p>
-          <a:p>
-            <a:pPr lvl="1"/>
-            <a:r>
-              <a:rPr lang="es-AR" dirty="0"/>
-              <a:t>¿Qué hacer cuando se le envíen X notificaciones a un docente y este no responda ni realice la carga? ¿Advertencia a algún superior?</a:t>
-            </a:r>
-          </a:p>
-          <a:p>
-            <a:r>
-              <a:rPr lang="es-AR" dirty="0"/>
-              <a:t>Vigencia de un programa</a:t>
-            </a:r>
-          </a:p>
-          <a:p>
-            <a:r>
-              <a:rPr lang="es-AR" dirty="0"/>
-              <a:t>¿Carga de programas por fuera del Sistema?</a:t>
-            </a:r>
+            <a:endParaRPr lang="es-AR" dirty="0" smtClean="0"/>
+          </a:p>
+          <a:p>
+            <a:endParaRPr lang="es-AR" dirty="0"/>
           </a:p>
         </p:txBody>
       </p:sp>
     </p:spTree>
     <p:extLst>
       <p:ext uri="{BB962C8B-B14F-4D97-AF65-F5344CB8AC3E}">
-        <p14:creationId xmlns:p14="http://schemas.microsoft.com/office/powerpoint/2010/main" xmlns="" val="1461227207"/>
+        <p14:creationId xmlns:p14="http://schemas.microsoft.com/office/powerpoint/2010/main" val="787335396"/>
       </p:ext>
     </p:extLst>
   </p:cSld>
@@ -10254,7 +11259,7 @@
           <p:cNvPr id="2" name="Título 1">
             <a:extLst>
               <a:ext uri="{FF2B5EF4-FFF2-40B4-BE49-F238E27FC236}">
-                <a16:creationId xmlns:a16="http://schemas.microsoft.com/office/drawing/2014/main" xmlns="" id="{4D3D3C5E-AD47-4DAC-8A45-DADDC1B8253D}"/>
+                <a16:creationId xmlns:a16="http://schemas.microsoft.com/office/drawing/2014/main" id="{2458DF6C-430A-4FE6-BEE9-9873D9821768}"/>
               </a:ext>
             </a:extLst>
           </p:cNvPr>
@@ -10267,8 +11272,8 @@
         </p:nvSpPr>
         <p:spPr>
           <a:xfrm>
-            <a:off x="1582922" y="504265"/>
-            <a:ext cx="10018713" cy="1125068"/>
+            <a:off x="1484310" y="392205"/>
+            <a:ext cx="10018713" cy="1349188"/>
           </a:xfrm>
         </p:spPr>
         <p:txBody>
@@ -10277,7 +11282,7 @@
           <a:p>
             <a:r>
               <a:rPr lang="es-AR" dirty="0"/>
-              <a:t>Cuestiones a definir II</a:t>
+              <a:t>Cuestiones a definir I</a:t>
             </a:r>
           </a:p>
         </p:txBody>
@@ -10287,7 +11292,7 @@
           <p:cNvPr id="3" name="Marcador de contenido 2">
             <a:extLst>
               <a:ext uri="{FF2B5EF4-FFF2-40B4-BE49-F238E27FC236}">
-                <a16:creationId xmlns:a16="http://schemas.microsoft.com/office/drawing/2014/main" xmlns="" id="{6ADE1AAD-CE76-427C-B709-D78D3DFFCFC0}"/>
+                <a16:creationId xmlns:a16="http://schemas.microsoft.com/office/drawing/2014/main" id="{74D85991-244B-440C-9B99-B3E7D6695501}"/>
               </a:ext>
             </a:extLst>
           </p:cNvPr>
@@ -10300,8 +11305,8 @@
         </p:nvSpPr>
         <p:spPr>
           <a:xfrm>
-            <a:off x="1484310" y="1748119"/>
-            <a:ext cx="10018713" cy="4043082"/>
+            <a:off x="1484310" y="1443318"/>
+            <a:ext cx="10018713" cy="4347883"/>
           </a:xfrm>
         </p:spPr>
         <p:txBody>
@@ -10312,34 +11317,33 @@
           <a:p>
             <a:r>
               <a:rPr lang="es-AR" dirty="0"/>
-              <a:t>Departamentos – Divisiones</a:t>
-            </a:r>
-          </a:p>
-          <a:p>
+              <a:t>Fechas límite:</a:t>
+            </a:r>
+          </a:p>
+          <a:p>
+            <a:pPr lvl="1"/>
             <a:r>
               <a:rPr lang="es-AR" dirty="0"/>
-              <a:t>¿Un docente puede aparecer que se encarga tanto en la teoría como en la práctica? ¿O solo puede estar en una de ellas en el programa de la asignatura? *AGREGAR IMAGEN*</a:t>
-            </a:r>
-          </a:p>
-          <a:p>
+              <a:t>¿Un docente debe poder cargar un programa fuera de término? ¿Existiría alguna “marca” sobre el programa cuando esto suceda?</a:t>
+            </a:r>
+          </a:p>
+          <a:p>
+            <a:pPr lvl="1"/>
             <a:r>
               <a:rPr lang="es-AR" dirty="0"/>
-              <a:t>Docente responsable e integrante</a:t>
-            </a:r>
-          </a:p>
-          <a:p>
-            <a:pPr lvl="1"/>
+              <a:t>¿Qué hacer cuando se le envíen X notificaciones a un docente y este no responda ni realice la carga? ¿Advertencia a algún superior?</a:t>
+            </a:r>
+          </a:p>
+          <a:p>
             <a:r>
               <a:rPr lang="es-AR" dirty="0"/>
-              <a:t>¿Hay un (y solo un) docente responsable y el resto son integrantes? ¿</a:t>
-            </a:r>
-            <a:r>
-              <a:rPr lang="es-AR" dirty="0" err="1"/>
-              <a:t>Haycasos</a:t>
-            </a:r>
+              <a:t>Vigencia de un programa</a:t>
+            </a:r>
+          </a:p>
+          <a:p>
             <a:r>
               <a:rPr lang="es-AR" dirty="0"/>
-              <a:t> excepcionales con varios responsables? ¿Quién debería cargar el programa?</a:t>
+              <a:t>¿Carga de programas por fuera del Sistema?</a:t>
             </a:r>
           </a:p>
         </p:txBody>
@@ -10347,7 +11351,7 @@
     </p:spTree>
     <p:extLst>
       <p:ext uri="{BB962C8B-B14F-4D97-AF65-F5344CB8AC3E}">
-        <p14:creationId xmlns:p14="http://schemas.microsoft.com/office/powerpoint/2010/main" xmlns="" val="4235005633"/>
+        <p14:creationId xmlns:p14="http://schemas.microsoft.com/office/powerpoint/2010/main" val="1461227207"/>
       </p:ext>
     </p:extLst>
   </p:cSld>
@@ -10379,7 +11383,7 @@
           <p:cNvPr id="2" name="Título 1">
             <a:extLst>
               <a:ext uri="{FF2B5EF4-FFF2-40B4-BE49-F238E27FC236}">
-                <a16:creationId xmlns:a16="http://schemas.microsoft.com/office/drawing/2014/main" xmlns="" id="{2458DF6C-430A-4FE6-BEE9-9873D9821768}"/>
+                <a16:creationId xmlns:a16="http://schemas.microsoft.com/office/drawing/2014/main" id="{4D3D3C5E-AD47-4DAC-8A45-DADDC1B8253D}"/>
               </a:ext>
             </a:extLst>
           </p:cNvPr>
@@ -10392,8 +11396,8 @@
         </p:nvSpPr>
         <p:spPr>
           <a:xfrm>
-            <a:off x="1600852" y="394448"/>
-            <a:ext cx="10018713" cy="1470211"/>
+            <a:off x="1582922" y="504265"/>
+            <a:ext cx="10018713" cy="1125068"/>
           </a:xfrm>
         </p:spPr>
         <p:txBody>
@@ -10402,7 +11406,7 @@
           <a:p>
             <a:r>
               <a:rPr lang="es-AR" dirty="0"/>
-              <a:t>Cuestiones a Definir III</a:t>
+              <a:t>Cuestiones a definir II</a:t>
             </a:r>
           </a:p>
         </p:txBody>
@@ -10412,7 +11416,7 @@
           <p:cNvPr id="3" name="Marcador de contenido 2">
             <a:extLst>
               <a:ext uri="{FF2B5EF4-FFF2-40B4-BE49-F238E27FC236}">
-                <a16:creationId xmlns:a16="http://schemas.microsoft.com/office/drawing/2014/main" xmlns="" id="{74D85991-244B-440C-9B99-B3E7D6695501}"/>
+                <a16:creationId xmlns:a16="http://schemas.microsoft.com/office/drawing/2014/main" id="{6ADE1AAD-CE76-427C-B709-D78D3DFFCFC0}"/>
               </a:ext>
             </a:extLst>
           </p:cNvPr>
@@ -10425,8 +11429,8 @@
         </p:nvSpPr>
         <p:spPr>
           <a:xfrm>
-            <a:off x="1600852" y="1990164"/>
-            <a:ext cx="10018713" cy="4347883"/>
+            <a:off x="1484310" y="1748119"/>
+            <a:ext cx="10018713" cy="4043082"/>
           </a:xfrm>
         </p:spPr>
         <p:txBody>
@@ -10437,64 +11441,42 @@
           <a:p>
             <a:r>
               <a:rPr lang="es-AR" dirty="0"/>
-              <a:t>Revisión de Programas (sólo datos que revisan, previsualizar PDF, saltar algún control)</a:t>
+              <a:t>Departamentos – Divisiones</a:t>
+            </a:r>
+          </a:p>
+          <a:p>
+            <a:r>
+              <a:rPr lang="es-AR" dirty="0"/>
+              <a:t>¿Un docente puede aparecer que se encarga tanto en la teoría como en la práctica? ¿O solo puede estar en una de ellas en el programa de la asignatura? *AGREGAR IMAGEN*</a:t>
+            </a:r>
+          </a:p>
+          <a:p>
+            <a:r>
+              <a:rPr lang="es-AR" dirty="0"/>
+              <a:t>Docente responsable e integrante</a:t>
             </a:r>
           </a:p>
           <a:p>
             <a:pPr lvl="1"/>
             <a:r>
               <a:rPr lang="es-AR" dirty="0"/>
-              <a:t>Los datos formales (código de carrera, nombre de carrera, nombre de asignatura, etc.) se encontrarán precargados por Secretaría Académica y no serán modificables por el profesor.</a:t>
-            </a:r>
-          </a:p>
-          <a:p>
+              <a:t>¿Hay un (y solo un) docente responsable y el resto son integrantes? ¿</a:t>
+            </a:r>
+            <a:r>
+              <a:rPr lang="es-AR" dirty="0" err="1"/>
+              <a:t>Haycasos</a:t>
+            </a:r>
             <a:r>
               <a:rPr lang="es-AR" dirty="0"/>
-              <a:t>Atributos "</a:t>
-            </a:r>
-            <a:r>
-              <a:rPr lang="es-AR" dirty="0" err="1"/>
-              <a:t>anioCarrera</a:t>
-            </a:r>
-            <a:r>
-              <a:rPr lang="es-AR" dirty="0"/>
-              <a:t>" y "</a:t>
-            </a:r>
-            <a:r>
-              <a:rPr lang="es-AR" dirty="0" err="1"/>
-              <a:t>regimenCursada</a:t>
-            </a:r>
-            <a:r>
-              <a:rPr lang="es-AR" dirty="0"/>
-              <a:t>" de la tabla PROGRAMA</a:t>
-            </a:r>
-          </a:p>
-          <a:p>
-            <a:r>
-              <a:rPr lang="es-AR" dirty="0"/>
-              <a:t>Horas de cursada de Teoría y de </a:t>
-            </a:r>
-            <a:r>
-              <a:rPr lang="es-AR" dirty="0" smtClean="0"/>
-              <a:t>Práctica</a:t>
-            </a:r>
-          </a:p>
-          <a:p>
-            <a:r>
-              <a:rPr lang="es-AR" dirty="0" smtClean="0"/>
-              <a:t>¿Hasta qué tamaño (Mb) se puede subir un programa y un plan al sistema?</a:t>
-            </a:r>
-            <a:endParaRPr lang="es-AR" dirty="0"/>
-          </a:p>
-          <a:p>
-            <a:endParaRPr lang="es-AR" dirty="0"/>
+              <a:t> excepcionales con varios responsables? ¿Quién debería cargar el programa?</a:t>
+            </a:r>
           </a:p>
         </p:txBody>
       </p:sp>
     </p:spTree>
     <p:extLst>
       <p:ext uri="{BB962C8B-B14F-4D97-AF65-F5344CB8AC3E}">
-        <p14:creationId xmlns:p14="http://schemas.microsoft.com/office/powerpoint/2010/main" xmlns="" val="258829745"/>
+        <p14:creationId xmlns:p14="http://schemas.microsoft.com/office/powerpoint/2010/main" val="4235005633"/>
       </p:ext>
     </p:extLst>
   </p:cSld>
@@ -10523,10 +11505,157 @@
       </p:grpSpPr>
       <p:sp>
         <p:nvSpPr>
+          <p:cNvPr id="2" name="Título 1">
+            <a:extLst>
+              <a:ext uri="{FF2B5EF4-FFF2-40B4-BE49-F238E27FC236}">
+                <a16:creationId xmlns:a16="http://schemas.microsoft.com/office/drawing/2014/main" id="{2458DF6C-430A-4FE6-BEE9-9873D9821768}"/>
+              </a:ext>
+            </a:extLst>
+          </p:cNvPr>
+          <p:cNvSpPr>
+            <a:spLocks noGrp="1"/>
+          </p:cNvSpPr>
+          <p:nvPr>
+            <p:ph type="title"/>
+          </p:nvPr>
+        </p:nvSpPr>
+        <p:spPr>
+          <a:xfrm>
+            <a:off x="1600852" y="394448"/>
+            <a:ext cx="10018713" cy="1470211"/>
+          </a:xfrm>
+        </p:spPr>
+        <p:txBody>
+          <a:bodyPr/>
+          <a:lstStyle/>
+          <a:p>
+            <a:r>
+              <a:rPr lang="es-AR" dirty="0"/>
+              <a:t>Cuestiones a Definir III</a:t>
+            </a:r>
+          </a:p>
+        </p:txBody>
+      </p:sp>
+      <p:sp>
+        <p:nvSpPr>
+          <p:cNvPr id="3" name="Marcador de contenido 2">
+            <a:extLst>
+              <a:ext uri="{FF2B5EF4-FFF2-40B4-BE49-F238E27FC236}">
+                <a16:creationId xmlns:a16="http://schemas.microsoft.com/office/drawing/2014/main" id="{74D85991-244B-440C-9B99-B3E7D6695501}"/>
+              </a:ext>
+            </a:extLst>
+          </p:cNvPr>
+          <p:cNvSpPr>
+            <a:spLocks noGrp="1"/>
+          </p:cNvSpPr>
+          <p:nvPr>
+            <p:ph idx="1"/>
+          </p:nvPr>
+        </p:nvSpPr>
+        <p:spPr>
+          <a:xfrm>
+            <a:off x="1600852" y="1990164"/>
+            <a:ext cx="10018713" cy="4347883"/>
+          </a:xfrm>
+        </p:spPr>
+        <p:txBody>
+          <a:bodyPr>
+            <a:normAutofit/>
+          </a:bodyPr>
+          <a:lstStyle/>
+          <a:p>
+            <a:r>
+              <a:rPr lang="es-AR" dirty="0"/>
+              <a:t>Revisión de Programas (sólo datos que revisan, previsualizar PDF, saltar algún control)</a:t>
+            </a:r>
+          </a:p>
+          <a:p>
+            <a:pPr lvl="1"/>
+            <a:r>
+              <a:rPr lang="es-AR" dirty="0"/>
+              <a:t>Los datos formales (código de carrera, nombre de carrera, nombre de asignatura, etc.) se encontrarán precargados por Secretaría Académica y no serán modificables por el profesor.</a:t>
+            </a:r>
+          </a:p>
+          <a:p>
+            <a:r>
+              <a:rPr lang="es-AR" dirty="0"/>
+              <a:t>Atributos "</a:t>
+            </a:r>
+            <a:r>
+              <a:rPr lang="es-AR" dirty="0" err="1"/>
+              <a:t>anioCarrera</a:t>
+            </a:r>
+            <a:r>
+              <a:rPr lang="es-AR" dirty="0"/>
+              <a:t>" y "</a:t>
+            </a:r>
+            <a:r>
+              <a:rPr lang="es-AR" dirty="0" err="1"/>
+              <a:t>regimenCursada</a:t>
+            </a:r>
+            <a:r>
+              <a:rPr lang="es-AR" dirty="0"/>
+              <a:t>" de la tabla PROGRAMA</a:t>
+            </a:r>
+          </a:p>
+          <a:p>
+            <a:r>
+              <a:rPr lang="es-AR" dirty="0"/>
+              <a:t>Horas de cursada de Teoría y de </a:t>
+            </a:r>
+            <a:r>
+              <a:rPr lang="es-AR" dirty="0" smtClean="0"/>
+              <a:t>Práctica</a:t>
+            </a:r>
+          </a:p>
+          <a:p>
+            <a:r>
+              <a:rPr lang="es-AR" dirty="0" smtClean="0"/>
+              <a:t>¿Hasta qué tamaño (Mb) se puede subir un programa y un plan al sistema?</a:t>
+            </a:r>
+            <a:endParaRPr lang="es-AR" dirty="0"/>
+          </a:p>
+          <a:p>
+            <a:endParaRPr lang="es-AR" dirty="0"/>
+          </a:p>
+        </p:txBody>
+      </p:sp>
+    </p:spTree>
+    <p:extLst>
+      <p:ext uri="{BB962C8B-B14F-4D97-AF65-F5344CB8AC3E}">
+        <p14:creationId xmlns:p14="http://schemas.microsoft.com/office/powerpoint/2010/main" val="258829745"/>
+      </p:ext>
+    </p:extLst>
+  </p:cSld>
+  <p:clrMapOvr>
+    <a:masterClrMapping/>
+  </p:clrMapOvr>
+</p:sld>
+</file>
+
+<file path=ppt/slides/slide24.xml><?xml version="1.0" encoding="utf-8"?>
+<p:sld xmlns:a="http://schemas.openxmlformats.org/drawingml/2006/main" xmlns:r="http://schemas.openxmlformats.org/officeDocument/2006/relationships" xmlns:p="http://schemas.openxmlformats.org/presentationml/2006/main">
+  <p:cSld>
+    <p:spTree>
+      <p:nvGrpSpPr>
+        <p:cNvPr id="1" name=""/>
+        <p:cNvGrpSpPr/>
+        <p:nvPr/>
+      </p:nvGrpSpPr>
+      <p:grpSpPr>
+        <a:xfrm>
+          <a:off x="0" y="0"/>
+          <a:ext cx="0" cy="0"/>
+          <a:chOff x="0" y="0"/>
+          <a:chExt cx="0" cy="0"/>
+        </a:xfrm>
+      </p:grpSpPr>
+      <p:sp>
+        <p:nvSpPr>
           <p:cNvPr id="4" name="Rectángulo 3">
             <a:extLst>
               <a:ext uri="{FF2B5EF4-FFF2-40B4-BE49-F238E27FC236}">
-                <a16:creationId xmlns:a16="http://schemas.microsoft.com/office/drawing/2014/main" xmlns="" id="{B0F1B4F4-0C7A-4C0E-8584-95718BC545EC}"/>
+                <a16:creationId xmlns:a16="http://schemas.microsoft.com/office/drawing/2014/main" id="{B0F1B4F4-0C7A-4C0E-8584-95718BC545EC}"/>
               </a:ext>
             </a:extLst>
           </p:cNvPr>
@@ -10590,7 +11719,7 @@
           <p:cNvPr id="2" name="CuadroTexto 1">
             <a:extLst>
               <a:ext uri="{FF2B5EF4-FFF2-40B4-BE49-F238E27FC236}">
-                <a16:creationId xmlns:a16="http://schemas.microsoft.com/office/drawing/2014/main" xmlns="" id="{BBF285E2-50A8-4654-BD24-220C20D7C57B}"/>
+                <a16:creationId xmlns:a16="http://schemas.microsoft.com/office/drawing/2014/main" id="{BBF285E2-50A8-4654-BD24-220C20D7C57B}"/>
               </a:ext>
             </a:extLst>
           </p:cNvPr>
@@ -10623,7 +11752,7 @@
     </p:spTree>
     <p:extLst>
       <p:ext uri="{BB962C8B-B14F-4D97-AF65-F5344CB8AC3E}">
-        <p14:creationId xmlns:p14="http://schemas.microsoft.com/office/powerpoint/2010/main" xmlns="" val="3442063561"/>
+        <p14:creationId xmlns:p14="http://schemas.microsoft.com/office/powerpoint/2010/main" val="3442063561"/>
       </p:ext>
     </p:extLst>
   </p:cSld>
@@ -10655,7 +11784,7 @@
           <p:cNvPr id="4" name="Título 3">
             <a:extLst>
               <a:ext uri="{FF2B5EF4-FFF2-40B4-BE49-F238E27FC236}">
-                <a16:creationId xmlns:a16="http://schemas.microsoft.com/office/drawing/2014/main" xmlns="" id="{FA4EADB5-92CE-4B25-BE21-7FC484AE680E}"/>
+                <a16:creationId xmlns:a16="http://schemas.microsoft.com/office/drawing/2014/main" id="{FA4EADB5-92CE-4B25-BE21-7FC484AE680E}"/>
               </a:ext>
             </a:extLst>
           </p:cNvPr>
@@ -10691,7 +11820,7 @@
           <p:cNvPr id="5" name="Subtítulo 4">
             <a:extLst>
               <a:ext uri="{FF2B5EF4-FFF2-40B4-BE49-F238E27FC236}">
-                <a16:creationId xmlns:a16="http://schemas.microsoft.com/office/drawing/2014/main" xmlns="" id="{7035CB29-6D24-4E02-AC9F-07DC0DE9312C}"/>
+                <a16:creationId xmlns:a16="http://schemas.microsoft.com/office/drawing/2014/main" id="{7035CB29-6D24-4E02-AC9F-07DC0DE9312C}"/>
               </a:ext>
             </a:extLst>
           </p:cNvPr>
@@ -10817,7 +11946,7 @@
     </p:spTree>
     <p:extLst>
       <p:ext uri="{BB962C8B-B14F-4D97-AF65-F5344CB8AC3E}">
-        <p14:creationId xmlns:p14="http://schemas.microsoft.com/office/powerpoint/2010/main" xmlns="" val="503208862"/>
+        <p14:creationId xmlns:p14="http://schemas.microsoft.com/office/powerpoint/2010/main" val="503208862"/>
       </p:ext>
     </p:extLst>
   </p:cSld>
@@ -10849,7 +11978,7 @@
           <p:cNvPr id="4" name="Título 3">
             <a:extLst>
               <a:ext uri="{FF2B5EF4-FFF2-40B4-BE49-F238E27FC236}">
-                <a16:creationId xmlns:a16="http://schemas.microsoft.com/office/drawing/2014/main" xmlns="" id="{FA4EADB5-92CE-4B25-BE21-7FC484AE680E}"/>
+                <a16:creationId xmlns:a16="http://schemas.microsoft.com/office/drawing/2014/main" id="{FA4EADB5-92CE-4B25-BE21-7FC484AE680E}"/>
               </a:ext>
             </a:extLst>
           </p:cNvPr>
@@ -10884,7 +12013,7 @@
           <p:cNvPr id="5" name="Subtítulo 4">
             <a:extLst>
               <a:ext uri="{FF2B5EF4-FFF2-40B4-BE49-F238E27FC236}">
-                <a16:creationId xmlns:a16="http://schemas.microsoft.com/office/drawing/2014/main" xmlns="" id="{7035CB29-6D24-4E02-AC9F-07DC0DE9312C}"/>
+                <a16:creationId xmlns:a16="http://schemas.microsoft.com/office/drawing/2014/main" id="{7035CB29-6D24-4E02-AC9F-07DC0DE9312C}"/>
               </a:ext>
             </a:extLst>
           </p:cNvPr>
@@ -10924,7 +12053,7 @@
           <p:cNvPr id="10" name="Imagen 9">
             <a:extLst>
               <a:ext uri="{FF2B5EF4-FFF2-40B4-BE49-F238E27FC236}">
-                <a16:creationId xmlns:a16="http://schemas.microsoft.com/office/drawing/2014/main" xmlns="" id="{9E93C3DC-EA10-4E41-BDEF-6D23E1C605A2}"/>
+                <a16:creationId xmlns:a16="http://schemas.microsoft.com/office/drawing/2014/main" id="{9E93C3DC-EA10-4E41-BDEF-6D23E1C605A2}"/>
               </a:ext>
             </a:extLst>
           </p:cNvPr>
@@ -10937,7 +12066,7 @@
           <a:blip r:embed="rId2" cstate="print">
             <a:extLst>
               <a:ext uri="{28A0092B-C50C-407E-A947-70E740481C1C}">
-                <a14:useLocalDpi xmlns:a14="http://schemas.microsoft.com/office/drawing/2010/main" xmlns="" val="0"/>
+                <a14:useLocalDpi xmlns:a14="http://schemas.microsoft.com/office/drawing/2010/main" val="0"/>
               </a:ext>
             </a:extLst>
           </a:blip>
@@ -10960,7 +12089,7 @@
           <p:cNvPr id="18" name="Imagen 17">
             <a:extLst>
               <a:ext uri="{FF2B5EF4-FFF2-40B4-BE49-F238E27FC236}">
-                <a16:creationId xmlns:a16="http://schemas.microsoft.com/office/drawing/2014/main" xmlns="" id="{8646EEDC-88A1-4D49-A526-A92135A622F0}"/>
+                <a16:creationId xmlns:a16="http://schemas.microsoft.com/office/drawing/2014/main" id="{8646EEDC-88A1-4D49-A526-A92135A622F0}"/>
               </a:ext>
             </a:extLst>
           </p:cNvPr>
@@ -10973,7 +12102,7 @@
           <a:blip r:embed="rId3" cstate="print">
             <a:extLst>
               <a:ext uri="{28A0092B-C50C-407E-A947-70E740481C1C}">
-                <a14:useLocalDpi xmlns:a14="http://schemas.microsoft.com/office/drawing/2010/main" xmlns="" val="0"/>
+                <a14:useLocalDpi xmlns:a14="http://schemas.microsoft.com/office/drawing/2010/main" val="0"/>
               </a:ext>
             </a:extLst>
           </a:blip>
@@ -10996,7 +12125,7 @@
           <p:cNvPr id="20" name="Imagen 19">
             <a:extLst>
               <a:ext uri="{FF2B5EF4-FFF2-40B4-BE49-F238E27FC236}">
-                <a16:creationId xmlns:a16="http://schemas.microsoft.com/office/drawing/2014/main" xmlns="" id="{4A2D40FB-590B-4A55-B259-6C3ECBBC258F}"/>
+                <a16:creationId xmlns:a16="http://schemas.microsoft.com/office/drawing/2014/main" id="{4A2D40FB-590B-4A55-B259-6C3ECBBC258F}"/>
               </a:ext>
             </a:extLst>
           </p:cNvPr>
@@ -11006,10 +12135,10 @@
           <p:nvPr/>
         </p:nvPicPr>
         <p:blipFill>
-          <a:blip r:embed="rId4" cstate="print">
+          <a:blip r:embed="rId4" cstate="hqprint">
             <a:extLst>
               <a:ext uri="{28A0092B-C50C-407E-A947-70E740481C1C}">
-                <a14:useLocalDpi xmlns:a14="http://schemas.microsoft.com/office/drawing/2010/main" xmlns="" val="0"/>
+                <a14:useLocalDpi xmlns:a14="http://schemas.microsoft.com/office/drawing/2010/main" val="0"/>
               </a:ext>
             </a:extLst>
           </a:blip>
@@ -11032,7 +12161,7 @@
           <p:cNvPr id="22" name="Imagen 21">
             <a:extLst>
               <a:ext uri="{FF2B5EF4-FFF2-40B4-BE49-F238E27FC236}">
-                <a16:creationId xmlns:a16="http://schemas.microsoft.com/office/drawing/2014/main" xmlns="" id="{B2430BC3-AAE9-4FD6-9B04-9E1C8B7005EE}"/>
+                <a16:creationId xmlns:a16="http://schemas.microsoft.com/office/drawing/2014/main" id="{B2430BC3-AAE9-4FD6-9B04-9E1C8B7005EE}"/>
               </a:ext>
             </a:extLst>
           </p:cNvPr>
@@ -11042,10 +12171,10 @@
           <p:nvPr/>
         </p:nvPicPr>
         <p:blipFill>
-          <a:blip r:embed="rId5" cstate="print">
+          <a:blip r:embed="rId5" cstate="hqprint">
             <a:extLst>
               <a:ext uri="{28A0092B-C50C-407E-A947-70E740481C1C}">
-                <a14:useLocalDpi xmlns:a14="http://schemas.microsoft.com/office/drawing/2010/main" xmlns="" val="0"/>
+                <a14:useLocalDpi xmlns:a14="http://schemas.microsoft.com/office/drawing/2010/main" val="0"/>
               </a:ext>
             </a:extLst>
           </a:blip>
@@ -11068,7 +12197,7 @@
           <p:cNvPr id="25" name="Grupo 24">
             <a:extLst>
               <a:ext uri="{FF2B5EF4-FFF2-40B4-BE49-F238E27FC236}">
-                <a16:creationId xmlns:a16="http://schemas.microsoft.com/office/drawing/2014/main" xmlns="" id="{6FBCDE22-F651-45B0-99A1-055E6ABDF7ED}"/>
+                <a16:creationId xmlns:a16="http://schemas.microsoft.com/office/drawing/2014/main" id="{6FBCDE22-F651-45B0-99A1-055E6ABDF7ED}"/>
               </a:ext>
             </a:extLst>
           </p:cNvPr>
@@ -11088,7 +12217,7 @@
             <p:cNvPr id="12" name="Imagen 11">
               <a:extLst>
                 <a:ext uri="{FF2B5EF4-FFF2-40B4-BE49-F238E27FC236}">
-                  <a16:creationId xmlns:a16="http://schemas.microsoft.com/office/drawing/2014/main" xmlns="" id="{8EF366B3-0A5E-4158-883D-ADDFEF56C8D1}"/>
+                  <a16:creationId xmlns:a16="http://schemas.microsoft.com/office/drawing/2014/main" id="{8EF366B3-0A5E-4158-883D-ADDFEF56C8D1}"/>
                 </a:ext>
               </a:extLst>
             </p:cNvPr>
@@ -11101,7 +12230,7 @@
             <a:blip r:embed="rId6" cstate="print">
               <a:extLst>
                 <a:ext uri="{28A0092B-C50C-407E-A947-70E740481C1C}">
-                  <a14:useLocalDpi xmlns:a14="http://schemas.microsoft.com/office/drawing/2010/main" xmlns="" val="0"/>
+                  <a14:useLocalDpi xmlns:a14="http://schemas.microsoft.com/office/drawing/2010/main" val="0"/>
                 </a:ext>
               </a:extLst>
             </a:blip>
@@ -11124,7 +12253,7 @@
             <p:cNvPr id="14" name="Imagen 13">
               <a:extLst>
                 <a:ext uri="{FF2B5EF4-FFF2-40B4-BE49-F238E27FC236}">
-                  <a16:creationId xmlns:a16="http://schemas.microsoft.com/office/drawing/2014/main" xmlns="" id="{16FD14F2-15D3-4DD2-9D3C-D16633A69E32}"/>
+                  <a16:creationId xmlns:a16="http://schemas.microsoft.com/office/drawing/2014/main" id="{16FD14F2-15D3-4DD2-9D3C-D16633A69E32}"/>
                 </a:ext>
               </a:extLst>
             </p:cNvPr>
@@ -11137,7 +12266,7 @@
             <a:blip r:embed="rId7" cstate="print">
               <a:extLst>
                 <a:ext uri="{28A0092B-C50C-407E-A947-70E740481C1C}">
-                  <a14:useLocalDpi xmlns:a14="http://schemas.microsoft.com/office/drawing/2010/main" xmlns="" val="0"/>
+                  <a14:useLocalDpi xmlns:a14="http://schemas.microsoft.com/office/drawing/2010/main" val="0"/>
                 </a:ext>
               </a:extLst>
             </a:blip>
@@ -11160,7 +12289,7 @@
             <p:cNvPr id="16" name="Imagen 15">
               <a:extLst>
                 <a:ext uri="{FF2B5EF4-FFF2-40B4-BE49-F238E27FC236}">
-                  <a16:creationId xmlns:a16="http://schemas.microsoft.com/office/drawing/2014/main" xmlns="" id="{F8D896A9-662E-4D9F-A70A-6AAF6F5C524E}"/>
+                  <a16:creationId xmlns:a16="http://schemas.microsoft.com/office/drawing/2014/main" id="{F8D896A9-662E-4D9F-A70A-6AAF6F5C524E}"/>
                 </a:ext>
               </a:extLst>
             </p:cNvPr>
@@ -11173,7 +12302,7 @@
             <a:blip r:embed="rId8" cstate="print">
               <a:extLst>
                 <a:ext uri="{28A0092B-C50C-407E-A947-70E740481C1C}">
-                  <a14:useLocalDpi xmlns:a14="http://schemas.microsoft.com/office/drawing/2010/main" xmlns="" val="0"/>
+                  <a14:useLocalDpi xmlns:a14="http://schemas.microsoft.com/office/drawing/2010/main" val="0"/>
                 </a:ext>
               </a:extLst>
             </a:blip>
@@ -11196,7 +12325,7 @@
             <p:cNvPr id="24" name="Imagen 23">
               <a:extLst>
                 <a:ext uri="{FF2B5EF4-FFF2-40B4-BE49-F238E27FC236}">
-                  <a16:creationId xmlns:a16="http://schemas.microsoft.com/office/drawing/2014/main" xmlns="" id="{34384560-A72D-4409-8A84-1ED46309C9E6}"/>
+                  <a16:creationId xmlns:a16="http://schemas.microsoft.com/office/drawing/2014/main" id="{34384560-A72D-4409-8A84-1ED46309C9E6}"/>
                 </a:ext>
               </a:extLst>
             </p:cNvPr>
@@ -11209,7 +12338,7 @@
             <a:blip r:embed="rId9" cstate="print">
               <a:extLst>
                 <a:ext uri="{28A0092B-C50C-407E-A947-70E740481C1C}">
-                  <a14:useLocalDpi xmlns:a14="http://schemas.microsoft.com/office/drawing/2010/main" xmlns="" val="0"/>
+                  <a14:useLocalDpi xmlns:a14="http://schemas.microsoft.com/office/drawing/2010/main" val="0"/>
                 </a:ext>
               </a:extLst>
             </a:blip>
@@ -11231,7 +12360,7 @@
     </p:spTree>
     <p:extLst>
       <p:ext uri="{BB962C8B-B14F-4D97-AF65-F5344CB8AC3E}">
-        <p14:creationId xmlns:p14="http://schemas.microsoft.com/office/powerpoint/2010/main" xmlns="" val="3384966416"/>
+        <p14:creationId xmlns:p14="http://schemas.microsoft.com/office/powerpoint/2010/main" val="3384966416"/>
       </p:ext>
     </p:extLst>
   </p:cSld>
@@ -11263,7 +12392,7 @@
           <p:cNvPr id="2" name="Título 1">
             <a:extLst>
               <a:ext uri="{FF2B5EF4-FFF2-40B4-BE49-F238E27FC236}">
-                <a16:creationId xmlns:a16="http://schemas.microsoft.com/office/drawing/2014/main" xmlns="" id="{0ED6D180-92C1-4333-BA91-2BBA4DD94A3B}"/>
+                <a16:creationId xmlns:a16="http://schemas.microsoft.com/office/drawing/2014/main" id="{0ED6D180-92C1-4333-BA91-2BBA4DD94A3B}"/>
               </a:ext>
             </a:extLst>
           </p:cNvPr>
@@ -11296,7 +12425,7 @@
           <p:cNvPr id="6" name="Marcador de contenido 5">
             <a:extLst>
               <a:ext uri="{FF2B5EF4-FFF2-40B4-BE49-F238E27FC236}">
-                <a16:creationId xmlns:a16="http://schemas.microsoft.com/office/drawing/2014/main" xmlns="" id="{EF5FF892-247B-4782-9E12-A9439F8D5681}"/>
+                <a16:creationId xmlns:a16="http://schemas.microsoft.com/office/drawing/2014/main" id="{EF5FF892-247B-4782-9E12-A9439F8D5681}"/>
               </a:ext>
             </a:extLst>
           </p:cNvPr>
@@ -11428,7 +12557,7 @@
     </p:spTree>
     <p:extLst>
       <p:ext uri="{BB962C8B-B14F-4D97-AF65-F5344CB8AC3E}">
-        <p14:creationId xmlns:p14="http://schemas.microsoft.com/office/powerpoint/2010/main" xmlns="" val="4239479209"/>
+        <p14:creationId xmlns:p14="http://schemas.microsoft.com/office/powerpoint/2010/main" val="4239479209"/>
       </p:ext>
     </p:extLst>
   </p:cSld>
@@ -11460,7 +12589,7 @@
           <p:cNvPr id="2" name="Título 1">
             <a:extLst>
               <a:ext uri="{FF2B5EF4-FFF2-40B4-BE49-F238E27FC236}">
-                <a16:creationId xmlns:a16="http://schemas.microsoft.com/office/drawing/2014/main" xmlns="" id="{0ED6D180-92C1-4333-BA91-2BBA4DD94A3B}"/>
+                <a16:creationId xmlns:a16="http://schemas.microsoft.com/office/drawing/2014/main" id="{0ED6D180-92C1-4333-BA91-2BBA4DD94A3B}"/>
               </a:ext>
             </a:extLst>
           </p:cNvPr>
@@ -11493,7 +12622,7 @@
           <p:cNvPr id="13" name="Marcador de contenido 12">
             <a:extLst>
               <a:ext uri="{FF2B5EF4-FFF2-40B4-BE49-F238E27FC236}">
-                <a16:creationId xmlns:a16="http://schemas.microsoft.com/office/drawing/2014/main" xmlns="" id="{CEA8B96E-5837-4A4D-A606-8D01BA9A3D3E}"/>
+                <a16:creationId xmlns:a16="http://schemas.microsoft.com/office/drawing/2014/main" id="{CEA8B96E-5837-4A4D-A606-8D01BA9A3D3E}"/>
               </a:ext>
             </a:extLst>
           </p:cNvPr>
@@ -11508,7 +12637,7 @@
           <a:blip r:embed="rId2" cstate="print">
             <a:extLst>
               <a:ext uri="{28A0092B-C50C-407E-A947-70E740481C1C}">
-                <a14:useLocalDpi xmlns:a14="http://schemas.microsoft.com/office/drawing/2010/main" xmlns="" val="0"/>
+                <a14:useLocalDpi xmlns:a14="http://schemas.microsoft.com/office/drawing/2010/main" val="0"/>
               </a:ext>
             </a:extLst>
           </a:blip>
@@ -11526,7 +12655,7 @@
     </p:spTree>
     <p:extLst>
       <p:ext uri="{BB962C8B-B14F-4D97-AF65-F5344CB8AC3E}">
-        <p14:creationId xmlns:p14="http://schemas.microsoft.com/office/powerpoint/2010/main" xmlns="" val="4165342321"/>
+        <p14:creationId xmlns:p14="http://schemas.microsoft.com/office/powerpoint/2010/main" val="4165342321"/>
       </p:ext>
     </p:extLst>
   </p:cSld>
@@ -11558,7 +12687,7 @@
           <p:cNvPr id="2" name="Título 1">
             <a:extLst>
               <a:ext uri="{FF2B5EF4-FFF2-40B4-BE49-F238E27FC236}">
-                <a16:creationId xmlns:a16="http://schemas.microsoft.com/office/drawing/2014/main" xmlns="" id="{48E5154C-DCCF-4EF4-A599-6C5F443E3B7E}"/>
+                <a16:creationId xmlns:a16="http://schemas.microsoft.com/office/drawing/2014/main" id="{48E5154C-DCCF-4EF4-A599-6C5F443E3B7E}"/>
               </a:ext>
             </a:extLst>
           </p:cNvPr>
@@ -11591,7 +12720,7 @@
           <p:cNvPr id="3" name="Marcador de contenido 2">
             <a:extLst>
               <a:ext uri="{FF2B5EF4-FFF2-40B4-BE49-F238E27FC236}">
-                <a16:creationId xmlns:a16="http://schemas.microsoft.com/office/drawing/2014/main" xmlns="" id="{CE1A4805-831B-4F38-AD2E-0BA47901F15D}"/>
+                <a16:creationId xmlns:a16="http://schemas.microsoft.com/office/drawing/2014/main" id="{CE1A4805-831B-4F38-AD2E-0BA47901F15D}"/>
               </a:ext>
             </a:extLst>
           </p:cNvPr>
@@ -11651,7 +12780,7 @@
     </p:spTree>
     <p:extLst>
       <p:ext uri="{BB962C8B-B14F-4D97-AF65-F5344CB8AC3E}">
-        <p14:creationId xmlns:p14="http://schemas.microsoft.com/office/powerpoint/2010/main" xmlns="" val="3912988033"/>
+        <p14:creationId xmlns:p14="http://schemas.microsoft.com/office/powerpoint/2010/main" val="3912988033"/>
       </p:ext>
     </p:extLst>
   </p:cSld>
@@ -11683,7 +12812,7 @@
           <p:cNvPr id="4" name="Rectángulo 3">
             <a:extLst>
               <a:ext uri="{FF2B5EF4-FFF2-40B4-BE49-F238E27FC236}">
-                <a16:creationId xmlns:a16="http://schemas.microsoft.com/office/drawing/2014/main" xmlns="" id="{8DA77BB3-B03A-4841-9B03-9EE22063CC69}"/>
+                <a16:creationId xmlns:a16="http://schemas.microsoft.com/office/drawing/2014/main" id="{8DA77BB3-B03A-4841-9B03-9EE22063CC69}"/>
               </a:ext>
             </a:extLst>
           </p:cNvPr>
@@ -11741,7 +12870,7 @@
     </p:spTree>
     <p:extLst>
       <p:ext uri="{BB962C8B-B14F-4D97-AF65-F5344CB8AC3E}">
-        <p14:creationId xmlns:p14="http://schemas.microsoft.com/office/powerpoint/2010/main" xmlns="" val="1791604481"/>
+        <p14:creationId xmlns:p14="http://schemas.microsoft.com/office/powerpoint/2010/main" val="1791604481"/>
       </p:ext>
     </p:extLst>
   </p:cSld>
@@ -11773,7 +12902,7 @@
           <p:cNvPr id="5" name="Marcador de contenido 4">
             <a:extLst>
               <a:ext uri="{FF2B5EF4-FFF2-40B4-BE49-F238E27FC236}">
-                <a16:creationId xmlns:a16="http://schemas.microsoft.com/office/drawing/2014/main" xmlns="" id="{6E86104B-2416-4C39-94D1-3F41BA25E339}"/>
+                <a16:creationId xmlns:a16="http://schemas.microsoft.com/office/drawing/2014/main" id="{6E86104B-2416-4C39-94D1-3F41BA25E339}"/>
               </a:ext>
             </a:extLst>
           </p:cNvPr>
@@ -11788,7 +12917,7 @@
           <a:blip r:embed="rId2" cstate="print">
             <a:extLst>
               <a:ext uri="{28A0092B-C50C-407E-A947-70E740481C1C}">
-                <a14:useLocalDpi xmlns:a14="http://schemas.microsoft.com/office/drawing/2010/main" xmlns="" val="0"/>
+                <a14:useLocalDpi xmlns:a14="http://schemas.microsoft.com/office/drawing/2010/main" val="0"/>
               </a:ext>
             </a:extLst>
           </a:blip>
@@ -11805,7 +12934,7 @@
     </p:spTree>
     <p:extLst>
       <p:ext uri="{BB962C8B-B14F-4D97-AF65-F5344CB8AC3E}">
-        <p14:creationId xmlns:p14="http://schemas.microsoft.com/office/powerpoint/2010/main" xmlns="" val="2116906813"/>
+        <p14:creationId xmlns:p14="http://schemas.microsoft.com/office/powerpoint/2010/main" val="2116906813"/>
       </p:ext>
     </p:extLst>
   </p:cSld>
@@ -12065,7 +13194,7 @@
   <a:extraClrSchemeLst/>
   <a:extLst>
     <a:ext uri="{05A4C25C-085E-4340-85A3-A5531E510DB2}">
-      <thm15:themeFamily xmlns:thm15="http://schemas.microsoft.com/office/thememl/2012/main" xmlns="" name="Parallax" id="{3388167B-A2EB-4685-9635-1831D9AEF8C4}" vid="{4F7A876A-7598-49CA-AFC8-8EDA2551E4A7}"/>
+      <thm15:themeFamily xmlns:thm15="http://schemas.microsoft.com/office/thememl/2012/main" name="Parallax" id="{3388167B-A2EB-4685-9635-1831D9AEF8C4}" vid="{4F7A876A-7598-49CA-AFC8-8EDA2551E4A7}"/>
     </a:ext>
   </a:extLst>
 </a:theme>
@@ -12326,7 +13455,7 @@
   <a:extraClrSchemeLst/>
   <a:extLst>
     <a:ext uri="{05A4C25C-085E-4340-85A3-A5531E510DB2}">
-      <thm15:themeFamily xmlns:thm15="http://schemas.microsoft.com/office/thememl/2012/main" xmlns="" name="Office Theme" id="{62F939B6-93AF-4DB8-9C6B-D6C7DFDC589F}" vid="{4A3C46E8-61CC-4603-A589-7422A47A8E4A}"/>
+      <thm15:themeFamily xmlns:thm15="http://schemas.microsoft.com/office/thememl/2012/main" name="Office Theme" id="{62F939B6-93AF-4DB8-9C6B-D6C7DFDC589F}" vid="{4A3C46E8-61CC-4603-A589-7422A47A8E4A}"/>
     </a:ext>
   </a:extLst>
 </a:theme>

</xml_diff>

<commit_message>
Actualización presentacion vaspa - 12 - Noviembre 2019.pptx y subida de txt con división de la presentación
</commit_message>
<xml_diff>
--- a/Presentaciones/presentacion vaspa - 12 - Noviembre 2019.pptx
+++ b/Presentaciones/presentacion vaspa - 12 - Noviembre 2019.pptx
@@ -151,7 +151,7 @@
 </file>
 
 <file path=ppt/charts/chart1.xml><?xml version="1.0" encoding="utf-8"?>
-<c:chartSpace xmlns:c="http://schemas.openxmlformats.org/drawingml/2006/chart" xmlns:a="http://schemas.openxmlformats.org/drawingml/2006/main" xmlns:r="http://schemas.openxmlformats.org/officeDocument/2006/relationships" xmlns:c16r2="http://schemas.microsoft.com/office/drawing/2015/06/chart">
+<c:chartSpace xmlns:c="http://schemas.openxmlformats.org/drawingml/2006/chart" xmlns:a="http://schemas.openxmlformats.org/drawingml/2006/main" xmlns:r="http://schemas.openxmlformats.org/officeDocument/2006/relationships">
   <c:date1904 val="0"/>
   <c:lang val="es-ES"/>
   <c:roundedCorners val="0"/>
@@ -259,7 +259,7 @@
                 <a:effectLst/>
               </c:spPr>
             </c:leaderLines>
-            <c:extLst>
+            <c:extLst xmlns:c16r2="http://schemas.microsoft.com/office/drawing/2015/06/chart">
               <c:ext xmlns:c15="http://schemas.microsoft.com/office/drawing/2012/chart" uri="{CE6537A1-D6FC-4f65-9D91-7224C49458BB}"/>
             </c:extLst>
           </c:dLbls>
@@ -298,7 +298,7 @@
               </c:numCache>
             </c:numRef>
           </c:val>
-          <c:extLst>
+          <c:extLst xmlns:c16r2="http://schemas.microsoft.com/office/drawing/2015/06/chart">
             <c:ext xmlns:c16="http://schemas.microsoft.com/office/drawing/2014/chart" uri="{C3380CC4-5D6E-409C-BE32-E72D297353CC}">
               <c16:uniqueId val="{00000000-5F40-4E65-AB52-C76436783A30}"/>
             </c:ext>
@@ -380,7 +380,7 @@
 </file>
 
 <file path=ppt/charts/chart2.xml><?xml version="1.0" encoding="utf-8"?>
-<c:chartSpace xmlns:c="http://schemas.openxmlformats.org/drawingml/2006/chart" xmlns:a="http://schemas.openxmlformats.org/drawingml/2006/main" xmlns:r="http://schemas.openxmlformats.org/officeDocument/2006/relationships" xmlns:c16r2="http://schemas.microsoft.com/office/drawing/2015/06/chart">
+<c:chartSpace xmlns:c="http://schemas.openxmlformats.org/drawingml/2006/chart" xmlns:a="http://schemas.openxmlformats.org/drawingml/2006/main" xmlns:r="http://schemas.openxmlformats.org/officeDocument/2006/relationships">
   <c:date1904 val="0"/>
   <c:lang val="es-ES"/>
   <c:roundedCorners val="0"/>
@@ -488,7 +488,7 @@
                 <a:effectLst/>
               </c:spPr>
             </c:leaderLines>
-            <c:extLst>
+            <c:extLst xmlns:c16r2="http://schemas.microsoft.com/office/drawing/2015/06/chart">
               <c:ext xmlns:c15="http://schemas.microsoft.com/office/drawing/2012/chart" uri="{CE6537A1-D6FC-4f65-9D91-7224C49458BB}"/>
             </c:extLst>
           </c:dLbls>
@@ -527,7 +527,7 @@
               </c:numCache>
             </c:numRef>
           </c:val>
-          <c:extLst>
+          <c:extLst xmlns:c16r2="http://schemas.microsoft.com/office/drawing/2015/06/chart">
             <c:ext xmlns:c16="http://schemas.microsoft.com/office/drawing/2014/chart" uri="{C3380CC4-5D6E-409C-BE32-E72D297353CC}">
               <c16:uniqueId val="{00000000-059F-47D9-99CE-FB425E922A48}"/>
             </c:ext>
@@ -609,7 +609,7 @@
 </file>
 
 <file path=ppt/charts/chart3.xml><?xml version="1.0" encoding="utf-8"?>
-<c:chartSpace xmlns:c="http://schemas.openxmlformats.org/drawingml/2006/chart" xmlns:a="http://schemas.openxmlformats.org/drawingml/2006/main" xmlns:r="http://schemas.openxmlformats.org/officeDocument/2006/relationships" xmlns:c16r2="http://schemas.microsoft.com/office/drawing/2015/06/chart">
+<c:chartSpace xmlns:c="http://schemas.openxmlformats.org/drawingml/2006/chart" xmlns:a="http://schemas.openxmlformats.org/drawingml/2006/main" xmlns:r="http://schemas.openxmlformats.org/officeDocument/2006/relationships">
   <c:date1904 val="0"/>
   <c:lang val="es-ES"/>
   <c:roundedCorners val="0"/>
@@ -717,7 +717,7 @@
                 <a:effectLst/>
               </c:spPr>
             </c:leaderLines>
-            <c:extLst>
+            <c:extLst xmlns:c16r2="http://schemas.microsoft.com/office/drawing/2015/06/chart">
               <c:ext xmlns:c15="http://schemas.microsoft.com/office/drawing/2012/chart" uri="{CE6537A1-D6FC-4f65-9D91-7224C49458BB}"/>
             </c:extLst>
           </c:dLbls>
@@ -756,7 +756,7 @@
               </c:numCache>
             </c:numRef>
           </c:val>
-          <c:extLst>
+          <c:extLst xmlns:c16r2="http://schemas.microsoft.com/office/drawing/2015/06/chart">
             <c:ext xmlns:c16="http://schemas.microsoft.com/office/drawing/2014/chart" uri="{C3380CC4-5D6E-409C-BE32-E72D297353CC}">
               <c16:uniqueId val="{00000000-3941-4F29-B399-9A4E481D4333}"/>
             </c:ext>
@@ -838,7 +838,7 @@
 </file>
 
 <file path=ppt/charts/chart4.xml><?xml version="1.0" encoding="utf-8"?>
-<c:chartSpace xmlns:c="http://schemas.openxmlformats.org/drawingml/2006/chart" xmlns:a="http://schemas.openxmlformats.org/drawingml/2006/main" xmlns:r="http://schemas.openxmlformats.org/officeDocument/2006/relationships" xmlns:c16r2="http://schemas.microsoft.com/office/drawing/2015/06/chart">
+<c:chartSpace xmlns:c="http://schemas.openxmlformats.org/drawingml/2006/chart" xmlns:a="http://schemas.openxmlformats.org/drawingml/2006/main" xmlns:r="http://schemas.openxmlformats.org/officeDocument/2006/relationships">
   <c:date1904 val="0"/>
   <c:lang val="es-ES"/>
   <c:roundedCorners val="0"/>
@@ -952,7 +952,7 @@
               </a:ln>
               <a:effectLst/>
             </c:spPr>
-            <c:extLst>
+            <c:extLst xmlns:c16r2="http://schemas.microsoft.com/office/drawing/2015/06/chart">
               <c:ext xmlns:c16="http://schemas.microsoft.com/office/drawing/2014/chart" uri="{C3380CC4-5D6E-409C-BE32-E72D297353CC}">
                 <c16:uniqueId val="{00000001-92AC-41C0-9681-7C859D37E438}"/>
               </c:ext>
@@ -972,7 +972,7 @@
               </a:ln>
               <a:effectLst/>
             </c:spPr>
-            <c:extLst>
+            <c:extLst xmlns:c16r2="http://schemas.microsoft.com/office/drawing/2015/06/chart">
               <c:ext xmlns:c16="http://schemas.microsoft.com/office/drawing/2014/chart" uri="{C3380CC4-5D6E-409C-BE32-E72D297353CC}">
                 <c16:uniqueId val="{00000003-92AC-41C0-9681-7C859D37E438}"/>
               </c:ext>
@@ -1007,7 +1007,7 @@
               </c:numCache>
             </c:numRef>
           </c:val>
-          <c:extLst>
+          <c:extLst xmlns:c16r2="http://schemas.microsoft.com/office/drawing/2015/06/chart">
             <c:ext xmlns:c16="http://schemas.microsoft.com/office/drawing/2014/chart" uri="{C3380CC4-5D6E-409C-BE32-E72D297353CC}">
               <c16:uniqueId val="{00000000-1ABC-43B0-A04E-E78A647A0063}"/>
             </c:ext>
@@ -3163,7 +3163,7 @@
             <a:fld id="{F55F861E-3C59-4235-9924-AE3FDF166F3F}" type="datetimeFigureOut">
               <a:rPr lang="es-AR" smtClean="0"/>
               <a:pPr/>
-              <a:t>10/11/2019</a:t>
+              <a:t>11/11/2019</a:t>
             </a:fld>
             <a:endParaRPr lang="es-AR"/>
           </a:p>
@@ -3935,7 +3935,7 @@
             <a:fld id="{59D4168E-E6F0-4E6D-9E98-0FBF44047F1D}" type="datetimeFigureOut">
               <a:rPr lang="es-AR" smtClean="0"/>
               <a:pPr/>
-              <a:t>10/11/2019</a:t>
+              <a:t>11/11/2019</a:t>
             </a:fld>
             <a:endParaRPr lang="es-AR"/>
           </a:p>
@@ -3994,7 +3994,7 @@
           <p:cNvPr id="8" name="Imagen 7">
             <a:extLst>
               <a:ext uri="{FF2B5EF4-FFF2-40B4-BE49-F238E27FC236}">
-                <a16:creationId xmlns:a16="http://schemas.microsoft.com/office/drawing/2014/main" id="{153E41C7-C0FB-4283-8821-79FB890C108B}"/>
+                <a16:creationId xmlns:a16="http://schemas.microsoft.com/office/drawing/2014/main" xmlns="" id="{153E41C7-C0FB-4283-8821-79FB890C108B}"/>
               </a:ext>
             </a:extLst>
           </p:cNvPr>
@@ -4269,7 +4269,7 @@
             <a:fld id="{59D4168E-E6F0-4E6D-9E98-0FBF44047F1D}" type="datetimeFigureOut">
               <a:rPr lang="es-AR" smtClean="0"/>
               <a:pPr/>
-              <a:t>10/11/2019</a:t>
+              <a:t>11/11/2019</a:t>
             </a:fld>
             <a:endParaRPr lang="es-AR"/>
           </a:p>
@@ -4519,7 +4519,7 @@
             <a:fld id="{59D4168E-E6F0-4E6D-9E98-0FBF44047F1D}" type="datetimeFigureOut">
               <a:rPr lang="es-AR" smtClean="0"/>
               <a:pPr/>
-              <a:t>10/11/2019</a:t>
+              <a:t>11/11/2019</a:t>
             </a:fld>
             <a:endParaRPr lang="es-AR"/>
           </a:p>
@@ -5061,7 +5061,7 @@
             <a:fld id="{59D4168E-E6F0-4E6D-9E98-0FBF44047F1D}" type="datetimeFigureOut">
               <a:rPr lang="es-AR" smtClean="0"/>
               <a:pPr/>
-              <a:t>10/11/2019</a:t>
+              <a:t>11/11/2019</a:t>
             </a:fld>
             <a:endParaRPr lang="es-AR"/>
           </a:p>
@@ -5311,7 +5311,7 @@
             <a:fld id="{59D4168E-E6F0-4E6D-9E98-0FBF44047F1D}" type="datetimeFigureOut">
               <a:rPr lang="es-AR" smtClean="0"/>
               <a:pPr/>
-              <a:t>10/11/2019</a:t>
+              <a:t>11/11/2019</a:t>
             </a:fld>
             <a:endParaRPr lang="es-AR"/>
           </a:p>
@@ -5845,7 +5845,7 @@
             <a:fld id="{59D4168E-E6F0-4E6D-9E98-0FBF44047F1D}" type="datetimeFigureOut">
               <a:rPr lang="es-AR" smtClean="0"/>
               <a:pPr/>
-              <a:t>10/11/2019</a:t>
+              <a:t>11/11/2019</a:t>
             </a:fld>
             <a:endParaRPr lang="es-AR"/>
           </a:p>
@@ -6144,7 +6144,7 @@
             <a:fld id="{59D4168E-E6F0-4E6D-9E98-0FBF44047F1D}" type="datetimeFigureOut">
               <a:rPr lang="es-AR" smtClean="0"/>
               <a:pPr/>
-              <a:t>10/11/2019</a:t>
+              <a:t>11/11/2019</a:t>
             </a:fld>
             <a:endParaRPr lang="es-AR"/>
           </a:p>
@@ -6320,7 +6320,7 @@
             <a:fld id="{59D4168E-E6F0-4E6D-9E98-0FBF44047F1D}" type="datetimeFigureOut">
               <a:rPr lang="es-AR" smtClean="0"/>
               <a:pPr/>
-              <a:t>10/11/2019</a:t>
+              <a:t>11/11/2019</a:t>
             </a:fld>
             <a:endParaRPr lang="es-AR"/>
           </a:p>
@@ -6502,7 +6502,7 @@
             <a:fld id="{59D4168E-E6F0-4E6D-9E98-0FBF44047F1D}" type="datetimeFigureOut">
               <a:rPr lang="es-AR" smtClean="0"/>
               <a:pPr/>
-              <a:t>10/11/2019</a:t>
+              <a:t>11/11/2019</a:t>
             </a:fld>
             <a:endParaRPr lang="es-AR"/>
           </a:p>
@@ -6680,7 +6680,7 @@
             <a:fld id="{59D4168E-E6F0-4E6D-9E98-0FBF44047F1D}" type="datetimeFigureOut">
               <a:rPr lang="es-AR" smtClean="0"/>
               <a:pPr/>
-              <a:t>10/11/2019</a:t>
+              <a:t>11/11/2019</a:t>
             </a:fld>
             <a:endParaRPr lang="es-AR"/>
           </a:p>
@@ -6739,7 +6739,7 @@
           <p:cNvPr id="8" name="Imagen 7">
             <a:extLst>
               <a:ext uri="{FF2B5EF4-FFF2-40B4-BE49-F238E27FC236}">
-                <a16:creationId xmlns:a16="http://schemas.microsoft.com/office/drawing/2014/main" id="{F65BAB47-52C5-4418-98C7-5ABDFBAB2220}"/>
+                <a16:creationId xmlns:a16="http://schemas.microsoft.com/office/drawing/2014/main" xmlns="" id="{F65BAB47-52C5-4418-98C7-5ABDFBAB2220}"/>
               </a:ext>
             </a:extLst>
           </p:cNvPr>
@@ -6969,7 +6969,7 @@
             <a:fld id="{59D4168E-E6F0-4E6D-9E98-0FBF44047F1D}" type="datetimeFigureOut">
               <a:rPr lang="es-AR" smtClean="0"/>
               <a:pPr/>
-              <a:t>10/11/2019</a:t>
+              <a:t>11/11/2019</a:t>
             </a:fld>
             <a:endParaRPr lang="es-AR"/>
           </a:p>
@@ -7268,7 +7268,7 @@
             <a:fld id="{59D4168E-E6F0-4E6D-9E98-0FBF44047F1D}" type="datetimeFigureOut">
               <a:rPr lang="es-AR" smtClean="0"/>
               <a:pPr/>
-              <a:t>10/11/2019</a:t>
+              <a:t>11/11/2019</a:t>
             </a:fld>
             <a:endParaRPr lang="es-AR"/>
           </a:p>
@@ -7712,7 +7712,7 @@
             <a:fld id="{59D4168E-E6F0-4E6D-9E98-0FBF44047F1D}" type="datetimeFigureOut">
               <a:rPr lang="es-AR" smtClean="0"/>
               <a:pPr/>
-              <a:t>10/11/2019</a:t>
+              <a:t>11/11/2019</a:t>
             </a:fld>
             <a:endParaRPr lang="es-AR"/>
           </a:p>
@@ -7832,7 +7832,7 @@
             <a:fld id="{59D4168E-E6F0-4E6D-9E98-0FBF44047F1D}" type="datetimeFigureOut">
               <a:rPr lang="es-AR" smtClean="0"/>
               <a:pPr/>
-              <a:t>10/11/2019</a:t>
+              <a:t>11/11/2019</a:t>
             </a:fld>
             <a:endParaRPr lang="es-AR"/>
           </a:p>
@@ -7929,7 +7929,7 @@
             <a:fld id="{59D4168E-E6F0-4E6D-9E98-0FBF44047F1D}" type="datetimeFigureOut">
               <a:rPr lang="es-AR" smtClean="0"/>
               <a:pPr/>
-              <a:t>10/11/2019</a:t>
+              <a:t>11/11/2019</a:t>
             </a:fld>
             <a:endParaRPr lang="es-AR"/>
           </a:p>
@@ -8214,7 +8214,7 @@
             <a:fld id="{59D4168E-E6F0-4E6D-9E98-0FBF44047F1D}" type="datetimeFigureOut">
               <a:rPr lang="es-AR" smtClean="0"/>
               <a:pPr/>
-              <a:t>10/11/2019</a:t>
+              <a:t>11/11/2019</a:t>
             </a:fld>
             <a:endParaRPr lang="es-AR"/>
           </a:p>
@@ -8507,7 +8507,7 @@
             <a:fld id="{59D4168E-E6F0-4E6D-9E98-0FBF44047F1D}" type="datetimeFigureOut">
               <a:rPr lang="es-AR" smtClean="0"/>
               <a:pPr/>
-              <a:t>10/11/2019</a:t>
+              <a:t>11/11/2019</a:t>
             </a:fld>
             <a:endParaRPr lang="es-AR"/>
           </a:p>
@@ -9039,7 +9039,7 @@
             <a:fld id="{59D4168E-E6F0-4E6D-9E98-0FBF44047F1D}" type="datetimeFigureOut">
               <a:rPr lang="es-AR" smtClean="0"/>
               <a:pPr/>
-              <a:t>10/11/2019</a:t>
+              <a:t>11/11/2019</a:t>
             </a:fld>
             <a:endParaRPr lang="es-AR"/>
           </a:p>
@@ -9576,7 +9576,7 @@
           <p:cNvPr id="2" name="Título 1">
             <a:extLst>
               <a:ext uri="{FF2B5EF4-FFF2-40B4-BE49-F238E27FC236}">
-                <a16:creationId xmlns:a16="http://schemas.microsoft.com/office/drawing/2014/main" id="{8CE1749D-25BE-4B8A-9C39-0568C1DB7176}"/>
+                <a16:creationId xmlns:a16="http://schemas.microsoft.com/office/drawing/2014/main" xmlns="" id="{8CE1749D-25BE-4B8A-9C39-0568C1DB7176}"/>
               </a:ext>
             </a:extLst>
           </p:cNvPr>
@@ -9609,7 +9609,7 @@
           <p:cNvPr id="5" name="Subtítulo 2">
             <a:extLst>
               <a:ext uri="{FF2B5EF4-FFF2-40B4-BE49-F238E27FC236}">
-                <a16:creationId xmlns:a16="http://schemas.microsoft.com/office/drawing/2014/main" id="{77C0998F-42B9-4F94-A4C5-FB800997D545}"/>
+                <a16:creationId xmlns:a16="http://schemas.microsoft.com/office/drawing/2014/main" xmlns="" id="{77C0998F-42B9-4F94-A4C5-FB800997D545}"/>
               </a:ext>
             </a:extLst>
           </p:cNvPr>
@@ -9644,7 +9644,7 @@
           <p:cNvPr id="3" name="CuadroTexto 2">
             <a:extLst>
               <a:ext uri="{FF2B5EF4-FFF2-40B4-BE49-F238E27FC236}">
-                <a16:creationId xmlns:a16="http://schemas.microsoft.com/office/drawing/2014/main" id="{EC53297C-9824-45B9-8927-A6834EB1DBD1}"/>
+                <a16:creationId xmlns:a16="http://schemas.microsoft.com/office/drawing/2014/main" xmlns="" id="{EC53297C-9824-45B9-8927-A6834EB1DBD1}"/>
               </a:ext>
             </a:extLst>
           </p:cNvPr>
@@ -9709,7 +9709,7 @@
           <p:cNvPr id="6" name="Imagen 5">
             <a:extLst>
               <a:ext uri="{FF2B5EF4-FFF2-40B4-BE49-F238E27FC236}">
-                <a16:creationId xmlns:a16="http://schemas.microsoft.com/office/drawing/2014/main" id="{765DC11C-9D6D-4F31-9AC7-1EFE6E6D455C}"/>
+                <a16:creationId xmlns:a16="http://schemas.microsoft.com/office/drawing/2014/main" xmlns="" id="{765DC11C-9D6D-4F31-9AC7-1EFE6E6D455C}"/>
               </a:ext>
             </a:extLst>
           </p:cNvPr>
@@ -9775,7 +9775,7 @@
           <p:cNvPr id="2" name="Título 1">
             <a:extLst>
               <a:ext uri="{FF2B5EF4-FFF2-40B4-BE49-F238E27FC236}">
-                <a16:creationId xmlns:a16="http://schemas.microsoft.com/office/drawing/2014/main" id="{CAF4FE63-0F55-4EEF-8842-BB6A3638AF69}"/>
+                <a16:creationId xmlns:a16="http://schemas.microsoft.com/office/drawing/2014/main" xmlns="" id="{CAF4FE63-0F55-4EEF-8842-BB6A3638AF69}"/>
               </a:ext>
             </a:extLst>
           </p:cNvPr>
@@ -9808,7 +9808,7 @@
           <p:cNvPr id="3" name="Marcador de contenido 2">
             <a:extLst>
               <a:ext uri="{FF2B5EF4-FFF2-40B4-BE49-F238E27FC236}">
-                <a16:creationId xmlns:a16="http://schemas.microsoft.com/office/drawing/2014/main" id="{7C013F95-5617-4D6D-B332-E32197B1B877}"/>
+                <a16:creationId xmlns:a16="http://schemas.microsoft.com/office/drawing/2014/main" xmlns="" id="{7C013F95-5617-4D6D-B332-E32197B1B877}"/>
               </a:ext>
             </a:extLst>
           </p:cNvPr>
@@ -9899,7 +9899,7 @@
           <p:cNvPr id="2" name="Título 1">
             <a:extLst>
               <a:ext uri="{FF2B5EF4-FFF2-40B4-BE49-F238E27FC236}">
-                <a16:creationId xmlns:a16="http://schemas.microsoft.com/office/drawing/2014/main" id="{160713EF-2C24-4802-8755-A926FAEF4588}"/>
+                <a16:creationId xmlns:a16="http://schemas.microsoft.com/office/drawing/2014/main" xmlns="" id="{160713EF-2C24-4802-8755-A926FAEF4588}"/>
               </a:ext>
             </a:extLst>
           </p:cNvPr>
@@ -9953,14 +9953,14 @@
                 <a:gridCol w="7177710">
                   <a:extLst>
                     <a:ext uri="{9D8B030D-6E8A-4147-A177-3AD203B41FA5}">
-                      <a16:colId xmlns:a16="http://schemas.microsoft.com/office/drawing/2014/main" val="20000"/>
+                      <a16:colId xmlns:a16="http://schemas.microsoft.com/office/drawing/2014/main" xmlns="" val="20000"/>
                     </a:ext>
                   </a:extLst>
                 </a:gridCol>
                 <a:gridCol w="2482106">
                   <a:extLst>
                     <a:ext uri="{9D8B030D-6E8A-4147-A177-3AD203B41FA5}">
-                      <a16:colId xmlns:a16="http://schemas.microsoft.com/office/drawing/2014/main" val="20001"/>
+                      <a16:colId xmlns:a16="http://schemas.microsoft.com/office/drawing/2014/main" xmlns="" val="20001"/>
                     </a:ext>
                   </a:extLst>
                 </a:gridCol>
@@ -10114,7 +10114,7 @@
                 </a:tc>
                 <a:extLst>
                   <a:ext uri="{0D108BD9-81ED-4DB2-BD59-A6C34878D82A}">
-                    <a16:rowId xmlns:a16="http://schemas.microsoft.com/office/drawing/2014/main" val="10000"/>
+                    <a16:rowId xmlns:a16="http://schemas.microsoft.com/office/drawing/2014/main" xmlns="" val="10000"/>
                   </a:ext>
                 </a:extLst>
               </a:tr>
@@ -10261,7 +10261,7 @@
                 </a:tc>
                 <a:extLst>
                   <a:ext uri="{0D108BD9-81ED-4DB2-BD59-A6C34878D82A}">
-                    <a16:rowId xmlns:a16="http://schemas.microsoft.com/office/drawing/2014/main" val="10001"/>
+                    <a16:rowId xmlns:a16="http://schemas.microsoft.com/office/drawing/2014/main" xmlns="" val="10001"/>
                   </a:ext>
                 </a:extLst>
               </a:tr>
@@ -10408,7 +10408,7 @@
                 </a:tc>
                 <a:extLst>
                   <a:ext uri="{0D108BD9-81ED-4DB2-BD59-A6C34878D82A}">
-                    <a16:rowId xmlns:a16="http://schemas.microsoft.com/office/drawing/2014/main" val="10002"/>
+                    <a16:rowId xmlns:a16="http://schemas.microsoft.com/office/drawing/2014/main" xmlns="" val="10002"/>
                   </a:ext>
                 </a:extLst>
               </a:tr>
@@ -10576,7 +10576,7 @@
                 </a:tc>
                 <a:extLst>
                   <a:ext uri="{0D108BD9-81ED-4DB2-BD59-A6C34878D82A}">
-                    <a16:rowId xmlns:a16="http://schemas.microsoft.com/office/drawing/2014/main" val="10003"/>
+                    <a16:rowId xmlns:a16="http://schemas.microsoft.com/office/drawing/2014/main" xmlns="" val="10003"/>
                   </a:ext>
                 </a:extLst>
               </a:tr>
@@ -10723,7 +10723,7 @@
                 </a:tc>
                 <a:extLst>
                   <a:ext uri="{0D108BD9-81ED-4DB2-BD59-A6C34878D82A}">
-                    <a16:rowId xmlns:a16="http://schemas.microsoft.com/office/drawing/2014/main" val="10004"/>
+                    <a16:rowId xmlns:a16="http://schemas.microsoft.com/office/drawing/2014/main" xmlns="" val="10004"/>
                   </a:ext>
                 </a:extLst>
               </a:tr>
@@ -10870,7 +10870,7 @@
                 </a:tc>
                 <a:extLst>
                   <a:ext uri="{0D108BD9-81ED-4DB2-BD59-A6C34878D82A}">
-                    <a16:rowId xmlns:a16="http://schemas.microsoft.com/office/drawing/2014/main" val="10005"/>
+                    <a16:rowId xmlns:a16="http://schemas.microsoft.com/office/drawing/2014/main" xmlns="" val="10005"/>
                   </a:ext>
                 </a:extLst>
               </a:tr>
@@ -11038,7 +11038,7 @@
                 </a:tc>
                 <a:extLst>
                   <a:ext uri="{0D108BD9-81ED-4DB2-BD59-A6C34878D82A}">
-                    <a16:rowId xmlns:a16="http://schemas.microsoft.com/office/drawing/2014/main" val="10006"/>
+                    <a16:rowId xmlns:a16="http://schemas.microsoft.com/office/drawing/2014/main" xmlns="" val="10006"/>
                   </a:ext>
                 </a:extLst>
               </a:tr>
@@ -11206,7 +11206,7 @@
                 </a:tc>
                 <a:extLst>
                   <a:ext uri="{0D108BD9-81ED-4DB2-BD59-A6C34878D82A}">
-                    <a16:rowId xmlns:a16="http://schemas.microsoft.com/office/drawing/2014/main" val="10007"/>
+                    <a16:rowId xmlns:a16="http://schemas.microsoft.com/office/drawing/2014/main" xmlns="" val="10007"/>
                   </a:ext>
                 </a:extLst>
               </a:tr>
@@ -11353,7 +11353,7 @@
                 </a:tc>
                 <a:extLst>
                   <a:ext uri="{0D108BD9-81ED-4DB2-BD59-A6C34878D82A}">
-                    <a16:rowId xmlns:a16="http://schemas.microsoft.com/office/drawing/2014/main" val="10008"/>
+                    <a16:rowId xmlns:a16="http://schemas.microsoft.com/office/drawing/2014/main" xmlns="" val="10008"/>
                   </a:ext>
                 </a:extLst>
               </a:tr>
@@ -11500,7 +11500,7 @@
                 </a:tc>
                 <a:extLst>
                   <a:ext uri="{0D108BD9-81ED-4DB2-BD59-A6C34878D82A}">
-                    <a16:rowId xmlns:a16="http://schemas.microsoft.com/office/drawing/2014/main" val="10009"/>
+                    <a16:rowId xmlns:a16="http://schemas.microsoft.com/office/drawing/2014/main" xmlns="" val="10009"/>
                   </a:ext>
                 </a:extLst>
               </a:tr>
@@ -11647,7 +11647,7 @@
                 </a:tc>
                 <a:extLst>
                   <a:ext uri="{0D108BD9-81ED-4DB2-BD59-A6C34878D82A}">
-                    <a16:rowId xmlns:a16="http://schemas.microsoft.com/office/drawing/2014/main" val="10010"/>
+                    <a16:rowId xmlns:a16="http://schemas.microsoft.com/office/drawing/2014/main" xmlns="" val="10010"/>
                   </a:ext>
                 </a:extLst>
               </a:tr>
@@ -11690,7 +11690,7 @@
           <p:cNvPr id="2" name="Título 1">
             <a:extLst>
               <a:ext uri="{FF2B5EF4-FFF2-40B4-BE49-F238E27FC236}">
-                <a16:creationId xmlns:a16="http://schemas.microsoft.com/office/drawing/2014/main" id="{6EB0A5A3-C538-4066-BB19-7EA82C4802A3}"/>
+                <a16:creationId xmlns:a16="http://schemas.microsoft.com/office/drawing/2014/main" xmlns="" id="{6EB0A5A3-C538-4066-BB19-7EA82C4802A3}"/>
               </a:ext>
             </a:extLst>
           </p:cNvPr>
@@ -11723,7 +11723,7 @@
           <p:cNvPr id="3" name="Marcador de contenido 2">
             <a:extLst>
               <a:ext uri="{FF2B5EF4-FFF2-40B4-BE49-F238E27FC236}">
-                <a16:creationId xmlns:a16="http://schemas.microsoft.com/office/drawing/2014/main" id="{C0C1B49A-983E-49F2-B559-B071EE7D9A5F}"/>
+                <a16:creationId xmlns:a16="http://schemas.microsoft.com/office/drawing/2014/main" xmlns="" id="{C0C1B49A-983E-49F2-B559-B071EE7D9A5F}"/>
               </a:ext>
             </a:extLst>
           </p:cNvPr>
@@ -11848,7 +11848,7 @@
           <p:cNvPr id="2" name="Título 1">
             <a:extLst>
               <a:ext uri="{FF2B5EF4-FFF2-40B4-BE49-F238E27FC236}">
-                <a16:creationId xmlns:a16="http://schemas.microsoft.com/office/drawing/2014/main" id="{6EB0A5A3-C538-4066-BB19-7EA82C4802A3}"/>
+                <a16:creationId xmlns:a16="http://schemas.microsoft.com/office/drawing/2014/main" xmlns="" id="{6EB0A5A3-C538-4066-BB19-7EA82C4802A3}"/>
               </a:ext>
             </a:extLst>
           </p:cNvPr>
@@ -11881,7 +11881,7 @@
           <p:cNvPr id="3" name="Marcador de contenido 2">
             <a:extLst>
               <a:ext uri="{FF2B5EF4-FFF2-40B4-BE49-F238E27FC236}">
-                <a16:creationId xmlns:a16="http://schemas.microsoft.com/office/drawing/2014/main" id="{C0C1B49A-983E-49F2-B559-B071EE7D9A5F}"/>
+                <a16:creationId xmlns:a16="http://schemas.microsoft.com/office/drawing/2014/main" xmlns="" id="{C0C1B49A-983E-49F2-B559-B071EE7D9A5F}"/>
               </a:ext>
             </a:extLst>
           </p:cNvPr>
@@ -12035,7 +12035,7 @@
           <p:cNvPr id="2" name="Título 1">
             <a:extLst>
               <a:ext uri="{FF2B5EF4-FFF2-40B4-BE49-F238E27FC236}">
-                <a16:creationId xmlns:a16="http://schemas.microsoft.com/office/drawing/2014/main" id="{6EB0A5A3-C538-4066-BB19-7EA82C4802A3}"/>
+                <a16:creationId xmlns:a16="http://schemas.microsoft.com/office/drawing/2014/main" xmlns="" id="{6EB0A5A3-C538-4066-BB19-7EA82C4802A3}"/>
               </a:ext>
             </a:extLst>
           </p:cNvPr>
@@ -12729,7 +12729,7 @@
           <p:cNvPr id="2" name="Título 1">
             <a:extLst>
               <a:ext uri="{FF2B5EF4-FFF2-40B4-BE49-F238E27FC236}">
-                <a16:creationId xmlns:a16="http://schemas.microsoft.com/office/drawing/2014/main" id="{A08BF852-5F19-46F2-83FE-6528AEC95981}"/>
+                <a16:creationId xmlns:a16="http://schemas.microsoft.com/office/drawing/2014/main" xmlns="" id="{A08BF852-5F19-46F2-83FE-6528AEC95981}"/>
               </a:ext>
             </a:extLst>
           </p:cNvPr>
@@ -12757,7 +12757,7 @@
           <p:cNvPr id="3" name="Marcador de contenido 2">
             <a:extLst>
               <a:ext uri="{FF2B5EF4-FFF2-40B4-BE49-F238E27FC236}">
-                <a16:creationId xmlns:a16="http://schemas.microsoft.com/office/drawing/2014/main" id="{4825B7B8-2642-4E50-9E0D-E85148EB6652}"/>
+                <a16:creationId xmlns:a16="http://schemas.microsoft.com/office/drawing/2014/main" xmlns="" id="{4825B7B8-2642-4E50-9E0D-E85148EB6652}"/>
               </a:ext>
             </a:extLst>
           </p:cNvPr>
@@ -13049,7 +13049,7 @@
           <p:cNvPr id="2" name="Título 1">
             <a:extLst>
               <a:ext uri="{FF2B5EF4-FFF2-40B4-BE49-F238E27FC236}">
-                <a16:creationId xmlns:a16="http://schemas.microsoft.com/office/drawing/2014/main" id="{A08A0D13-4C8D-450D-8C55-36F4EB54427D}"/>
+                <a16:creationId xmlns:a16="http://schemas.microsoft.com/office/drawing/2014/main" xmlns="" id="{A08A0D13-4C8D-450D-8C55-36F4EB54427D}"/>
               </a:ext>
             </a:extLst>
           </p:cNvPr>
@@ -13114,7 +13114,7 @@
           <p:cNvPr id="2" name="Título 1">
             <a:extLst>
               <a:ext uri="{FF2B5EF4-FFF2-40B4-BE49-F238E27FC236}">
-                <a16:creationId xmlns:a16="http://schemas.microsoft.com/office/drawing/2014/main" id="{2458DF6C-430A-4FE6-BEE9-9873D9821768}"/>
+                <a16:creationId xmlns:a16="http://schemas.microsoft.com/office/drawing/2014/main" xmlns="" id="{2458DF6C-430A-4FE6-BEE9-9873D9821768}"/>
               </a:ext>
             </a:extLst>
           </p:cNvPr>
@@ -13147,7 +13147,7 @@
           <p:cNvPr id="3" name="Marcador de contenido 2">
             <a:extLst>
               <a:ext uri="{FF2B5EF4-FFF2-40B4-BE49-F238E27FC236}">
-                <a16:creationId xmlns:a16="http://schemas.microsoft.com/office/drawing/2014/main" id="{74D85991-244B-440C-9B99-B3E7D6695501}"/>
+                <a16:creationId xmlns:a16="http://schemas.microsoft.com/office/drawing/2014/main" xmlns="" id="{74D85991-244B-440C-9B99-B3E7D6695501}"/>
               </a:ext>
             </a:extLst>
           </p:cNvPr>
@@ -13243,7 +13243,7 @@
           <p:cNvPr id="2" name="Título 1">
             <a:extLst>
               <a:ext uri="{FF2B5EF4-FFF2-40B4-BE49-F238E27FC236}">
-                <a16:creationId xmlns:a16="http://schemas.microsoft.com/office/drawing/2014/main" id="{4D3D3C5E-AD47-4DAC-8A45-DADDC1B8253D}"/>
+                <a16:creationId xmlns:a16="http://schemas.microsoft.com/office/drawing/2014/main" xmlns="" id="{4D3D3C5E-AD47-4DAC-8A45-DADDC1B8253D}"/>
               </a:ext>
             </a:extLst>
           </p:cNvPr>
@@ -13276,7 +13276,7 @@
           <p:cNvPr id="3" name="Marcador de contenido 2">
             <a:extLst>
               <a:ext uri="{FF2B5EF4-FFF2-40B4-BE49-F238E27FC236}">
-                <a16:creationId xmlns:a16="http://schemas.microsoft.com/office/drawing/2014/main" id="{6ADE1AAD-CE76-427C-B709-D78D3DFFCFC0}"/>
+                <a16:creationId xmlns:a16="http://schemas.microsoft.com/office/drawing/2014/main" xmlns="" id="{6ADE1AAD-CE76-427C-B709-D78D3DFFCFC0}"/>
               </a:ext>
             </a:extLst>
           </p:cNvPr>
@@ -13360,7 +13360,7 @@
           <p:cNvPr id="2" name="Título 1">
             <a:extLst>
               <a:ext uri="{FF2B5EF4-FFF2-40B4-BE49-F238E27FC236}">
-                <a16:creationId xmlns:a16="http://schemas.microsoft.com/office/drawing/2014/main" id="{2458DF6C-430A-4FE6-BEE9-9873D9821768}"/>
+                <a16:creationId xmlns:a16="http://schemas.microsoft.com/office/drawing/2014/main" xmlns="" id="{2458DF6C-430A-4FE6-BEE9-9873D9821768}"/>
               </a:ext>
             </a:extLst>
           </p:cNvPr>
@@ -13393,7 +13393,7 @@
           <p:cNvPr id="3" name="Marcador de contenido 2">
             <a:extLst>
               <a:ext uri="{FF2B5EF4-FFF2-40B4-BE49-F238E27FC236}">
-                <a16:creationId xmlns:a16="http://schemas.microsoft.com/office/drawing/2014/main" id="{74D85991-244B-440C-9B99-B3E7D6695501}"/>
+                <a16:creationId xmlns:a16="http://schemas.microsoft.com/office/drawing/2014/main" xmlns="" id="{74D85991-244B-440C-9B99-B3E7D6695501}"/>
               </a:ext>
             </a:extLst>
           </p:cNvPr>
@@ -13453,16 +13453,16 @@
           <a:p>
             <a:r>
               <a:rPr lang="es-AR" dirty="0"/>
-              <a:t>Horas de cursada de Teoría y de Práctica</a:t>
-            </a:r>
-          </a:p>
-          <a:p>
-            <a:r>
-              <a:rPr lang="es-AR" dirty="0"/>
-              <a:t>¿Hasta qué tamaño (Mb) se puede subir un programa y un plan al sistema?</a:t>
-            </a:r>
-          </a:p>
-          <a:p>
+              <a:t>Horas de cursada de Teoría y </a:t>
+            </a:r>
+            <a:r>
+              <a:rPr lang="es-AR"/>
+              <a:t>de </a:t>
+            </a:r>
+            <a:r>
+              <a:rPr lang="es-AR" smtClean="0"/>
+              <a:t>Práctica</a:t>
+            </a:r>
             <a:endParaRPr lang="es-AR" dirty="0"/>
           </a:p>
         </p:txBody>
@@ -13502,7 +13502,7 @@
           <p:cNvPr id="4" name="Rectángulo 3">
             <a:extLst>
               <a:ext uri="{FF2B5EF4-FFF2-40B4-BE49-F238E27FC236}">
-                <a16:creationId xmlns:a16="http://schemas.microsoft.com/office/drawing/2014/main" id="{B0F1B4F4-0C7A-4C0E-8584-95718BC545EC}"/>
+                <a16:creationId xmlns:a16="http://schemas.microsoft.com/office/drawing/2014/main" xmlns="" id="{B0F1B4F4-0C7A-4C0E-8584-95718BC545EC}"/>
               </a:ext>
             </a:extLst>
           </p:cNvPr>
@@ -13566,7 +13566,7 @@
           <p:cNvPr id="2" name="CuadroTexto 1">
             <a:extLst>
               <a:ext uri="{FF2B5EF4-FFF2-40B4-BE49-F238E27FC236}">
-                <a16:creationId xmlns:a16="http://schemas.microsoft.com/office/drawing/2014/main" id="{BBF285E2-50A8-4654-BD24-220C20D7C57B}"/>
+                <a16:creationId xmlns:a16="http://schemas.microsoft.com/office/drawing/2014/main" xmlns="" id="{BBF285E2-50A8-4654-BD24-220C20D7C57B}"/>
               </a:ext>
             </a:extLst>
           </p:cNvPr>
@@ -13631,7 +13631,7 @@
           <p:cNvPr id="4" name="Título 3">
             <a:extLst>
               <a:ext uri="{FF2B5EF4-FFF2-40B4-BE49-F238E27FC236}">
-                <a16:creationId xmlns:a16="http://schemas.microsoft.com/office/drawing/2014/main" id="{FA4EADB5-92CE-4B25-BE21-7FC484AE680E}"/>
+                <a16:creationId xmlns:a16="http://schemas.microsoft.com/office/drawing/2014/main" xmlns="" id="{FA4EADB5-92CE-4B25-BE21-7FC484AE680E}"/>
               </a:ext>
             </a:extLst>
           </p:cNvPr>
@@ -13667,7 +13667,7 @@
           <p:cNvPr id="5" name="Subtítulo 4">
             <a:extLst>
               <a:ext uri="{FF2B5EF4-FFF2-40B4-BE49-F238E27FC236}">
-                <a16:creationId xmlns:a16="http://schemas.microsoft.com/office/drawing/2014/main" id="{7035CB29-6D24-4E02-AC9F-07DC0DE9312C}"/>
+                <a16:creationId xmlns:a16="http://schemas.microsoft.com/office/drawing/2014/main" xmlns="" id="{7035CB29-6D24-4E02-AC9F-07DC0DE9312C}"/>
               </a:ext>
             </a:extLst>
           </p:cNvPr>
@@ -13825,7 +13825,7 @@
           <p:cNvPr id="4" name="Título 3">
             <a:extLst>
               <a:ext uri="{FF2B5EF4-FFF2-40B4-BE49-F238E27FC236}">
-                <a16:creationId xmlns:a16="http://schemas.microsoft.com/office/drawing/2014/main" id="{FA4EADB5-92CE-4B25-BE21-7FC484AE680E}"/>
+                <a16:creationId xmlns:a16="http://schemas.microsoft.com/office/drawing/2014/main" xmlns="" id="{FA4EADB5-92CE-4B25-BE21-7FC484AE680E}"/>
               </a:ext>
             </a:extLst>
           </p:cNvPr>
@@ -13860,7 +13860,7 @@
           <p:cNvPr id="5" name="Subtítulo 4">
             <a:extLst>
               <a:ext uri="{FF2B5EF4-FFF2-40B4-BE49-F238E27FC236}">
-                <a16:creationId xmlns:a16="http://schemas.microsoft.com/office/drawing/2014/main" id="{7035CB29-6D24-4E02-AC9F-07DC0DE9312C}"/>
+                <a16:creationId xmlns:a16="http://schemas.microsoft.com/office/drawing/2014/main" xmlns="" id="{7035CB29-6D24-4E02-AC9F-07DC0DE9312C}"/>
               </a:ext>
             </a:extLst>
           </p:cNvPr>
@@ -13900,7 +13900,7 @@
           <p:cNvPr id="10" name="Imagen 9">
             <a:extLst>
               <a:ext uri="{FF2B5EF4-FFF2-40B4-BE49-F238E27FC236}">
-                <a16:creationId xmlns:a16="http://schemas.microsoft.com/office/drawing/2014/main" id="{9E93C3DC-EA10-4E41-BDEF-6D23E1C605A2}"/>
+                <a16:creationId xmlns:a16="http://schemas.microsoft.com/office/drawing/2014/main" xmlns="" id="{9E93C3DC-EA10-4E41-BDEF-6D23E1C605A2}"/>
               </a:ext>
             </a:extLst>
           </p:cNvPr>
@@ -13936,7 +13936,7 @@
           <p:cNvPr id="18" name="Imagen 17">
             <a:extLst>
               <a:ext uri="{FF2B5EF4-FFF2-40B4-BE49-F238E27FC236}">
-                <a16:creationId xmlns:a16="http://schemas.microsoft.com/office/drawing/2014/main" id="{8646EEDC-88A1-4D49-A526-A92135A622F0}"/>
+                <a16:creationId xmlns:a16="http://schemas.microsoft.com/office/drawing/2014/main" xmlns="" id="{8646EEDC-88A1-4D49-A526-A92135A622F0}"/>
               </a:ext>
             </a:extLst>
           </p:cNvPr>
@@ -13972,7 +13972,7 @@
           <p:cNvPr id="20" name="Imagen 19">
             <a:extLst>
               <a:ext uri="{FF2B5EF4-FFF2-40B4-BE49-F238E27FC236}">
-                <a16:creationId xmlns:a16="http://schemas.microsoft.com/office/drawing/2014/main" id="{4A2D40FB-590B-4A55-B259-6C3ECBBC258F}"/>
+                <a16:creationId xmlns:a16="http://schemas.microsoft.com/office/drawing/2014/main" xmlns="" id="{4A2D40FB-590B-4A55-B259-6C3ECBBC258F}"/>
               </a:ext>
             </a:extLst>
           </p:cNvPr>
@@ -13982,7 +13982,7 @@
           <p:nvPr/>
         </p:nvPicPr>
         <p:blipFill>
-          <a:blip r:embed="rId4" cstate="hqprint">
+          <a:blip r:embed="rId4" cstate="print">
             <a:extLst>
               <a:ext uri="{28A0092B-C50C-407E-A947-70E740481C1C}">
                 <a14:useLocalDpi xmlns:a14="http://schemas.microsoft.com/office/drawing/2010/main" val="0"/>
@@ -14008,7 +14008,7 @@
           <p:cNvPr id="22" name="Imagen 21">
             <a:extLst>
               <a:ext uri="{FF2B5EF4-FFF2-40B4-BE49-F238E27FC236}">
-                <a16:creationId xmlns:a16="http://schemas.microsoft.com/office/drawing/2014/main" id="{B2430BC3-AAE9-4FD6-9B04-9E1C8B7005EE}"/>
+                <a16:creationId xmlns:a16="http://schemas.microsoft.com/office/drawing/2014/main" xmlns="" id="{B2430BC3-AAE9-4FD6-9B04-9E1C8B7005EE}"/>
               </a:ext>
             </a:extLst>
           </p:cNvPr>
@@ -14018,7 +14018,7 @@
           <p:nvPr/>
         </p:nvPicPr>
         <p:blipFill>
-          <a:blip r:embed="rId5" cstate="hqprint">
+          <a:blip r:embed="rId5" cstate="print">
             <a:extLst>
               <a:ext uri="{28A0092B-C50C-407E-A947-70E740481C1C}">
                 <a14:useLocalDpi xmlns:a14="http://schemas.microsoft.com/office/drawing/2010/main" val="0"/>
@@ -14044,7 +14044,7 @@
           <p:cNvPr id="25" name="Grupo 24">
             <a:extLst>
               <a:ext uri="{FF2B5EF4-FFF2-40B4-BE49-F238E27FC236}">
-                <a16:creationId xmlns:a16="http://schemas.microsoft.com/office/drawing/2014/main" id="{6FBCDE22-F651-45B0-99A1-055E6ABDF7ED}"/>
+                <a16:creationId xmlns:a16="http://schemas.microsoft.com/office/drawing/2014/main" xmlns="" id="{6FBCDE22-F651-45B0-99A1-055E6ABDF7ED}"/>
               </a:ext>
             </a:extLst>
           </p:cNvPr>
@@ -14064,7 +14064,7 @@
             <p:cNvPr id="12" name="Imagen 11">
               <a:extLst>
                 <a:ext uri="{FF2B5EF4-FFF2-40B4-BE49-F238E27FC236}">
-                  <a16:creationId xmlns:a16="http://schemas.microsoft.com/office/drawing/2014/main" id="{8EF366B3-0A5E-4158-883D-ADDFEF56C8D1}"/>
+                  <a16:creationId xmlns:a16="http://schemas.microsoft.com/office/drawing/2014/main" xmlns="" id="{8EF366B3-0A5E-4158-883D-ADDFEF56C8D1}"/>
                 </a:ext>
               </a:extLst>
             </p:cNvPr>
@@ -14100,7 +14100,7 @@
             <p:cNvPr id="14" name="Imagen 13">
               <a:extLst>
                 <a:ext uri="{FF2B5EF4-FFF2-40B4-BE49-F238E27FC236}">
-                  <a16:creationId xmlns:a16="http://schemas.microsoft.com/office/drawing/2014/main" id="{16FD14F2-15D3-4DD2-9D3C-D16633A69E32}"/>
+                  <a16:creationId xmlns:a16="http://schemas.microsoft.com/office/drawing/2014/main" xmlns="" id="{16FD14F2-15D3-4DD2-9D3C-D16633A69E32}"/>
                 </a:ext>
               </a:extLst>
             </p:cNvPr>
@@ -14136,7 +14136,7 @@
             <p:cNvPr id="16" name="Imagen 15">
               <a:extLst>
                 <a:ext uri="{FF2B5EF4-FFF2-40B4-BE49-F238E27FC236}">
-                  <a16:creationId xmlns:a16="http://schemas.microsoft.com/office/drawing/2014/main" id="{F8D896A9-662E-4D9F-A70A-6AAF6F5C524E}"/>
+                  <a16:creationId xmlns:a16="http://schemas.microsoft.com/office/drawing/2014/main" xmlns="" id="{F8D896A9-662E-4D9F-A70A-6AAF6F5C524E}"/>
                 </a:ext>
               </a:extLst>
             </p:cNvPr>
@@ -14172,7 +14172,7 @@
             <p:cNvPr id="24" name="Imagen 23">
               <a:extLst>
                 <a:ext uri="{FF2B5EF4-FFF2-40B4-BE49-F238E27FC236}">
-                  <a16:creationId xmlns:a16="http://schemas.microsoft.com/office/drawing/2014/main" id="{34384560-A72D-4409-8A84-1ED46309C9E6}"/>
+                  <a16:creationId xmlns:a16="http://schemas.microsoft.com/office/drawing/2014/main" xmlns="" id="{34384560-A72D-4409-8A84-1ED46309C9E6}"/>
                 </a:ext>
               </a:extLst>
             </p:cNvPr>
@@ -14239,7 +14239,7 @@
           <p:cNvPr id="2" name="Título 1">
             <a:extLst>
               <a:ext uri="{FF2B5EF4-FFF2-40B4-BE49-F238E27FC236}">
-                <a16:creationId xmlns:a16="http://schemas.microsoft.com/office/drawing/2014/main" id="{0ED6D180-92C1-4333-BA91-2BBA4DD94A3B}"/>
+                <a16:creationId xmlns:a16="http://schemas.microsoft.com/office/drawing/2014/main" xmlns="" id="{0ED6D180-92C1-4333-BA91-2BBA4DD94A3B}"/>
               </a:ext>
             </a:extLst>
           </p:cNvPr>
@@ -14272,7 +14272,7 @@
           <p:cNvPr id="6" name="Marcador de contenido 5">
             <a:extLst>
               <a:ext uri="{FF2B5EF4-FFF2-40B4-BE49-F238E27FC236}">
-                <a16:creationId xmlns:a16="http://schemas.microsoft.com/office/drawing/2014/main" id="{EF5FF892-247B-4782-9E12-A9439F8D5681}"/>
+                <a16:creationId xmlns:a16="http://schemas.microsoft.com/office/drawing/2014/main" xmlns="" id="{EF5FF892-247B-4782-9E12-A9439F8D5681}"/>
               </a:ext>
             </a:extLst>
           </p:cNvPr>
@@ -14436,7 +14436,7 @@
           <p:cNvPr id="2" name="Título 1">
             <a:extLst>
               <a:ext uri="{FF2B5EF4-FFF2-40B4-BE49-F238E27FC236}">
-                <a16:creationId xmlns:a16="http://schemas.microsoft.com/office/drawing/2014/main" id="{0ED6D180-92C1-4333-BA91-2BBA4DD94A3B}"/>
+                <a16:creationId xmlns:a16="http://schemas.microsoft.com/office/drawing/2014/main" xmlns="" id="{0ED6D180-92C1-4333-BA91-2BBA4DD94A3B}"/>
               </a:ext>
             </a:extLst>
           </p:cNvPr>
@@ -14469,7 +14469,7 @@
           <p:cNvPr id="13" name="Marcador de contenido 12">
             <a:extLst>
               <a:ext uri="{FF2B5EF4-FFF2-40B4-BE49-F238E27FC236}">
-                <a16:creationId xmlns:a16="http://schemas.microsoft.com/office/drawing/2014/main" id="{CEA8B96E-5837-4A4D-A606-8D01BA9A3D3E}"/>
+                <a16:creationId xmlns:a16="http://schemas.microsoft.com/office/drawing/2014/main" xmlns="" id="{CEA8B96E-5837-4A4D-A606-8D01BA9A3D3E}"/>
               </a:ext>
             </a:extLst>
           </p:cNvPr>
@@ -14534,7 +14534,7 @@
           <p:cNvPr id="2" name="Título 1">
             <a:extLst>
               <a:ext uri="{FF2B5EF4-FFF2-40B4-BE49-F238E27FC236}">
-                <a16:creationId xmlns:a16="http://schemas.microsoft.com/office/drawing/2014/main" id="{48E5154C-DCCF-4EF4-A599-6C5F443E3B7E}"/>
+                <a16:creationId xmlns:a16="http://schemas.microsoft.com/office/drawing/2014/main" xmlns="" id="{48E5154C-DCCF-4EF4-A599-6C5F443E3B7E}"/>
               </a:ext>
             </a:extLst>
           </p:cNvPr>
@@ -14567,7 +14567,7 @@
           <p:cNvPr id="3" name="Marcador de contenido 2">
             <a:extLst>
               <a:ext uri="{FF2B5EF4-FFF2-40B4-BE49-F238E27FC236}">
-                <a16:creationId xmlns:a16="http://schemas.microsoft.com/office/drawing/2014/main" id="{CE1A4805-831B-4F38-AD2E-0BA47901F15D}"/>
+                <a16:creationId xmlns:a16="http://schemas.microsoft.com/office/drawing/2014/main" xmlns="" id="{CE1A4805-831B-4F38-AD2E-0BA47901F15D}"/>
               </a:ext>
             </a:extLst>
           </p:cNvPr>
@@ -14659,7 +14659,7 @@
           <p:cNvPr id="4" name="Rectángulo 3">
             <a:extLst>
               <a:ext uri="{FF2B5EF4-FFF2-40B4-BE49-F238E27FC236}">
-                <a16:creationId xmlns:a16="http://schemas.microsoft.com/office/drawing/2014/main" id="{8DA77BB3-B03A-4841-9B03-9EE22063CC69}"/>
+                <a16:creationId xmlns:a16="http://schemas.microsoft.com/office/drawing/2014/main" xmlns="" id="{8DA77BB3-B03A-4841-9B03-9EE22063CC69}"/>
               </a:ext>
             </a:extLst>
           </p:cNvPr>
@@ -14749,7 +14749,7 @@
           <p:cNvPr id="5" name="Marcador de contenido 4">
             <a:extLst>
               <a:ext uri="{FF2B5EF4-FFF2-40B4-BE49-F238E27FC236}">
-                <a16:creationId xmlns:a16="http://schemas.microsoft.com/office/drawing/2014/main" id="{6E86104B-2416-4C39-94D1-3F41BA25E339}"/>
+                <a16:creationId xmlns:a16="http://schemas.microsoft.com/office/drawing/2014/main" xmlns="" id="{6E86104B-2416-4C39-94D1-3F41BA25E339}"/>
               </a:ext>
             </a:extLst>
           </p:cNvPr>

</xml_diff>